<commit_message>
added some extra information in ppt
</commit_message>
<xml_diff>
--- a/google/about_google_sanjay.pptx
+++ b/google/about_google_sanjay.pptx
@@ -6,13 +6,19 @@
   </p:sldMasterIdLst>
   <p:sldIdLst>
     <p:sldId id="256" r:id="rId2"/>
-    <p:sldId id="259" r:id="rId3"/>
-    <p:sldId id="262" r:id="rId4"/>
-    <p:sldId id="263" r:id="rId5"/>
-    <p:sldId id="258" r:id="rId6"/>
-    <p:sldId id="260" r:id="rId7"/>
-    <p:sldId id="261" r:id="rId8"/>
-    <p:sldId id="257" r:id="rId9"/>
+    <p:sldId id="264" r:id="rId3"/>
+    <p:sldId id="259" r:id="rId4"/>
+    <p:sldId id="266" r:id="rId5"/>
+    <p:sldId id="267" r:id="rId6"/>
+    <p:sldId id="268" r:id="rId7"/>
+    <p:sldId id="269" r:id="rId8"/>
+    <p:sldId id="265" r:id="rId9"/>
+    <p:sldId id="262" r:id="rId10"/>
+    <p:sldId id="263" r:id="rId11"/>
+    <p:sldId id="258" r:id="rId12"/>
+    <p:sldId id="260" r:id="rId13"/>
+    <p:sldId id="261" r:id="rId14"/>
+    <p:sldId id="257" r:id="rId15"/>
   </p:sldIdLst>
   <p:sldSz cx="9144000" cy="6858000" type="screen4x3"/>
   <p:notesSz cx="6858000" cy="9144000"/>
@@ -252,7 +258,7 @@
             <a:fld id="{E6F9B8CD-342D-4579-98EC-A8FD6B7370E1}" type="datetimeFigureOut">
               <a:rPr lang="en-US" smtClean="0"/>
               <a:pPr/>
-              <a:t>19/8/2015</a:t>
+              <a:t>23/8/2015</a:t>
             </a:fld>
             <a:endParaRPr lang="en-US" dirty="0"/>
           </a:p>
@@ -1123,7 +1129,7 @@
             <a:fld id="{E6F9B8CD-342D-4579-98EC-A8FD6B7370E1}" type="datetimeFigureOut">
               <a:rPr lang="en-US" smtClean="0"/>
               <a:pPr/>
-              <a:t>19/8/2015</a:t>
+              <a:t>23/8/2015</a:t>
             </a:fld>
             <a:endParaRPr lang="en-US"/>
           </a:p>
@@ -1300,7 +1306,7 @@
             <a:fld id="{E6F9B8CD-342D-4579-98EC-A8FD6B7370E1}" type="datetimeFigureOut">
               <a:rPr lang="en-US" smtClean="0"/>
               <a:pPr/>
-              <a:t>19/8/2015</a:t>
+              <a:t>23/8/2015</a:t>
             </a:fld>
             <a:endParaRPr lang="en-US"/>
           </a:p>
@@ -1473,7 +1479,7 @@
             <a:fld id="{E6F9B8CD-342D-4579-98EC-A8FD6B7370E1}" type="datetimeFigureOut">
               <a:rPr lang="en-US" smtClean="0"/>
               <a:pPr algn="r" eaLnBrk="1" latinLnBrk="0" hangingPunct="1"/>
-              <a:t>19/8/2015</a:t>
+              <a:t>23/8/2015</a:t>
             </a:fld>
             <a:endParaRPr lang="en-US"/>
           </a:p>
@@ -1686,7 +1692,7 @@
             <a:fld id="{E6F9B8CD-342D-4579-98EC-A8FD6B7370E1}" type="datetimeFigureOut">
               <a:rPr lang="en-US" smtClean="0"/>
               <a:pPr/>
-              <a:t>19/8/2015</a:t>
+              <a:t>23/8/2015</a:t>
             </a:fld>
             <a:endParaRPr lang="en-US"/>
           </a:p>
@@ -2502,7 +2508,7 @@
             <a:fld id="{E6F9B8CD-342D-4579-98EC-A8FD6B7370E1}" type="datetimeFigureOut">
               <a:rPr lang="en-US" smtClean="0"/>
               <a:pPr/>
-              <a:t>19/8/2015</a:t>
+              <a:t>23/8/2015</a:t>
             </a:fld>
             <a:endParaRPr lang="en-US"/>
           </a:p>
@@ -2740,7 +2746,7 @@
             <a:fld id="{E6F9B8CD-342D-4579-98EC-A8FD6B7370E1}" type="datetimeFigureOut">
               <a:rPr lang="en-US" smtClean="0"/>
               <a:pPr/>
-              <a:t>19/8/2015</a:t>
+              <a:t>23/8/2015</a:t>
             </a:fld>
             <a:endParaRPr lang="en-US"/>
           </a:p>
@@ -3066,7 +3072,7 @@
             <a:fld id="{E6F9B8CD-342D-4579-98EC-A8FD6B7370E1}" type="datetimeFigureOut">
               <a:rPr lang="en-US" smtClean="0"/>
               <a:pPr algn="r" eaLnBrk="1" latinLnBrk="0" hangingPunct="1"/>
-              <a:t>19/8/2015</a:t>
+              <a:t>23/8/2015</a:t>
             </a:fld>
             <a:endParaRPr lang="en-US"/>
           </a:p>
@@ -3159,7 +3165,7 @@
             <a:fld id="{E6F9B8CD-342D-4579-98EC-A8FD6B7370E1}" type="datetimeFigureOut">
               <a:rPr lang="en-US" smtClean="0"/>
               <a:pPr/>
-              <a:t>19/8/2015</a:t>
+              <a:t>23/8/2015</a:t>
             </a:fld>
             <a:endParaRPr lang="en-US"/>
           </a:p>
@@ -3679,7 +3685,7 @@
             <a:fld id="{E6F9B8CD-342D-4579-98EC-A8FD6B7370E1}" type="datetimeFigureOut">
               <a:rPr lang="en-US" smtClean="0"/>
               <a:pPr algn="r" eaLnBrk="1" latinLnBrk="0" hangingPunct="1"/>
-              <a:t>19/8/2015</a:t>
+              <a:t>23/8/2015</a:t>
             </a:fld>
             <a:endParaRPr lang="en-US" dirty="0"/>
           </a:p>
@@ -4194,7 +4200,7 @@
             <a:fld id="{E6F9B8CD-342D-4579-98EC-A8FD6B7370E1}" type="datetimeFigureOut">
               <a:rPr lang="en-US" smtClean="0"/>
               <a:pPr algn="r" eaLnBrk="1" latinLnBrk="0" hangingPunct="1"/>
-              <a:t>19/8/2015</a:t>
+              <a:t>23/8/2015</a:t>
             </a:fld>
             <a:endParaRPr lang="en-US"/>
           </a:p>
@@ -4443,7 +4449,7 @@
             <a:fld id="{E6F9B8CD-342D-4579-98EC-A8FD6B7370E1}" type="datetimeFigureOut">
               <a:rPr lang="en-US" smtClean="0"/>
               <a:pPr algn="r" eaLnBrk="1" latinLnBrk="0" hangingPunct="1"/>
-              <a:t>19/8/2015</a:t>
+              <a:t>23/8/2015</a:t>
             </a:fld>
             <a:endParaRPr lang="en-US" dirty="0">
               <a:solidFill>
@@ -5140,293 +5146,7 @@
 </p:sld>
 </file>
 
-<file path=ppt/slides/slide2.xml><?xml version="1.0" encoding="utf-8"?>
-<p:sld xmlns:a="http://schemas.openxmlformats.org/drawingml/2006/main" xmlns:r="http://schemas.openxmlformats.org/officeDocument/2006/relationships" xmlns:p="http://schemas.openxmlformats.org/presentationml/2006/main">
-  <p:cSld>
-    <p:spTree>
-      <p:nvGrpSpPr>
-        <p:cNvPr id="1" name=""/>
-        <p:cNvGrpSpPr/>
-        <p:nvPr/>
-      </p:nvGrpSpPr>
-      <p:grpSpPr>
-        <a:xfrm>
-          <a:off x="0" y="0"/>
-          <a:ext cx="0" cy="0"/>
-          <a:chOff x="0" y="0"/>
-          <a:chExt cx="0" cy="0"/>
-        </a:xfrm>
-      </p:grpSpPr>
-      <p:sp>
-        <p:nvSpPr>
-          <p:cNvPr id="11" name="Title 10"/>
-          <p:cNvSpPr>
-            <a:spLocks noGrp="1"/>
-          </p:cNvSpPr>
-          <p:nvPr>
-            <p:ph type="title"/>
-          </p:nvPr>
-        </p:nvSpPr>
-        <p:spPr>
-          <a:xfrm>
-            <a:off x="457200" y="274638"/>
-            <a:ext cx="8274908" cy="715962"/>
-          </a:xfrm>
-        </p:spPr>
-        <p:txBody>
-          <a:bodyPr/>
-          <a:lstStyle/>
-          <a:p>
-            <a:r>
-              <a:rPr lang="en-US" sz="3200" b="1" dirty="0" smtClean="0">
-                <a:solidFill>
-                  <a:schemeClr val="accent2"/>
-                </a:solidFill>
-              </a:rPr>
-              <a:t>G</a:t>
-            </a:r>
-            <a:r>
-              <a:rPr lang="en-US" sz="3200" b="1" dirty="0" smtClean="0">
-                <a:solidFill>
-                  <a:srgbClr val="FF0000"/>
-                </a:solidFill>
-              </a:rPr>
-              <a:t>o</a:t>
-            </a:r>
-            <a:r>
-              <a:rPr lang="en-US" sz="3200" b="1" dirty="0" smtClean="0">
-                <a:solidFill>
-                  <a:srgbClr val="FFF529"/>
-                </a:solidFill>
-              </a:rPr>
-              <a:t>o</a:t>
-            </a:r>
-            <a:r>
-              <a:rPr lang="en-US" sz="3200" b="1" dirty="0" smtClean="0">
-                <a:solidFill>
-                  <a:srgbClr val="1B79D7"/>
-                </a:solidFill>
-              </a:rPr>
-              <a:t>g</a:t>
-            </a:r>
-            <a:r>
-              <a:rPr lang="en-US" sz="3200" b="1" dirty="0" smtClean="0">
-                <a:solidFill>
-                  <a:srgbClr val="009900"/>
-                </a:solidFill>
-              </a:rPr>
-              <a:t>l</a:t>
-            </a:r>
-            <a:r>
-              <a:rPr lang="en-US" sz="3200" b="1" dirty="0" smtClean="0">
-                <a:solidFill>
-                  <a:srgbClr val="ED483D"/>
-                </a:solidFill>
-              </a:rPr>
-              <a:t>e</a:t>
-            </a:r>
-            <a:r>
-              <a:rPr lang="en-US" sz="3200" b="1" dirty="0" smtClean="0">
-                <a:solidFill>
-                  <a:schemeClr val="accent1"/>
-                </a:solidFill>
-              </a:rPr>
-              <a:t> </a:t>
-            </a:r>
-            <a:r>
-              <a:rPr lang="en-US" sz="2400" b="1" dirty="0" smtClean="0">
-                <a:solidFill>
-                  <a:srgbClr val="1B79D7"/>
-                </a:solidFill>
-              </a:rPr>
-              <a:t>Evolution</a:t>
-            </a:r>
-            <a:endParaRPr lang="en-US" dirty="0"/>
-          </a:p>
-        </p:txBody>
-      </p:sp>
-      <p:pic>
-        <p:nvPicPr>
-          <p:cNvPr id="5" name="Content Placeholder 4" descr="part1.jpg"/>
-          <p:cNvPicPr>
-            <a:picLocks noGrp="1" noChangeAspect="1"/>
-          </p:cNvPicPr>
-          <p:nvPr>
-            <p:ph sz="quarter" idx="1"/>
-          </p:nvPr>
-        </p:nvPicPr>
-        <p:blipFill>
-          <a:blip r:embed="rId2" cstate="print"/>
-          <a:stretch>
-            <a:fillRect/>
-          </a:stretch>
-        </p:blipFill>
-        <p:spPr>
-          <a:xfrm>
-            <a:off x="228600" y="990600"/>
-            <a:ext cx="8458200" cy="5867400"/>
-          </a:xfrm>
-        </p:spPr>
-      </p:pic>
-    </p:spTree>
-  </p:cSld>
-  <p:clrMapOvr>
-    <a:masterClrMapping/>
-  </p:clrMapOvr>
-  <p:timing>
-    <p:tnLst>
-      <p:par>
-        <p:cTn id="1" dur="indefinite" restart="never" nodeType="tmRoot"/>
-      </p:par>
-    </p:tnLst>
-  </p:timing>
-</p:sld>
-</file>
-
-<file path=ppt/slides/slide3.xml><?xml version="1.0" encoding="utf-8"?>
-<p:sld xmlns:a="http://schemas.openxmlformats.org/drawingml/2006/main" xmlns:r="http://schemas.openxmlformats.org/officeDocument/2006/relationships" xmlns:p="http://schemas.openxmlformats.org/presentationml/2006/main">
-  <p:cSld>
-    <p:spTree>
-      <p:nvGrpSpPr>
-        <p:cNvPr id="1" name=""/>
-        <p:cNvGrpSpPr/>
-        <p:nvPr/>
-      </p:nvGrpSpPr>
-      <p:grpSpPr>
-        <a:xfrm>
-          <a:off x="0" y="0"/>
-          <a:ext cx="0" cy="0"/>
-          <a:chOff x="0" y="0"/>
-          <a:chExt cx="0" cy="0"/>
-        </a:xfrm>
-      </p:grpSpPr>
-      <p:sp>
-        <p:nvSpPr>
-          <p:cNvPr id="11" name="Title 10"/>
-          <p:cNvSpPr>
-            <a:spLocks noGrp="1"/>
-          </p:cNvSpPr>
-          <p:nvPr>
-            <p:ph type="title"/>
-          </p:nvPr>
-        </p:nvSpPr>
-        <p:spPr>
-          <a:xfrm>
-            <a:off x="457200" y="274638"/>
-            <a:ext cx="8274908" cy="715962"/>
-          </a:xfrm>
-        </p:spPr>
-        <p:txBody>
-          <a:bodyPr/>
-          <a:lstStyle/>
-          <a:p>
-            <a:r>
-              <a:rPr lang="en-US" sz="3200" b="1" dirty="0" smtClean="0">
-                <a:solidFill>
-                  <a:schemeClr val="accent2"/>
-                </a:solidFill>
-              </a:rPr>
-              <a:t>G</a:t>
-            </a:r>
-            <a:r>
-              <a:rPr lang="en-US" sz="3200" b="1" dirty="0" smtClean="0">
-                <a:solidFill>
-                  <a:srgbClr val="FF0000"/>
-                </a:solidFill>
-              </a:rPr>
-              <a:t>o</a:t>
-            </a:r>
-            <a:r>
-              <a:rPr lang="en-US" sz="3200" b="1" dirty="0" smtClean="0">
-                <a:solidFill>
-                  <a:srgbClr val="FFF529"/>
-                </a:solidFill>
-              </a:rPr>
-              <a:t>o</a:t>
-            </a:r>
-            <a:r>
-              <a:rPr lang="en-US" sz="3200" b="1" dirty="0" smtClean="0">
-                <a:solidFill>
-                  <a:srgbClr val="1B79D7"/>
-                </a:solidFill>
-              </a:rPr>
-              <a:t>g</a:t>
-            </a:r>
-            <a:r>
-              <a:rPr lang="en-US" sz="3200" b="1" dirty="0" smtClean="0">
-                <a:solidFill>
-                  <a:srgbClr val="009900"/>
-                </a:solidFill>
-              </a:rPr>
-              <a:t>l</a:t>
-            </a:r>
-            <a:r>
-              <a:rPr lang="en-US" sz="3200" b="1" dirty="0" smtClean="0">
-                <a:solidFill>
-                  <a:srgbClr val="ED483D"/>
-                </a:solidFill>
-              </a:rPr>
-              <a:t>e</a:t>
-            </a:r>
-            <a:r>
-              <a:rPr lang="en-US" sz="3200" b="1" dirty="0" smtClean="0">
-                <a:solidFill>
-                  <a:schemeClr val="accent1"/>
-                </a:solidFill>
-              </a:rPr>
-              <a:t> </a:t>
-            </a:r>
-            <a:r>
-              <a:rPr lang="en-US" sz="2400" b="1" dirty="0" smtClean="0">
-                <a:solidFill>
-                  <a:srgbClr val="1B79D7"/>
-                </a:solidFill>
-              </a:rPr>
-              <a:t>Evolution</a:t>
-            </a:r>
-            <a:endParaRPr lang="en-US" dirty="0"/>
-          </a:p>
-        </p:txBody>
-      </p:sp>
-      <p:pic>
-        <p:nvPicPr>
-          <p:cNvPr id="5" name="Content Placeholder 4" descr="part2.jpg"/>
-          <p:cNvPicPr>
-            <a:picLocks noGrp="1" noChangeAspect="1"/>
-          </p:cNvPicPr>
-          <p:nvPr>
-            <p:ph sz="quarter" idx="1"/>
-          </p:nvPr>
-        </p:nvPicPr>
-        <p:blipFill>
-          <a:blip r:embed="rId2" cstate="print"/>
-          <a:stretch>
-            <a:fillRect/>
-          </a:stretch>
-        </p:blipFill>
-        <p:spPr>
-          <a:xfrm>
-            <a:off x="152400" y="914400"/>
-            <a:ext cx="8686800" cy="5943599"/>
-          </a:xfrm>
-        </p:spPr>
-      </p:pic>
-    </p:spTree>
-  </p:cSld>
-  <p:clrMapOvr>
-    <a:masterClrMapping/>
-  </p:clrMapOvr>
-  <p:timing>
-    <p:tnLst>
-      <p:par>
-        <p:cTn id="1" dur="indefinite" restart="never" nodeType="tmRoot"/>
-      </p:par>
-    </p:tnLst>
-  </p:timing>
-</p:sld>
-</file>
-
-<file path=ppt/slides/slide4.xml><?xml version="1.0" encoding="utf-8"?>
+<file path=ppt/slides/slide10.xml><?xml version="1.0" encoding="utf-8"?>
 <p:sld xmlns:a="http://schemas.openxmlformats.org/drawingml/2006/main" xmlns:r="http://schemas.openxmlformats.org/officeDocument/2006/relationships" xmlns:p="http://schemas.openxmlformats.org/presentationml/2006/main">
   <p:cSld>
     <p:spTree>
@@ -5569,7 +5289,7 @@
 </p:sld>
 </file>
 
-<file path=ppt/slides/slide5.xml><?xml version="1.0" encoding="utf-8"?>
+<file path=ppt/slides/slide11.xml><?xml version="1.0" encoding="utf-8"?>
 <p:sld xmlns:a="http://schemas.openxmlformats.org/drawingml/2006/main" xmlns:r="http://schemas.openxmlformats.org/officeDocument/2006/relationships" xmlns:p="http://schemas.openxmlformats.org/presentationml/2006/main">
   <p:cSld>
     <p:spTree>
@@ -6099,7 +5819,7 @@
 </p:sld>
 </file>
 
-<file path=ppt/slides/slide6.xml><?xml version="1.0" encoding="utf-8"?>
+<file path=ppt/slides/slide12.xml><?xml version="1.0" encoding="utf-8"?>
 <p:sld xmlns:a="http://schemas.openxmlformats.org/drawingml/2006/main" xmlns:r="http://schemas.openxmlformats.org/officeDocument/2006/relationships" xmlns:p="http://schemas.openxmlformats.org/presentationml/2006/main">
   <p:cSld>
     <p:spTree>
@@ -6917,6 +6637,1985 @@
 </p:sld>
 </file>
 
+<file path=ppt/slides/slide13.xml><?xml version="1.0" encoding="utf-8"?>
+<p:sld xmlns:a="http://schemas.openxmlformats.org/drawingml/2006/main" xmlns:r="http://schemas.openxmlformats.org/officeDocument/2006/relationships" xmlns:p="http://schemas.openxmlformats.org/presentationml/2006/main">
+  <p:cSld>
+    <p:spTree>
+      <p:nvGrpSpPr>
+        <p:cNvPr id="1" name=""/>
+        <p:cNvGrpSpPr/>
+        <p:nvPr/>
+      </p:nvGrpSpPr>
+      <p:grpSpPr>
+        <a:xfrm>
+          <a:off x="0" y="0"/>
+          <a:ext cx="0" cy="0"/>
+          <a:chOff x="0" y="0"/>
+          <a:chExt cx="0" cy="0"/>
+        </a:xfrm>
+      </p:grpSpPr>
+      <p:sp>
+        <p:nvSpPr>
+          <p:cNvPr id="11" name="Title 10"/>
+          <p:cNvSpPr>
+            <a:spLocks noGrp="1"/>
+          </p:cNvSpPr>
+          <p:nvPr>
+            <p:ph type="title"/>
+          </p:nvPr>
+        </p:nvSpPr>
+        <p:spPr>
+          <a:xfrm>
+            <a:off x="457200" y="274638"/>
+            <a:ext cx="7467600" cy="715962"/>
+          </a:xfrm>
+        </p:spPr>
+        <p:txBody>
+          <a:bodyPr>
+            <a:normAutofit/>
+          </a:bodyPr>
+          <a:lstStyle/>
+          <a:p>
+            <a:r>
+              <a:rPr lang="en-AU" sz="2400" b="1" dirty="0" smtClean="0">
+                <a:solidFill>
+                  <a:srgbClr val="1B79D7"/>
+                </a:solidFill>
+              </a:rPr>
+              <a:t>Some Interesting</a:t>
+            </a:r>
+            <a:r>
+              <a:rPr lang="en-AU" sz="3200" b="1" dirty="0" smtClean="0">
+                <a:solidFill>
+                  <a:srgbClr val="1B79D7"/>
+                </a:solidFill>
+              </a:rPr>
+              <a:t> </a:t>
+            </a:r>
+            <a:r>
+              <a:rPr lang="en-US" sz="3200" b="1" dirty="0" smtClean="0">
+                <a:solidFill>
+                  <a:schemeClr val="accent2"/>
+                </a:solidFill>
+              </a:rPr>
+              <a:t>G</a:t>
+            </a:r>
+            <a:r>
+              <a:rPr lang="en-US" sz="3200" b="1" dirty="0" smtClean="0">
+                <a:solidFill>
+                  <a:srgbClr val="FF0000"/>
+                </a:solidFill>
+              </a:rPr>
+              <a:t>o</a:t>
+            </a:r>
+            <a:r>
+              <a:rPr lang="en-US" sz="3200" b="1" dirty="0" smtClean="0">
+                <a:solidFill>
+                  <a:srgbClr val="FFF529"/>
+                </a:solidFill>
+              </a:rPr>
+              <a:t>o</a:t>
+            </a:r>
+            <a:r>
+              <a:rPr lang="en-US" sz="3200" b="1" dirty="0" smtClean="0">
+                <a:solidFill>
+                  <a:srgbClr val="1B79D7"/>
+                </a:solidFill>
+              </a:rPr>
+              <a:t>g</a:t>
+            </a:r>
+            <a:r>
+              <a:rPr lang="en-US" sz="3200" b="1" dirty="0" smtClean="0">
+                <a:solidFill>
+                  <a:srgbClr val="009900"/>
+                </a:solidFill>
+              </a:rPr>
+              <a:t>l</a:t>
+            </a:r>
+            <a:r>
+              <a:rPr lang="en-US" sz="3200" b="1" dirty="0" smtClean="0">
+                <a:solidFill>
+                  <a:srgbClr val="ED483D"/>
+                </a:solidFill>
+              </a:rPr>
+              <a:t>e</a:t>
+            </a:r>
+            <a:r>
+              <a:rPr lang="en-US" sz="3200" b="1" dirty="0" smtClean="0">
+                <a:solidFill>
+                  <a:schemeClr val="accent1"/>
+                </a:solidFill>
+              </a:rPr>
+              <a:t> </a:t>
+            </a:r>
+            <a:r>
+              <a:rPr lang="en-AU" sz="2400" b="1" dirty="0" smtClean="0">
+                <a:solidFill>
+                  <a:srgbClr val="1B79D7"/>
+                </a:solidFill>
+              </a:rPr>
+              <a:t>Data-Points</a:t>
+            </a:r>
+            <a:endParaRPr lang="en-US" dirty="0"/>
+          </a:p>
+        </p:txBody>
+      </p:sp>
+      <p:sp>
+        <p:nvSpPr>
+          <p:cNvPr id="6" name="Content Placeholder 5"/>
+          <p:cNvSpPr>
+            <a:spLocks noGrp="1"/>
+          </p:cNvSpPr>
+          <p:nvPr>
+            <p:ph sz="quarter" idx="1"/>
+          </p:nvPr>
+        </p:nvSpPr>
+        <p:spPr>
+          <a:xfrm>
+            <a:off x="457200" y="1219200"/>
+            <a:ext cx="7467600" cy="5254752"/>
+          </a:xfrm>
+        </p:spPr>
+        <p:txBody>
+          <a:bodyPr>
+            <a:normAutofit fontScale="70000" lnSpcReduction="20000"/>
+          </a:bodyPr>
+          <a:lstStyle/>
+          <a:p>
+            <a:pPr marL="339725" indent="-339725">
+              <a:lnSpc>
+                <a:spcPct val="100000"/>
+              </a:lnSpc>
+              <a:spcBef>
+                <a:spcPct val="55000"/>
+              </a:spcBef>
+              <a:spcAft>
+                <a:spcPct val="0"/>
+              </a:spcAft>
+              <a:buClr>
+                <a:srgbClr val="1B79D7"/>
+              </a:buClr>
+              <a:buFont typeface="Wingdings" pitchFamily="2" charset="2"/>
+              <a:buChar char="«"/>
+            </a:pPr>
+            <a:r>
+              <a:rPr lang="en-US" sz="2500" b="1" dirty="0" smtClean="0">
+                <a:solidFill>
+                  <a:schemeClr val="accent2">
+                    <a:lumMod val="75000"/>
+                  </a:schemeClr>
+                </a:solidFill>
+              </a:rPr>
+              <a:t>G</a:t>
+            </a:r>
+            <a:r>
+              <a:rPr lang="en-US" sz="2500" b="1" dirty="0" smtClean="0">
+                <a:solidFill>
+                  <a:srgbClr val="FF0000"/>
+                </a:solidFill>
+              </a:rPr>
+              <a:t>o</a:t>
+            </a:r>
+            <a:r>
+              <a:rPr lang="en-US" sz="2500" b="1" dirty="0" smtClean="0">
+                <a:solidFill>
+                  <a:schemeClr val="accent4"/>
+                </a:solidFill>
+              </a:rPr>
+              <a:t>o</a:t>
+            </a:r>
+            <a:r>
+              <a:rPr lang="en-US" sz="2500" b="1" dirty="0" smtClean="0">
+                <a:solidFill>
+                  <a:srgbClr val="1B79D7"/>
+                </a:solidFill>
+              </a:rPr>
+              <a:t>g</a:t>
+            </a:r>
+            <a:r>
+              <a:rPr lang="en-US" sz="2500" b="1" dirty="0" smtClean="0">
+                <a:solidFill>
+                  <a:srgbClr val="00B050"/>
+                </a:solidFill>
+              </a:rPr>
+              <a:t>l</a:t>
+            </a:r>
+            <a:r>
+              <a:rPr lang="en-US" sz="2500" b="1" dirty="0" smtClean="0">
+                <a:solidFill>
+                  <a:srgbClr val="ED483D"/>
+                </a:solidFill>
+              </a:rPr>
+              <a:t>e</a:t>
+            </a:r>
+            <a:r>
+              <a:rPr lang="en-US" sz="2500" dirty="0" smtClean="0"/>
+              <a:t> started in January, 1996 as a research project at Stanford University, by Ph.D. candidates Larry Page and Sergey </a:t>
+            </a:r>
+            <a:r>
+              <a:rPr lang="en-US" sz="2500" dirty="0" err="1" smtClean="0"/>
+              <a:t>Brin</a:t>
+            </a:r>
+            <a:r>
+              <a:rPr lang="en-US" sz="2500" dirty="0" smtClean="0"/>
+              <a:t> when they were 24 years old and 23 years old respectively.</a:t>
+            </a:r>
+            <a:endParaRPr lang="en-US" sz="2000" dirty="0" smtClean="0"/>
+          </a:p>
+          <a:p>
+            <a:pPr marL="339725" indent="-339725">
+              <a:lnSpc>
+                <a:spcPct val="100000"/>
+              </a:lnSpc>
+              <a:spcBef>
+                <a:spcPct val="55000"/>
+              </a:spcBef>
+              <a:spcAft>
+                <a:spcPct val="0"/>
+              </a:spcAft>
+              <a:buClr>
+                <a:srgbClr val="1B79D7"/>
+              </a:buClr>
+              <a:buFont typeface="Wingdings" pitchFamily="2" charset="2"/>
+              <a:buChar char="«"/>
+            </a:pPr>
+            <a:r>
+              <a:rPr lang="en-US" sz="2500" dirty="0" smtClean="0"/>
+              <a:t>The name </a:t>
+            </a:r>
+            <a:r>
+              <a:rPr lang="en-US" sz="2500" b="1" dirty="0" smtClean="0">
+                <a:solidFill>
+                  <a:schemeClr val="accent2">
+                    <a:lumMod val="75000"/>
+                  </a:schemeClr>
+                </a:solidFill>
+              </a:rPr>
+              <a:t>G</a:t>
+            </a:r>
+            <a:r>
+              <a:rPr lang="en-US" sz="2500" b="1" dirty="0" smtClean="0">
+                <a:solidFill>
+                  <a:srgbClr val="FF0000"/>
+                </a:solidFill>
+              </a:rPr>
+              <a:t>o</a:t>
+            </a:r>
+            <a:r>
+              <a:rPr lang="en-US" sz="2500" b="1" dirty="0" smtClean="0">
+                <a:solidFill>
+                  <a:schemeClr val="accent4"/>
+                </a:solidFill>
+              </a:rPr>
+              <a:t>o</a:t>
+            </a:r>
+            <a:r>
+              <a:rPr lang="en-US" sz="2500" b="1" dirty="0" smtClean="0">
+                <a:solidFill>
+                  <a:srgbClr val="1B79D7"/>
+                </a:solidFill>
+              </a:rPr>
+              <a:t>g</a:t>
+            </a:r>
+            <a:r>
+              <a:rPr lang="en-US" sz="2500" b="1" dirty="0" smtClean="0">
+                <a:solidFill>
+                  <a:srgbClr val="00B050"/>
+                </a:solidFill>
+              </a:rPr>
+              <a:t>l</a:t>
+            </a:r>
+            <a:r>
+              <a:rPr lang="en-US" sz="2500" b="1" dirty="0" smtClean="0">
+                <a:solidFill>
+                  <a:srgbClr val="ED483D"/>
+                </a:solidFill>
+              </a:rPr>
+              <a:t>e </a:t>
+            </a:r>
+            <a:r>
+              <a:rPr lang="en-US" sz="2500" dirty="0" smtClean="0"/>
+              <a:t>™ was an accident. A spelling mistake made by the original founders who thought they were going for ˜Googol™”</a:t>
+            </a:r>
+          </a:p>
+          <a:p>
+            <a:pPr marL="339725" indent="-339725">
+              <a:lnSpc>
+                <a:spcPct val="100000"/>
+              </a:lnSpc>
+              <a:spcBef>
+                <a:spcPct val="55000"/>
+              </a:spcBef>
+              <a:spcAft>
+                <a:spcPct val="0"/>
+              </a:spcAft>
+              <a:buClr>
+                <a:srgbClr val="1B79D7"/>
+              </a:buClr>
+              <a:buFont typeface="Wingdings" pitchFamily="2" charset="2"/>
+              <a:buChar char="«"/>
+            </a:pPr>
+            <a:r>
+              <a:rPr lang="en-US" sz="2300" b="1" dirty="0" smtClean="0">
+                <a:solidFill>
+                  <a:schemeClr val="tx2"/>
+                </a:solidFill>
+              </a:rPr>
+              <a:t>Searches per day</a:t>
+            </a:r>
+            <a:r>
+              <a:rPr lang="en-US" sz="2300" dirty="0" smtClean="0">
+                <a:solidFill>
+                  <a:schemeClr val="tx2"/>
+                </a:solidFill>
+              </a:rPr>
+              <a:t>: Average per second search of people search on </a:t>
+            </a:r>
+            <a:r>
+              <a:rPr lang="en-US" sz="2300" b="1" dirty="0" smtClean="0">
+                <a:solidFill>
+                  <a:schemeClr val="accent2">
+                    <a:lumMod val="75000"/>
+                  </a:schemeClr>
+                </a:solidFill>
+              </a:rPr>
+              <a:t>G</a:t>
+            </a:r>
+            <a:r>
+              <a:rPr lang="en-US" sz="2300" b="1" dirty="0" smtClean="0">
+                <a:solidFill>
+                  <a:srgbClr val="FF0000"/>
+                </a:solidFill>
+              </a:rPr>
+              <a:t>o</a:t>
+            </a:r>
+            <a:r>
+              <a:rPr lang="en-US" sz="2300" b="1" dirty="0" smtClean="0">
+                <a:solidFill>
+                  <a:schemeClr val="accent4"/>
+                </a:solidFill>
+              </a:rPr>
+              <a:t>o</a:t>
+            </a:r>
+            <a:r>
+              <a:rPr lang="en-US" sz="2300" b="1" dirty="0" smtClean="0">
+                <a:solidFill>
+                  <a:srgbClr val="1B79D7"/>
+                </a:solidFill>
+              </a:rPr>
+              <a:t>g</a:t>
+            </a:r>
+            <a:r>
+              <a:rPr lang="en-US" sz="2300" b="1" dirty="0" smtClean="0">
+                <a:solidFill>
+                  <a:srgbClr val="00B050"/>
+                </a:solidFill>
+              </a:rPr>
+              <a:t>l</a:t>
+            </a:r>
+            <a:r>
+              <a:rPr lang="en-US" sz="2300" b="1" dirty="0" smtClean="0">
+                <a:solidFill>
+                  <a:srgbClr val="ED483D"/>
+                </a:solidFill>
+              </a:rPr>
+              <a:t>e </a:t>
+            </a:r>
+            <a:r>
+              <a:rPr lang="en-US" sz="2300" dirty="0" smtClean="0">
+                <a:solidFill>
+                  <a:schemeClr val="tx2"/>
+                </a:solidFill>
+              </a:rPr>
+              <a:t>for is  </a:t>
+            </a:r>
+            <a:r>
+              <a:rPr lang="en-US" sz="2300" b="1" dirty="0" smtClean="0"/>
+              <a:t>40,000</a:t>
+            </a:r>
+            <a:br>
+              <a:rPr lang="en-US" sz="2300" b="1" dirty="0" smtClean="0"/>
+            </a:br>
+            <a:r>
+              <a:rPr lang="en-US" sz="2300" b="1" dirty="0" smtClean="0">
+                <a:hlinkClick r:id="rId2"/>
+              </a:rPr>
+              <a:t>http://www.internetlivestats.com/google-search-statistics/</a:t>
+            </a:r>
+            <a:endParaRPr lang="en-US" sz="2300" dirty="0" smtClean="0">
+              <a:solidFill>
+                <a:schemeClr val="tx2"/>
+              </a:solidFill>
+            </a:endParaRPr>
+          </a:p>
+          <a:p>
+            <a:pPr marL="339725" indent="-339725">
+              <a:lnSpc>
+                <a:spcPct val="100000"/>
+              </a:lnSpc>
+              <a:spcBef>
+                <a:spcPct val="55000"/>
+              </a:spcBef>
+              <a:spcAft>
+                <a:spcPct val="0"/>
+              </a:spcAft>
+              <a:buClr>
+                <a:srgbClr val="1B79D7"/>
+              </a:buClr>
+              <a:buFont typeface="Wingdings" pitchFamily="2" charset="2"/>
+              <a:buChar char="«"/>
+            </a:pPr>
+            <a:r>
+              <a:rPr lang="en-US" sz="2300" b="1" dirty="0" smtClean="0">
+                <a:solidFill>
+                  <a:schemeClr val="accent2">
+                    <a:lumMod val="75000"/>
+                  </a:schemeClr>
+                </a:solidFill>
+              </a:rPr>
+              <a:t>G</a:t>
+            </a:r>
+            <a:r>
+              <a:rPr lang="en-US" sz="2300" b="1" dirty="0" smtClean="0">
+                <a:solidFill>
+                  <a:srgbClr val="FF0000"/>
+                </a:solidFill>
+              </a:rPr>
+              <a:t>o</a:t>
+            </a:r>
+            <a:r>
+              <a:rPr lang="en-US" sz="2300" b="1" dirty="0" smtClean="0">
+                <a:solidFill>
+                  <a:schemeClr val="accent4"/>
+                </a:solidFill>
+              </a:rPr>
+              <a:t>o</a:t>
+            </a:r>
+            <a:r>
+              <a:rPr lang="en-US" sz="2300" b="1" dirty="0" smtClean="0">
+                <a:solidFill>
+                  <a:srgbClr val="1B79D7"/>
+                </a:solidFill>
+              </a:rPr>
+              <a:t>g</a:t>
+            </a:r>
+            <a:r>
+              <a:rPr lang="en-US" sz="2300" b="1" dirty="0" smtClean="0">
+                <a:solidFill>
+                  <a:srgbClr val="00B050"/>
+                </a:solidFill>
+              </a:rPr>
+              <a:t>l</a:t>
+            </a:r>
+            <a:r>
+              <a:rPr lang="en-US" sz="2300" b="1" dirty="0" smtClean="0">
+                <a:solidFill>
+                  <a:srgbClr val="ED483D"/>
+                </a:solidFill>
+              </a:rPr>
+              <a:t>e</a:t>
+            </a:r>
+            <a:r>
+              <a:rPr lang="en-US" sz="2300" b="1" dirty="0" smtClean="0">
+                <a:solidFill>
+                  <a:schemeClr val="tx2"/>
+                </a:solidFill>
+              </a:rPr>
+              <a:t> </a:t>
+            </a:r>
+            <a:r>
+              <a:rPr lang="en-US" sz="2300" b="1" dirty="0" err="1" smtClean="0">
+                <a:solidFill>
+                  <a:schemeClr val="tx2"/>
+                </a:solidFill>
+              </a:rPr>
+              <a:t>Adsense</a:t>
+            </a:r>
+            <a:r>
+              <a:rPr lang="en-US" sz="2300" b="1" dirty="0" smtClean="0">
+                <a:solidFill>
+                  <a:schemeClr val="tx2"/>
+                </a:solidFill>
+              </a:rPr>
+              <a:t> income:  </a:t>
+            </a:r>
+          </a:p>
+          <a:p>
+            <a:pPr marL="705485" lvl="1" indent="-339725">
+              <a:spcBef>
+                <a:spcPct val="55000"/>
+              </a:spcBef>
+              <a:spcAft>
+                <a:spcPct val="0"/>
+              </a:spcAft>
+              <a:buClr>
+                <a:srgbClr val="1B79D7"/>
+              </a:buClr>
+              <a:buFont typeface="Wingdings" pitchFamily="2" charset="2"/>
+              <a:buChar char="«"/>
+            </a:pPr>
+            <a:r>
+              <a:rPr lang="en-US" sz="2300" dirty="0" smtClean="0">
+                <a:solidFill>
+                  <a:schemeClr val="tx2"/>
+                </a:solidFill>
+              </a:rPr>
+              <a:t>Top three companies that earn from </a:t>
+            </a:r>
+            <a:r>
+              <a:rPr lang="en-US" sz="2300" b="1" dirty="0" smtClean="0">
+                <a:solidFill>
+                  <a:schemeClr val="accent2">
+                    <a:lumMod val="75000"/>
+                  </a:schemeClr>
+                </a:solidFill>
+              </a:rPr>
+              <a:t>G</a:t>
+            </a:r>
+            <a:r>
+              <a:rPr lang="en-US" sz="2300" b="1" dirty="0" smtClean="0">
+                <a:solidFill>
+                  <a:srgbClr val="FF0000"/>
+                </a:solidFill>
+              </a:rPr>
+              <a:t>o</a:t>
+            </a:r>
+            <a:r>
+              <a:rPr lang="en-US" sz="2300" b="1" dirty="0" smtClean="0">
+                <a:solidFill>
+                  <a:schemeClr val="accent4"/>
+                </a:solidFill>
+              </a:rPr>
+              <a:t>o</a:t>
+            </a:r>
+            <a:r>
+              <a:rPr lang="en-US" sz="2300" b="1" dirty="0" smtClean="0">
+                <a:solidFill>
+                  <a:srgbClr val="1B79D7"/>
+                </a:solidFill>
+              </a:rPr>
+              <a:t>g</a:t>
+            </a:r>
+            <a:r>
+              <a:rPr lang="en-US" sz="2300" b="1" dirty="0" smtClean="0">
+                <a:solidFill>
+                  <a:srgbClr val="00B050"/>
+                </a:solidFill>
+              </a:rPr>
+              <a:t>l</a:t>
+            </a:r>
+            <a:r>
+              <a:rPr lang="en-US" sz="2300" b="1" dirty="0" smtClean="0">
+                <a:solidFill>
+                  <a:srgbClr val="ED483D"/>
+                </a:solidFill>
+              </a:rPr>
+              <a:t>e</a:t>
+            </a:r>
+            <a:r>
+              <a:rPr lang="en-US" sz="2000" dirty="0" smtClean="0">
+                <a:solidFill>
+                  <a:schemeClr val="tx2"/>
+                </a:solidFill>
+              </a:rPr>
+              <a:t> </a:t>
+            </a:r>
+            <a:r>
+              <a:rPr lang="en-US" sz="2300" dirty="0" smtClean="0">
+                <a:solidFill>
+                  <a:schemeClr val="tx2"/>
+                </a:solidFill>
+              </a:rPr>
+              <a:t>ad-</a:t>
+            </a:r>
+            <a:r>
+              <a:rPr lang="en-US" sz="2300" dirty="0" err="1" smtClean="0">
+                <a:solidFill>
+                  <a:schemeClr val="tx2"/>
+                </a:solidFill>
+              </a:rPr>
+              <a:t>sence</a:t>
+            </a:r>
+            <a:endParaRPr lang="en-US" sz="2300" dirty="0" smtClean="0">
+              <a:solidFill>
+                <a:schemeClr val="tx2"/>
+              </a:solidFill>
+            </a:endParaRPr>
+          </a:p>
+          <a:p>
+            <a:pPr marL="979805" lvl="2" indent="-339725">
+              <a:spcBef>
+                <a:spcPct val="55000"/>
+              </a:spcBef>
+              <a:spcAft>
+                <a:spcPct val="0"/>
+              </a:spcAft>
+              <a:buClr>
+                <a:srgbClr val="1B79D7"/>
+              </a:buClr>
+              <a:buFont typeface="Wingdings" pitchFamily="2" charset="2"/>
+              <a:buChar char="«"/>
+            </a:pPr>
+            <a:r>
+              <a:rPr lang="en-US" sz="2300" dirty="0" smtClean="0">
+                <a:solidFill>
+                  <a:schemeClr val="tx2"/>
+                </a:solidFill>
+              </a:rPr>
+              <a:t>Ehow.com :- </a:t>
+            </a:r>
+            <a:r>
+              <a:rPr lang="en-US" sz="2300" b="1" dirty="0" smtClean="0"/>
+              <a:t>$300,000/month</a:t>
+            </a:r>
+          </a:p>
+          <a:p>
+            <a:pPr marL="979805" lvl="2" indent="-339725">
+              <a:spcBef>
+                <a:spcPct val="55000"/>
+              </a:spcBef>
+              <a:spcAft>
+                <a:spcPct val="0"/>
+              </a:spcAft>
+              <a:buClr>
+                <a:srgbClr val="1B79D7"/>
+              </a:buClr>
+              <a:buFont typeface="Wingdings" pitchFamily="2" charset="2"/>
+              <a:buChar char="«"/>
+            </a:pPr>
+            <a:r>
+              <a:rPr lang="en-US" sz="2300" b="1" dirty="0" smtClean="0">
+                <a:solidFill>
+                  <a:schemeClr val="tx2"/>
+                </a:solidFill>
+              </a:rPr>
+              <a:t>Mashable.com: </a:t>
+            </a:r>
+            <a:r>
+              <a:rPr lang="en-US" sz="2300" b="1" dirty="0" smtClean="0"/>
+              <a:t>$250,000/month</a:t>
+            </a:r>
+            <a:endParaRPr lang="en-US" sz="2300" b="1" dirty="0" smtClean="0">
+              <a:solidFill>
+                <a:schemeClr val="tx2"/>
+              </a:solidFill>
+            </a:endParaRPr>
+          </a:p>
+          <a:p>
+            <a:pPr marL="979805" lvl="2" indent="-339725">
+              <a:spcBef>
+                <a:spcPct val="55000"/>
+              </a:spcBef>
+              <a:spcAft>
+                <a:spcPct val="0"/>
+              </a:spcAft>
+              <a:buClr>
+                <a:srgbClr val="1B79D7"/>
+              </a:buClr>
+              <a:buFont typeface="Wingdings" pitchFamily="2" charset="2"/>
+              <a:buChar char="«"/>
+            </a:pPr>
+            <a:r>
+              <a:rPr lang="en-US" sz="2300" dirty="0" smtClean="0"/>
+              <a:t>forums.digitalpoint.com</a:t>
+            </a:r>
+            <a:r>
+              <a:rPr lang="en-US" sz="2300" b="1" dirty="0" smtClean="0">
+                <a:solidFill>
+                  <a:schemeClr val="tx2"/>
+                </a:solidFill>
+              </a:rPr>
+              <a:t>: </a:t>
+            </a:r>
+            <a:r>
+              <a:rPr lang="en-US" sz="2300" b="1" dirty="0" smtClean="0"/>
+              <a:t>$195,000/month</a:t>
+            </a:r>
+          </a:p>
+          <a:p>
+            <a:pPr marL="339725" indent="-339725">
+              <a:spcBef>
+                <a:spcPct val="55000"/>
+              </a:spcBef>
+              <a:spcAft>
+                <a:spcPct val="0"/>
+              </a:spcAft>
+              <a:buClr>
+                <a:srgbClr val="1B79D7"/>
+              </a:buClr>
+              <a:buFont typeface="Wingdings" pitchFamily="2" charset="2"/>
+              <a:buChar char="«"/>
+            </a:pPr>
+            <a:r>
+              <a:rPr lang="en-US" sz="2300" b="1" dirty="0" smtClean="0">
+                <a:solidFill>
+                  <a:schemeClr val="accent2">
+                    <a:lumMod val="75000"/>
+                  </a:schemeClr>
+                </a:solidFill>
+              </a:rPr>
+              <a:t>G</a:t>
+            </a:r>
+            <a:r>
+              <a:rPr lang="en-US" sz="2300" b="1" dirty="0" smtClean="0">
+                <a:solidFill>
+                  <a:srgbClr val="FF0000"/>
+                </a:solidFill>
+              </a:rPr>
+              <a:t>o</a:t>
+            </a:r>
+            <a:r>
+              <a:rPr lang="en-US" sz="2300" b="1" dirty="0" smtClean="0">
+                <a:solidFill>
+                  <a:schemeClr val="accent4"/>
+                </a:solidFill>
+              </a:rPr>
+              <a:t>o</a:t>
+            </a:r>
+            <a:r>
+              <a:rPr lang="en-US" sz="2300" b="1" dirty="0" smtClean="0">
+                <a:solidFill>
+                  <a:srgbClr val="1B79D7"/>
+                </a:solidFill>
+              </a:rPr>
+              <a:t>g</a:t>
+            </a:r>
+            <a:r>
+              <a:rPr lang="en-US" sz="2300" b="1" dirty="0" smtClean="0">
+                <a:solidFill>
+                  <a:srgbClr val="00B050"/>
+                </a:solidFill>
+              </a:rPr>
+              <a:t>l</a:t>
+            </a:r>
+            <a:r>
+              <a:rPr lang="en-US" sz="2300" b="1" dirty="0" smtClean="0">
+                <a:solidFill>
+                  <a:srgbClr val="ED483D"/>
+                </a:solidFill>
+              </a:rPr>
+              <a:t>e </a:t>
+            </a:r>
+            <a:r>
+              <a:rPr lang="en-US" sz="2300" b="1" dirty="0" smtClean="0">
+                <a:solidFill>
+                  <a:schemeClr val="tx2"/>
+                </a:solidFill>
+              </a:rPr>
+              <a:t>You</a:t>
+            </a:r>
+            <a:r>
+              <a:rPr lang="en-US" sz="2300" b="1" dirty="0" smtClean="0">
+                <a:solidFill>
+                  <a:srgbClr val="FF0000"/>
+                </a:solidFill>
+              </a:rPr>
+              <a:t>Tube</a:t>
+            </a:r>
+            <a:r>
+              <a:rPr lang="en-US" sz="2300" b="1" dirty="0" smtClean="0">
+                <a:solidFill>
+                  <a:schemeClr val="tx2"/>
+                </a:solidFill>
+              </a:rPr>
+              <a:t> : </a:t>
+            </a:r>
+            <a:endParaRPr lang="en-US" sz="2300" dirty="0" smtClean="0">
+              <a:solidFill>
+                <a:schemeClr val="tx2"/>
+              </a:solidFill>
+            </a:endParaRPr>
+          </a:p>
+          <a:p>
+            <a:pPr marL="705485" lvl="1" indent="-339725">
+              <a:spcBef>
+                <a:spcPct val="55000"/>
+              </a:spcBef>
+              <a:spcAft>
+                <a:spcPct val="0"/>
+              </a:spcAft>
+              <a:buClr>
+                <a:srgbClr val="1B79D7"/>
+              </a:buClr>
+              <a:buFont typeface="Wingdings" pitchFamily="2" charset="2"/>
+              <a:buChar char="«"/>
+            </a:pPr>
+            <a:r>
+              <a:rPr lang="en-US" sz="2300" dirty="0" smtClean="0">
+                <a:solidFill>
+                  <a:schemeClr val="tx2"/>
+                </a:solidFill>
+              </a:rPr>
+              <a:t>Per day video views: 4B</a:t>
+            </a:r>
+          </a:p>
+          <a:p>
+            <a:pPr marL="705485" lvl="1" indent="-339725">
+              <a:spcBef>
+                <a:spcPct val="55000"/>
+              </a:spcBef>
+              <a:spcAft>
+                <a:spcPct val="0"/>
+              </a:spcAft>
+              <a:buClr>
+                <a:srgbClr val="1B79D7"/>
+              </a:buClr>
+              <a:buFont typeface="Wingdings" pitchFamily="2" charset="2"/>
+              <a:buChar char="«"/>
+            </a:pPr>
+            <a:r>
+              <a:rPr lang="en-US" sz="2300" dirty="0" smtClean="0">
+                <a:solidFill>
+                  <a:schemeClr val="tx2"/>
+                </a:solidFill>
+              </a:rPr>
+              <a:t>Per minute video upload: 300 hours</a:t>
+            </a:r>
+            <a:endParaRPr lang="en-US" dirty="0"/>
+          </a:p>
+        </p:txBody>
+      </p:sp>
+    </p:spTree>
+  </p:cSld>
+  <p:clrMapOvr>
+    <a:masterClrMapping/>
+  </p:clrMapOvr>
+  <p:timing>
+    <p:tnLst>
+      <p:par>
+        <p:cTn id="1" dur="indefinite" restart="never" nodeType="tmRoot"/>
+      </p:par>
+    </p:tnLst>
+  </p:timing>
+</p:sld>
+</file>
+
+<file path=ppt/slides/slide14.xml><?xml version="1.0" encoding="utf-8"?>
+<p:sld xmlns:a="http://schemas.openxmlformats.org/drawingml/2006/main" xmlns:r="http://schemas.openxmlformats.org/officeDocument/2006/relationships" xmlns:p="http://schemas.openxmlformats.org/presentationml/2006/main">
+  <p:cSld>
+    <p:spTree>
+      <p:nvGrpSpPr>
+        <p:cNvPr id="1" name=""/>
+        <p:cNvGrpSpPr/>
+        <p:nvPr/>
+      </p:nvGrpSpPr>
+      <p:grpSpPr>
+        <a:xfrm>
+          <a:off x="0" y="0"/>
+          <a:ext cx="0" cy="0"/>
+          <a:chOff x="0" y="0"/>
+          <a:chExt cx="0" cy="0"/>
+        </a:xfrm>
+      </p:grpSpPr>
+      <p:sp>
+        <p:nvSpPr>
+          <p:cNvPr id="3" name="Content Placeholder 2"/>
+          <p:cNvSpPr>
+            <a:spLocks noGrp="1"/>
+          </p:cNvSpPr>
+          <p:nvPr>
+            <p:ph sz="quarter" idx="1"/>
+          </p:nvPr>
+        </p:nvSpPr>
+        <p:spPr>
+          <a:xfrm>
+            <a:off x="457200" y="228600"/>
+            <a:ext cx="7467600" cy="6245352"/>
+          </a:xfrm>
+        </p:spPr>
+        <p:txBody>
+          <a:bodyPr/>
+          <a:lstStyle/>
+          <a:p>
+            <a:r>
+              <a:rPr lang="en-US" dirty="0" smtClean="0"/>
+              <a:t>Top companies by market capitalization (2015)</a:t>
+            </a:r>
+          </a:p>
+          <a:p>
+            <a:pPr>
+              <a:buNone/>
+            </a:pPr>
+            <a:endParaRPr lang="en-US" dirty="0"/>
+          </a:p>
+        </p:txBody>
+      </p:sp>
+      <p:pic>
+        <p:nvPicPr>
+          <p:cNvPr id="4" name="Picture 3" descr="• Top companies in the world by market value 2015   Statistic.png"/>
+          <p:cNvPicPr>
+            <a:picLocks noChangeAspect="1"/>
+          </p:cNvPicPr>
+          <p:nvPr/>
+        </p:nvPicPr>
+        <p:blipFill>
+          <a:blip r:embed="rId2"/>
+          <a:stretch>
+            <a:fillRect/>
+          </a:stretch>
+        </p:blipFill>
+        <p:spPr>
+          <a:xfrm>
+            <a:off x="76200" y="838200"/>
+            <a:ext cx="8763000" cy="4093243"/>
+          </a:xfrm>
+          <a:prstGeom prst="rect">
+            <a:avLst/>
+          </a:prstGeom>
+        </p:spPr>
+      </p:pic>
+      <p:pic>
+        <p:nvPicPr>
+          <p:cNvPr id="6" name="Picture 5" descr="• Top companies in the world by market value 2015   Statistic_footer.png"/>
+          <p:cNvPicPr>
+            <a:picLocks noChangeAspect="1"/>
+          </p:cNvPicPr>
+          <p:nvPr/>
+        </p:nvPicPr>
+        <p:blipFill>
+          <a:blip r:embed="rId3"/>
+          <a:stretch>
+            <a:fillRect/>
+          </a:stretch>
+        </p:blipFill>
+        <p:spPr>
+          <a:xfrm>
+            <a:off x="381000" y="5000625"/>
+            <a:ext cx="8324850" cy="485775"/>
+          </a:xfrm>
+          <a:prstGeom prst="rect">
+            <a:avLst/>
+          </a:prstGeom>
+        </p:spPr>
+      </p:pic>
+    </p:spTree>
+  </p:cSld>
+  <p:clrMapOvr>
+    <a:masterClrMapping/>
+  </p:clrMapOvr>
+  <p:timing>
+    <p:tnLst>
+      <p:par>
+        <p:cTn id="1" dur="indefinite" restart="never" nodeType="tmRoot"/>
+      </p:par>
+    </p:tnLst>
+  </p:timing>
+</p:sld>
+</file>
+
+<file path=ppt/slides/slide2.xml><?xml version="1.0" encoding="utf-8"?>
+<p:sld xmlns:a="http://schemas.openxmlformats.org/drawingml/2006/main" xmlns:r="http://schemas.openxmlformats.org/officeDocument/2006/relationships" xmlns:p="http://schemas.openxmlformats.org/presentationml/2006/main">
+  <p:cSld>
+    <p:spTree>
+      <p:nvGrpSpPr>
+        <p:cNvPr id="1" name=""/>
+        <p:cNvGrpSpPr/>
+        <p:nvPr/>
+      </p:nvGrpSpPr>
+      <p:grpSpPr>
+        <a:xfrm>
+          <a:off x="0" y="0"/>
+          <a:ext cx="0" cy="0"/>
+          <a:chOff x="0" y="0"/>
+          <a:chExt cx="0" cy="0"/>
+        </a:xfrm>
+      </p:grpSpPr>
+      <p:sp>
+        <p:nvSpPr>
+          <p:cNvPr id="2" name="Title 1"/>
+          <p:cNvSpPr>
+            <a:spLocks noGrp="1"/>
+          </p:cNvSpPr>
+          <p:nvPr>
+            <p:ph type="ctrTitle"/>
+          </p:nvPr>
+        </p:nvSpPr>
+        <p:spPr>
+          <a:xfrm>
+            <a:off x="2286000" y="1676400"/>
+            <a:ext cx="6172200" cy="1894362"/>
+          </a:xfrm>
+        </p:spPr>
+        <p:txBody>
+          <a:bodyPr/>
+          <a:lstStyle/>
+          <a:p>
+            <a:r>
+              <a:rPr lang="en-US" dirty="0" smtClean="0"/>
+              <a:t>About</a:t>
+            </a:r>
+            <a:r>
+              <a:rPr lang="en-US" dirty="0" smtClean="0"/>
+              <a:t>                        </a:t>
+            </a:r>
+            <a:endParaRPr lang="en-US" dirty="0"/>
+          </a:p>
+        </p:txBody>
+      </p:sp>
+      <p:sp>
+        <p:nvSpPr>
+          <p:cNvPr id="3" name="Subtitle 2"/>
+          <p:cNvSpPr>
+            <a:spLocks noGrp="1"/>
+          </p:cNvSpPr>
+          <p:nvPr>
+            <p:ph type="subTitle" idx="1"/>
+          </p:nvPr>
+        </p:nvSpPr>
+        <p:spPr>
+          <a:xfrm>
+            <a:off x="2286000" y="3555522"/>
+            <a:ext cx="6172200" cy="1371600"/>
+          </a:xfrm>
+        </p:spPr>
+        <p:txBody>
+          <a:bodyPr/>
+          <a:lstStyle/>
+          <a:p>
+            <a:endParaRPr lang="en-US" dirty="0"/>
+          </a:p>
+        </p:txBody>
+      </p:sp>
+      <p:pic>
+        <p:nvPicPr>
+          <p:cNvPr id="4" name="Picture 3" descr="logo11w.png"/>
+          <p:cNvPicPr>
+            <a:picLocks noChangeAspect="1"/>
+          </p:cNvPicPr>
+          <p:nvPr/>
+        </p:nvPicPr>
+        <p:blipFill>
+          <a:blip r:embed="rId2"/>
+          <a:stretch>
+            <a:fillRect/>
+          </a:stretch>
+        </p:blipFill>
+        <p:spPr>
+          <a:xfrm>
+            <a:off x="3810000" y="2819400"/>
+            <a:ext cx="2819400" cy="995699"/>
+          </a:xfrm>
+          <a:prstGeom prst="rect">
+            <a:avLst/>
+          </a:prstGeom>
+        </p:spPr>
+      </p:pic>
+    </p:spTree>
+  </p:cSld>
+  <p:clrMapOvr>
+    <a:masterClrMapping/>
+  </p:clrMapOvr>
+  <p:timing>
+    <p:tnLst>
+      <p:par>
+        <p:cTn id="1" dur="indefinite" restart="never" nodeType="tmRoot"/>
+      </p:par>
+    </p:tnLst>
+  </p:timing>
+</p:sld>
+</file>
+
+<file path=ppt/slides/slide3.xml><?xml version="1.0" encoding="utf-8"?>
+<p:sld xmlns:a="http://schemas.openxmlformats.org/drawingml/2006/main" xmlns:r="http://schemas.openxmlformats.org/officeDocument/2006/relationships" xmlns:p="http://schemas.openxmlformats.org/presentationml/2006/main">
+  <p:cSld>
+    <p:spTree>
+      <p:nvGrpSpPr>
+        <p:cNvPr id="1" name=""/>
+        <p:cNvGrpSpPr/>
+        <p:nvPr/>
+      </p:nvGrpSpPr>
+      <p:grpSpPr>
+        <a:xfrm>
+          <a:off x="0" y="0"/>
+          <a:ext cx="0" cy="0"/>
+          <a:chOff x="0" y="0"/>
+          <a:chExt cx="0" cy="0"/>
+        </a:xfrm>
+      </p:grpSpPr>
+      <p:sp>
+        <p:nvSpPr>
+          <p:cNvPr id="11" name="Title 10"/>
+          <p:cNvSpPr>
+            <a:spLocks noGrp="1"/>
+          </p:cNvSpPr>
+          <p:nvPr>
+            <p:ph type="title"/>
+          </p:nvPr>
+        </p:nvSpPr>
+        <p:spPr>
+          <a:xfrm>
+            <a:off x="457200" y="254170"/>
+            <a:ext cx="8274908" cy="736430"/>
+          </a:xfrm>
+        </p:spPr>
+        <p:txBody>
+          <a:bodyPr/>
+          <a:lstStyle/>
+          <a:p>
+            <a:r>
+              <a:rPr lang="en-US" sz="3200" b="1" dirty="0" smtClean="0">
+                <a:solidFill>
+                  <a:schemeClr val="tx1">
+                    <a:lumMod val="65000"/>
+                    <a:lumOff val="35000"/>
+                  </a:schemeClr>
+                </a:solidFill>
+              </a:rPr>
+              <a:t>How</a:t>
+            </a:r>
+            <a:r>
+              <a:rPr lang="en-US" sz="3200" b="1" dirty="0" smtClean="0">
+                <a:solidFill>
+                  <a:schemeClr val="accent2"/>
+                </a:solidFill>
+              </a:rPr>
+              <a:t> </a:t>
+            </a:r>
+            <a:r>
+              <a:rPr lang="en-US" sz="3200" b="1" dirty="0" smtClean="0">
+                <a:solidFill>
+                  <a:srgbClr val="1F74DB"/>
+                </a:solidFill>
+              </a:rPr>
+              <a:t>G</a:t>
+            </a:r>
+            <a:r>
+              <a:rPr lang="en-US" sz="3200" b="1" dirty="0" smtClean="0">
+                <a:solidFill>
+                  <a:srgbClr val="FF0000"/>
+                </a:solidFill>
+              </a:rPr>
+              <a:t>o</a:t>
+            </a:r>
+            <a:r>
+              <a:rPr lang="en-US" sz="3200" b="1" dirty="0" smtClean="0">
+                <a:solidFill>
+                  <a:schemeClr val="accent4"/>
+                </a:solidFill>
+              </a:rPr>
+              <a:t>o</a:t>
+            </a:r>
+            <a:r>
+              <a:rPr lang="en-US" sz="3200" b="1" dirty="0" smtClean="0">
+                <a:solidFill>
+                  <a:srgbClr val="1B79D7"/>
+                </a:solidFill>
+              </a:rPr>
+              <a:t>g</a:t>
+            </a:r>
+            <a:r>
+              <a:rPr lang="en-US" sz="3200" b="1" dirty="0" smtClean="0">
+                <a:solidFill>
+                  <a:srgbClr val="009900"/>
+                </a:solidFill>
+              </a:rPr>
+              <a:t>l</a:t>
+            </a:r>
+            <a:r>
+              <a:rPr lang="en-US" sz="3200" b="1" dirty="0" smtClean="0">
+                <a:solidFill>
+                  <a:srgbClr val="ED483D"/>
+                </a:solidFill>
+              </a:rPr>
+              <a:t>e </a:t>
+            </a:r>
+            <a:r>
+              <a:rPr lang="en-US" sz="3200" b="1" dirty="0" smtClean="0">
+                <a:solidFill>
+                  <a:schemeClr val="tx1">
+                    <a:lumMod val="65000"/>
+                    <a:lumOff val="35000"/>
+                  </a:schemeClr>
+                </a:solidFill>
+              </a:rPr>
+              <a:t>Start</a:t>
+            </a:r>
+            <a:endParaRPr lang="en-US" dirty="0">
+              <a:solidFill>
+                <a:schemeClr val="tx1">
+                  <a:lumMod val="65000"/>
+                  <a:lumOff val="35000"/>
+                </a:schemeClr>
+              </a:solidFill>
+            </a:endParaRPr>
+          </a:p>
+        </p:txBody>
+      </p:sp>
+      <p:sp>
+        <p:nvSpPr>
+          <p:cNvPr id="4" name="Content Placeholder 3"/>
+          <p:cNvSpPr>
+            <a:spLocks noGrp="1"/>
+          </p:cNvSpPr>
+          <p:nvPr>
+            <p:ph sz="quarter" idx="1"/>
+          </p:nvPr>
+        </p:nvSpPr>
+        <p:spPr>
+          <a:xfrm>
+            <a:off x="228600" y="990600"/>
+            <a:ext cx="8382000" cy="5483352"/>
+          </a:xfrm>
+        </p:spPr>
+        <p:txBody>
+          <a:bodyPr/>
+          <a:lstStyle/>
+          <a:p>
+            <a:r>
+              <a:rPr lang="en-US" dirty="0" err="1" smtClean="0"/>
+              <a:t>Goole</a:t>
+            </a:r>
+            <a:r>
+              <a:rPr lang="en-US" dirty="0" smtClean="0"/>
+              <a:t> began in march 1995 as a research project of two PHD students Larry Page and Sergey </a:t>
+            </a:r>
+            <a:r>
+              <a:rPr lang="en-US" dirty="0" err="1" smtClean="0"/>
+              <a:t>Brin</a:t>
+            </a:r>
+            <a:r>
+              <a:rPr lang="en-US" dirty="0" smtClean="0"/>
+              <a:t>.</a:t>
+            </a:r>
+          </a:p>
+          <a:p>
+            <a:r>
+              <a:rPr lang="en-US" dirty="0" smtClean="0"/>
+              <a:t>Nick name of his project was “</a:t>
+            </a:r>
+            <a:r>
+              <a:rPr lang="en-US" dirty="0" err="1" smtClean="0"/>
+              <a:t>BackRub</a:t>
+            </a:r>
+            <a:r>
+              <a:rPr lang="en-US" dirty="0" smtClean="0"/>
+              <a:t>”</a:t>
+            </a:r>
+          </a:p>
+          <a:p>
+            <a:r>
+              <a:rPr lang="en-US" dirty="0" smtClean="0"/>
+              <a:t>Larry and Sergey use Page Rank algorithm in Google for display search result.</a:t>
+            </a:r>
+          </a:p>
+          <a:p>
+            <a:r>
+              <a:rPr lang="en-US" dirty="0" smtClean="0"/>
+              <a:t>Domain Google.com registered in Sept. 15, 1997.</a:t>
+            </a:r>
+          </a:p>
+          <a:p>
+            <a:r>
+              <a:rPr lang="en-US" dirty="0" smtClean="0"/>
+              <a:t>Larry and Sergey formally </a:t>
+            </a:r>
+            <a:r>
+              <a:rPr lang="en-US" dirty="0" smtClean="0"/>
+              <a:t>incorporated their company, </a:t>
+            </a:r>
+            <a:r>
+              <a:rPr lang="en-US" i="1" dirty="0" smtClean="0"/>
+              <a:t>Google</a:t>
+            </a:r>
+            <a:r>
+              <a:rPr lang="en-US" dirty="0" smtClean="0"/>
+              <a:t>, on September 4, 1998 at a </a:t>
+            </a:r>
+            <a:r>
+              <a:rPr lang="en-US" dirty="0" smtClean="0"/>
+              <a:t>friend's garage </a:t>
+            </a:r>
+            <a:r>
+              <a:rPr lang="en-US" dirty="0" smtClean="0"/>
+              <a:t>in </a:t>
+            </a:r>
+            <a:r>
+              <a:rPr lang="en-US" dirty="0" smtClean="0"/>
+              <a:t>Menlo </a:t>
+            </a:r>
+            <a:r>
+              <a:rPr lang="en-US" dirty="0" err="1" smtClean="0"/>
+              <a:t>Park,California</a:t>
+            </a:r>
+            <a:r>
+              <a:rPr lang="en-US" dirty="0" smtClean="0"/>
+              <a:t>.</a:t>
+            </a:r>
+          </a:p>
+          <a:p>
+            <a:r>
+              <a:rPr lang="en-US" dirty="0" smtClean="0"/>
+              <a:t>Today Google have 70 offices in more than 40 countries and 4 offices are in India (</a:t>
+            </a:r>
+            <a:r>
+              <a:rPr lang="en-US" dirty="0" err="1" smtClean="0"/>
+              <a:t>Gurgaon</a:t>
+            </a:r>
+            <a:r>
+              <a:rPr lang="en-US" dirty="0" smtClean="0"/>
+              <a:t>, Mumbai, Bangalore, Hyderabad)</a:t>
+            </a:r>
+          </a:p>
+          <a:p>
+            <a:pPr>
+              <a:buNone/>
+            </a:pPr>
+            <a:endParaRPr lang="en-US" dirty="0"/>
+          </a:p>
+        </p:txBody>
+      </p:sp>
+    </p:spTree>
+  </p:cSld>
+  <p:clrMapOvr>
+    <a:masterClrMapping/>
+  </p:clrMapOvr>
+  <p:timing>
+    <p:tnLst>
+      <p:par>
+        <p:cTn id="1" dur="indefinite" restart="never" nodeType="tmRoot"/>
+      </p:par>
+    </p:tnLst>
+  </p:timing>
+</p:sld>
+</file>
+
+<file path=ppt/slides/slide4.xml><?xml version="1.0" encoding="utf-8"?>
+<p:sld xmlns:a="http://schemas.openxmlformats.org/drawingml/2006/main" xmlns:r="http://schemas.openxmlformats.org/officeDocument/2006/relationships" xmlns:p="http://schemas.openxmlformats.org/presentationml/2006/main">
+  <p:cSld>
+    <p:spTree>
+      <p:nvGrpSpPr>
+        <p:cNvPr id="1" name=""/>
+        <p:cNvGrpSpPr/>
+        <p:nvPr/>
+      </p:nvGrpSpPr>
+      <p:grpSpPr>
+        <a:xfrm>
+          <a:off x="0" y="0"/>
+          <a:ext cx="0" cy="0"/>
+          <a:chOff x="0" y="0"/>
+          <a:chExt cx="0" cy="0"/>
+        </a:xfrm>
+      </p:grpSpPr>
+      <p:sp>
+        <p:nvSpPr>
+          <p:cNvPr id="11" name="Title 10"/>
+          <p:cNvSpPr>
+            <a:spLocks noGrp="1"/>
+          </p:cNvSpPr>
+          <p:nvPr>
+            <p:ph type="title"/>
+          </p:nvPr>
+        </p:nvSpPr>
+        <p:spPr>
+          <a:xfrm>
+            <a:off x="457200" y="254170"/>
+            <a:ext cx="8274908" cy="736430"/>
+          </a:xfrm>
+        </p:spPr>
+        <p:txBody>
+          <a:bodyPr/>
+          <a:lstStyle/>
+          <a:p>
+            <a:r>
+              <a:rPr lang="en-US" sz="3200" b="1" dirty="0" smtClean="0">
+                <a:solidFill>
+                  <a:schemeClr val="tx1">
+                    <a:lumMod val="65000"/>
+                    <a:lumOff val="35000"/>
+                  </a:schemeClr>
+                </a:solidFill>
+              </a:rPr>
+              <a:t>How</a:t>
+            </a:r>
+            <a:r>
+              <a:rPr lang="en-US" sz="3200" b="1" dirty="0" smtClean="0">
+                <a:solidFill>
+                  <a:schemeClr val="accent2"/>
+                </a:solidFill>
+              </a:rPr>
+              <a:t> </a:t>
+            </a:r>
+            <a:r>
+              <a:rPr lang="en-US" sz="3200" b="1" dirty="0" smtClean="0">
+                <a:solidFill>
+                  <a:srgbClr val="1F74DB"/>
+                </a:solidFill>
+              </a:rPr>
+              <a:t>G</a:t>
+            </a:r>
+            <a:r>
+              <a:rPr lang="en-US" sz="3200" b="1" dirty="0" smtClean="0">
+                <a:solidFill>
+                  <a:srgbClr val="FF0000"/>
+                </a:solidFill>
+              </a:rPr>
+              <a:t>o</a:t>
+            </a:r>
+            <a:r>
+              <a:rPr lang="en-US" sz="3200" b="1" dirty="0" smtClean="0">
+                <a:solidFill>
+                  <a:schemeClr val="accent4"/>
+                </a:solidFill>
+              </a:rPr>
+              <a:t>o</a:t>
+            </a:r>
+            <a:r>
+              <a:rPr lang="en-US" sz="3200" b="1" dirty="0" smtClean="0">
+                <a:solidFill>
+                  <a:srgbClr val="1B79D7"/>
+                </a:solidFill>
+              </a:rPr>
+              <a:t>g</a:t>
+            </a:r>
+            <a:r>
+              <a:rPr lang="en-US" sz="3200" b="1" dirty="0" smtClean="0">
+                <a:solidFill>
+                  <a:srgbClr val="009900"/>
+                </a:solidFill>
+              </a:rPr>
+              <a:t>l</a:t>
+            </a:r>
+            <a:r>
+              <a:rPr lang="en-US" sz="3200" b="1" dirty="0" smtClean="0">
+                <a:solidFill>
+                  <a:srgbClr val="ED483D"/>
+                </a:solidFill>
+              </a:rPr>
+              <a:t>e </a:t>
+            </a:r>
+            <a:r>
+              <a:rPr lang="en-US" sz="3200" b="1" dirty="0" smtClean="0">
+                <a:solidFill>
+                  <a:schemeClr val="tx1">
+                    <a:lumMod val="65000"/>
+                    <a:lumOff val="35000"/>
+                  </a:schemeClr>
+                </a:solidFill>
+              </a:rPr>
+              <a:t>Start</a:t>
+            </a:r>
+            <a:endParaRPr lang="en-US" dirty="0">
+              <a:solidFill>
+                <a:schemeClr val="tx1">
+                  <a:lumMod val="65000"/>
+                  <a:lumOff val="35000"/>
+                </a:schemeClr>
+              </a:solidFill>
+            </a:endParaRPr>
+          </a:p>
+        </p:txBody>
+      </p:sp>
+      <p:sp>
+        <p:nvSpPr>
+          <p:cNvPr id="7" name="Content Placeholder 6"/>
+          <p:cNvSpPr>
+            <a:spLocks noGrp="1"/>
+          </p:cNvSpPr>
+          <p:nvPr>
+            <p:ph sz="quarter" idx="1"/>
+          </p:nvPr>
+        </p:nvSpPr>
+        <p:spPr>
+          <a:xfrm>
+            <a:off x="152400" y="990600"/>
+            <a:ext cx="8610600" cy="5483352"/>
+          </a:xfrm>
+        </p:spPr>
+        <p:txBody>
+          <a:bodyPr/>
+          <a:lstStyle/>
+          <a:p>
+            <a:pPr>
+              <a:buNone/>
+            </a:pPr>
+            <a:r>
+              <a:rPr lang="en-US" dirty="0" smtClean="0">
+                <a:solidFill>
+                  <a:schemeClr val="tx1">
+                    <a:lumMod val="65000"/>
+                    <a:lumOff val="35000"/>
+                  </a:schemeClr>
+                </a:solidFill>
+              </a:rPr>
+              <a:t>    Google </a:t>
+            </a:r>
+            <a:r>
+              <a:rPr lang="en-US" dirty="0" smtClean="0">
+                <a:solidFill>
+                  <a:schemeClr val="tx1">
+                    <a:lumMod val="65000"/>
+                    <a:lumOff val="35000"/>
+                  </a:schemeClr>
+                </a:solidFill>
+              </a:rPr>
+              <a:t>First office</a:t>
+            </a:r>
+          </a:p>
+          <a:p>
+            <a:pPr>
+              <a:buNone/>
+            </a:pPr>
+            <a:endParaRPr lang="en-US" dirty="0"/>
+          </a:p>
+        </p:txBody>
+      </p:sp>
+      <p:pic>
+        <p:nvPicPr>
+          <p:cNvPr id="8" name="Picture 7" descr="google-garage-stanford.png"/>
+          <p:cNvPicPr>
+            <a:picLocks noChangeAspect="1"/>
+          </p:cNvPicPr>
+          <p:nvPr/>
+        </p:nvPicPr>
+        <p:blipFill>
+          <a:blip r:embed="rId2"/>
+          <a:stretch>
+            <a:fillRect/>
+          </a:stretch>
+        </p:blipFill>
+        <p:spPr>
+          <a:xfrm>
+            <a:off x="213600" y="1447800"/>
+            <a:ext cx="8549400" cy="5181600"/>
+          </a:xfrm>
+          <a:prstGeom prst="rect">
+            <a:avLst/>
+          </a:prstGeom>
+        </p:spPr>
+      </p:pic>
+    </p:spTree>
+  </p:cSld>
+  <p:clrMapOvr>
+    <a:masterClrMapping/>
+  </p:clrMapOvr>
+  <p:timing>
+    <p:tnLst>
+      <p:par>
+        <p:cTn id="1" dur="indefinite" restart="never" nodeType="tmRoot"/>
+      </p:par>
+    </p:tnLst>
+  </p:timing>
+</p:sld>
+</file>
+
+<file path=ppt/slides/slide5.xml><?xml version="1.0" encoding="utf-8"?>
+<p:sld xmlns:a="http://schemas.openxmlformats.org/drawingml/2006/main" xmlns:r="http://schemas.openxmlformats.org/officeDocument/2006/relationships" xmlns:p="http://schemas.openxmlformats.org/presentationml/2006/main">
+  <p:cSld>
+    <p:spTree>
+      <p:nvGrpSpPr>
+        <p:cNvPr id="1" name=""/>
+        <p:cNvGrpSpPr/>
+        <p:nvPr/>
+      </p:nvGrpSpPr>
+      <p:grpSpPr>
+        <a:xfrm>
+          <a:off x="0" y="0"/>
+          <a:ext cx="0" cy="0"/>
+          <a:chOff x="0" y="0"/>
+          <a:chExt cx="0" cy="0"/>
+        </a:xfrm>
+      </p:grpSpPr>
+      <p:sp>
+        <p:nvSpPr>
+          <p:cNvPr id="11" name="Title 10"/>
+          <p:cNvSpPr>
+            <a:spLocks noGrp="1"/>
+          </p:cNvSpPr>
+          <p:nvPr>
+            <p:ph type="title"/>
+          </p:nvPr>
+        </p:nvSpPr>
+        <p:spPr>
+          <a:xfrm>
+            <a:off x="457200" y="254170"/>
+            <a:ext cx="8274908" cy="736430"/>
+          </a:xfrm>
+        </p:spPr>
+        <p:txBody>
+          <a:bodyPr/>
+          <a:lstStyle/>
+          <a:p>
+            <a:r>
+              <a:rPr lang="en-US" sz="3200" b="1" dirty="0" smtClean="0">
+                <a:solidFill>
+                  <a:schemeClr val="tx1">
+                    <a:lumMod val="65000"/>
+                    <a:lumOff val="35000"/>
+                  </a:schemeClr>
+                </a:solidFill>
+              </a:rPr>
+              <a:t>How</a:t>
+            </a:r>
+            <a:r>
+              <a:rPr lang="en-US" sz="3200" b="1" dirty="0" smtClean="0">
+                <a:solidFill>
+                  <a:schemeClr val="accent2"/>
+                </a:solidFill>
+              </a:rPr>
+              <a:t> </a:t>
+            </a:r>
+            <a:r>
+              <a:rPr lang="en-US" sz="3200" b="1" dirty="0" smtClean="0">
+                <a:solidFill>
+                  <a:srgbClr val="1F74DB"/>
+                </a:solidFill>
+              </a:rPr>
+              <a:t>G</a:t>
+            </a:r>
+            <a:r>
+              <a:rPr lang="en-US" sz="3200" b="1" dirty="0" smtClean="0">
+                <a:solidFill>
+                  <a:srgbClr val="FF0000"/>
+                </a:solidFill>
+              </a:rPr>
+              <a:t>o</a:t>
+            </a:r>
+            <a:r>
+              <a:rPr lang="en-US" sz="3200" b="1" dirty="0" smtClean="0">
+                <a:solidFill>
+                  <a:schemeClr val="accent4"/>
+                </a:solidFill>
+              </a:rPr>
+              <a:t>o</a:t>
+            </a:r>
+            <a:r>
+              <a:rPr lang="en-US" sz="3200" b="1" dirty="0" smtClean="0">
+                <a:solidFill>
+                  <a:srgbClr val="1B79D7"/>
+                </a:solidFill>
+              </a:rPr>
+              <a:t>g</a:t>
+            </a:r>
+            <a:r>
+              <a:rPr lang="en-US" sz="3200" b="1" dirty="0" smtClean="0">
+                <a:solidFill>
+                  <a:srgbClr val="009900"/>
+                </a:solidFill>
+              </a:rPr>
+              <a:t>l</a:t>
+            </a:r>
+            <a:r>
+              <a:rPr lang="en-US" sz="3200" b="1" dirty="0" smtClean="0">
+                <a:solidFill>
+                  <a:srgbClr val="ED483D"/>
+                </a:solidFill>
+              </a:rPr>
+              <a:t>e </a:t>
+            </a:r>
+            <a:r>
+              <a:rPr lang="en-US" sz="3200" b="1" dirty="0" smtClean="0">
+                <a:solidFill>
+                  <a:schemeClr val="tx1">
+                    <a:lumMod val="65000"/>
+                    <a:lumOff val="35000"/>
+                  </a:schemeClr>
+                </a:solidFill>
+              </a:rPr>
+              <a:t>Start</a:t>
+            </a:r>
+            <a:endParaRPr lang="en-US" dirty="0">
+              <a:solidFill>
+                <a:schemeClr val="tx1">
+                  <a:lumMod val="65000"/>
+                  <a:lumOff val="35000"/>
+                </a:schemeClr>
+              </a:solidFill>
+            </a:endParaRPr>
+          </a:p>
+        </p:txBody>
+      </p:sp>
+      <p:sp>
+        <p:nvSpPr>
+          <p:cNvPr id="7" name="Content Placeholder 6"/>
+          <p:cNvSpPr>
+            <a:spLocks noGrp="1"/>
+          </p:cNvSpPr>
+          <p:nvPr>
+            <p:ph sz="quarter" idx="1"/>
+          </p:nvPr>
+        </p:nvSpPr>
+        <p:spPr>
+          <a:xfrm>
+            <a:off x="152400" y="990600"/>
+            <a:ext cx="8610600" cy="5483352"/>
+          </a:xfrm>
+        </p:spPr>
+        <p:txBody>
+          <a:bodyPr/>
+          <a:lstStyle/>
+          <a:p>
+            <a:pPr>
+              <a:buNone/>
+            </a:pPr>
+            <a:r>
+              <a:rPr lang="en-US" dirty="0" smtClean="0">
+                <a:solidFill>
+                  <a:schemeClr val="tx1">
+                    <a:lumMod val="65000"/>
+                    <a:lumOff val="35000"/>
+                  </a:schemeClr>
+                </a:solidFill>
+              </a:rPr>
+              <a:t>    Google </a:t>
+            </a:r>
+            <a:r>
+              <a:rPr lang="en-US" dirty="0" smtClean="0">
+                <a:solidFill>
+                  <a:schemeClr val="tx1">
+                    <a:lumMod val="65000"/>
+                    <a:lumOff val="35000"/>
+                  </a:schemeClr>
+                </a:solidFill>
+              </a:rPr>
+              <a:t>First office</a:t>
+            </a:r>
+          </a:p>
+          <a:p>
+            <a:pPr>
+              <a:buNone/>
+            </a:pPr>
+            <a:endParaRPr lang="en-US" dirty="0"/>
+          </a:p>
+        </p:txBody>
+      </p:sp>
+      <p:pic>
+        <p:nvPicPr>
+          <p:cNvPr id="8" name="Picture 7" descr="google-garage-stanford.png"/>
+          <p:cNvPicPr>
+            <a:picLocks noChangeAspect="1"/>
+          </p:cNvPicPr>
+          <p:nvPr/>
+        </p:nvPicPr>
+        <p:blipFill>
+          <a:blip r:embed="rId2"/>
+          <a:stretch>
+            <a:fillRect/>
+          </a:stretch>
+        </p:blipFill>
+        <p:spPr>
+          <a:xfrm>
+            <a:off x="152400" y="1447800"/>
+            <a:ext cx="8610600" cy="5410200"/>
+          </a:xfrm>
+          <a:prstGeom prst="rect">
+            <a:avLst/>
+          </a:prstGeom>
+        </p:spPr>
+      </p:pic>
+    </p:spTree>
+  </p:cSld>
+  <p:clrMapOvr>
+    <a:masterClrMapping/>
+  </p:clrMapOvr>
+  <p:timing>
+    <p:tnLst>
+      <p:par>
+        <p:cTn id="1" dur="indefinite" restart="never" nodeType="tmRoot"/>
+      </p:par>
+    </p:tnLst>
+  </p:timing>
+</p:sld>
+</file>
+
+<file path=ppt/slides/slide6.xml><?xml version="1.0" encoding="utf-8"?>
+<p:sld xmlns:a="http://schemas.openxmlformats.org/drawingml/2006/main" xmlns:r="http://schemas.openxmlformats.org/officeDocument/2006/relationships" xmlns:p="http://schemas.openxmlformats.org/presentationml/2006/main">
+  <p:cSld>
+    <p:spTree>
+      <p:nvGrpSpPr>
+        <p:cNvPr id="1" name=""/>
+        <p:cNvGrpSpPr/>
+        <p:nvPr/>
+      </p:nvGrpSpPr>
+      <p:grpSpPr>
+        <a:xfrm>
+          <a:off x="0" y="0"/>
+          <a:ext cx="0" cy="0"/>
+          <a:chOff x="0" y="0"/>
+          <a:chExt cx="0" cy="0"/>
+        </a:xfrm>
+      </p:grpSpPr>
+      <p:sp>
+        <p:nvSpPr>
+          <p:cNvPr id="11" name="Title 10"/>
+          <p:cNvSpPr>
+            <a:spLocks noGrp="1"/>
+          </p:cNvSpPr>
+          <p:nvPr>
+            <p:ph type="title"/>
+          </p:nvPr>
+        </p:nvSpPr>
+        <p:spPr>
+          <a:xfrm>
+            <a:off x="152400" y="254170"/>
+            <a:ext cx="8579708" cy="736430"/>
+          </a:xfrm>
+        </p:spPr>
+        <p:txBody>
+          <a:bodyPr>
+            <a:normAutofit fontScale="90000"/>
+          </a:bodyPr>
+          <a:lstStyle/>
+          <a:p>
+            <a:r>
+              <a:rPr lang="en-US" sz="3200" b="1" dirty="0" smtClean="0">
+                <a:solidFill>
+                  <a:srgbClr val="1F74DB"/>
+                </a:solidFill>
+              </a:rPr>
+              <a:t>G</a:t>
+            </a:r>
+            <a:r>
+              <a:rPr lang="en-US" sz="3200" b="1" dirty="0" smtClean="0">
+                <a:solidFill>
+                  <a:srgbClr val="FF0000"/>
+                </a:solidFill>
+              </a:rPr>
+              <a:t>o</a:t>
+            </a:r>
+            <a:r>
+              <a:rPr lang="en-US" sz="3200" b="1" dirty="0" smtClean="0">
+                <a:solidFill>
+                  <a:schemeClr val="accent4"/>
+                </a:solidFill>
+              </a:rPr>
+              <a:t>o</a:t>
+            </a:r>
+            <a:r>
+              <a:rPr lang="en-US" sz="3200" b="1" dirty="0" smtClean="0">
+                <a:solidFill>
+                  <a:srgbClr val="1B79D7"/>
+                </a:solidFill>
+              </a:rPr>
+              <a:t>g</a:t>
+            </a:r>
+            <a:r>
+              <a:rPr lang="en-US" sz="3200" b="1" dirty="0" smtClean="0">
+                <a:solidFill>
+                  <a:srgbClr val="009900"/>
+                </a:solidFill>
+              </a:rPr>
+              <a:t>l</a:t>
+            </a:r>
+            <a:r>
+              <a:rPr lang="en-US" sz="3200" b="1" dirty="0" smtClean="0">
+                <a:solidFill>
+                  <a:srgbClr val="ED483D"/>
+                </a:solidFill>
+              </a:rPr>
+              <a:t>e </a:t>
+            </a:r>
+            <a:r>
+              <a:rPr lang="en-US" dirty="0" smtClean="0">
+                <a:solidFill>
+                  <a:schemeClr val="tx1">
+                    <a:lumMod val="65000"/>
+                    <a:lumOff val="35000"/>
+                  </a:schemeClr>
+                </a:solidFill>
+              </a:rPr>
+              <a:t>Current Head Quarters in California</a:t>
+            </a:r>
+            <a:endParaRPr lang="en-US" dirty="0">
+              <a:solidFill>
+                <a:schemeClr val="tx1">
+                  <a:lumMod val="65000"/>
+                  <a:lumOff val="35000"/>
+                </a:schemeClr>
+              </a:solidFill>
+            </a:endParaRPr>
+          </a:p>
+        </p:txBody>
+      </p:sp>
+      <p:sp>
+        <p:nvSpPr>
+          <p:cNvPr id="7" name="Content Placeholder 6"/>
+          <p:cNvSpPr>
+            <a:spLocks noGrp="1"/>
+          </p:cNvSpPr>
+          <p:nvPr>
+            <p:ph sz="quarter" idx="1"/>
+          </p:nvPr>
+        </p:nvSpPr>
+        <p:spPr>
+          <a:xfrm>
+            <a:off x="152400" y="990600"/>
+            <a:ext cx="8610600" cy="5483352"/>
+          </a:xfrm>
+        </p:spPr>
+        <p:txBody>
+          <a:bodyPr/>
+          <a:lstStyle/>
+          <a:p>
+            <a:pPr>
+              <a:buNone/>
+            </a:pPr>
+            <a:r>
+              <a:rPr lang="en-US" dirty="0" smtClean="0">
+                <a:solidFill>
+                  <a:schemeClr val="tx1">
+                    <a:lumMod val="65000"/>
+                    <a:lumOff val="35000"/>
+                  </a:schemeClr>
+                </a:solidFill>
+              </a:rPr>
+              <a:t>    </a:t>
+            </a:r>
+            <a:endParaRPr lang="en-US" dirty="0" smtClean="0">
+              <a:solidFill>
+                <a:schemeClr val="tx1">
+                  <a:lumMod val="65000"/>
+                  <a:lumOff val="35000"/>
+                </a:schemeClr>
+              </a:solidFill>
+            </a:endParaRPr>
+          </a:p>
+          <a:p>
+            <a:pPr>
+              <a:buNone/>
+            </a:pPr>
+            <a:endParaRPr lang="en-US" dirty="0"/>
+          </a:p>
+        </p:txBody>
+      </p:sp>
+      <p:pic>
+        <p:nvPicPr>
+          <p:cNvPr id="8" name="Picture 7" descr="google-garage-stanford.png"/>
+          <p:cNvPicPr>
+            <a:picLocks noChangeAspect="1"/>
+          </p:cNvPicPr>
+          <p:nvPr/>
+        </p:nvPicPr>
+        <p:blipFill>
+          <a:blip r:embed="rId2"/>
+          <a:stretch>
+            <a:fillRect/>
+          </a:stretch>
+        </p:blipFill>
+        <p:spPr>
+          <a:xfrm>
+            <a:off x="152400" y="990600"/>
+            <a:ext cx="8610600" cy="5836967"/>
+          </a:xfrm>
+          <a:prstGeom prst="rect">
+            <a:avLst/>
+          </a:prstGeom>
+        </p:spPr>
+      </p:pic>
+    </p:spTree>
+  </p:cSld>
+  <p:clrMapOvr>
+    <a:masterClrMapping/>
+  </p:clrMapOvr>
+  <p:timing>
+    <p:tnLst>
+      <p:par>
+        <p:cTn id="1" dur="indefinite" restart="never" nodeType="tmRoot"/>
+      </p:par>
+    </p:tnLst>
+  </p:timing>
+</p:sld>
+</file>
+
 <file path=ppt/slides/slide7.xml><?xml version="1.0" encoding="utf-8"?>
 <p:sld xmlns:a="http://schemas.openxmlformats.org/drawingml/2006/main" xmlns:r="http://schemas.openxmlformats.org/officeDocument/2006/relationships" xmlns:p="http://schemas.openxmlformats.org/presentationml/2006/main">
   <p:cSld>
@@ -6946,103 +8645,89 @@
         </p:nvSpPr>
         <p:spPr>
           <a:xfrm>
-            <a:off x="457200" y="274638"/>
-            <a:ext cx="7467600" cy="715962"/>
+            <a:off x="228600" y="254170"/>
+            <a:ext cx="8503508" cy="736430"/>
           </a:xfrm>
         </p:spPr>
         <p:txBody>
           <a:bodyPr>
-            <a:normAutofit/>
+            <a:normAutofit fontScale="90000"/>
           </a:bodyPr>
           <a:lstStyle/>
           <a:p>
             <a:r>
-              <a:rPr lang="en-AU" sz="2400" b="1" dirty="0" smtClean="0">
+              <a:rPr lang="en-US" sz="3200" b="1" dirty="0" smtClean="0">
+                <a:solidFill>
+                  <a:srgbClr val="1F74DB"/>
+                </a:solidFill>
+              </a:rPr>
+              <a:t>G</a:t>
+            </a:r>
+            <a:r>
+              <a:rPr lang="en-US" sz="3200" b="1" dirty="0" smtClean="0">
+                <a:solidFill>
+                  <a:srgbClr val="FF0000"/>
+                </a:solidFill>
+              </a:rPr>
+              <a:t>o</a:t>
+            </a:r>
+            <a:r>
+              <a:rPr lang="en-US" sz="3200" b="1" dirty="0" smtClean="0">
+                <a:solidFill>
+                  <a:schemeClr val="accent4"/>
+                </a:solidFill>
+              </a:rPr>
+              <a:t>o</a:t>
+            </a:r>
+            <a:r>
+              <a:rPr lang="en-US" sz="3200" b="1" dirty="0" smtClean="0">
                 <a:solidFill>
                   <a:srgbClr val="1B79D7"/>
                 </a:solidFill>
               </a:rPr>
-              <a:t>Some Interesting</a:t>
-            </a:r>
-            <a:r>
-              <a:rPr lang="en-AU" sz="3200" b="1" dirty="0" smtClean="0">
-                <a:solidFill>
-                  <a:srgbClr val="1B79D7"/>
-                </a:solidFill>
-              </a:rPr>
-              <a:t> </a:t>
+              <a:t>g</a:t>
             </a:r>
             <a:r>
               <a:rPr lang="en-US" sz="3200" b="1" dirty="0" smtClean="0">
                 <a:solidFill>
-                  <a:schemeClr val="accent2"/>
-                </a:solidFill>
-              </a:rPr>
-              <a:t>G</a:t>
+                  <a:srgbClr val="009900"/>
+                </a:solidFill>
+              </a:rPr>
+              <a:t>l</a:t>
             </a:r>
             <a:r>
               <a:rPr lang="en-US" sz="3200" b="1" dirty="0" smtClean="0">
                 <a:solidFill>
-                  <a:srgbClr val="FF0000"/>
-                </a:solidFill>
-              </a:rPr>
-              <a:t>o</a:t>
-            </a:r>
-            <a:r>
-              <a:rPr lang="en-US" sz="3200" b="1" dirty="0" smtClean="0">
-                <a:solidFill>
-                  <a:srgbClr val="FFF529"/>
-                </a:solidFill>
-              </a:rPr>
-              <a:t>o</a:t>
-            </a:r>
-            <a:r>
-              <a:rPr lang="en-US" sz="3200" b="1" dirty="0" smtClean="0">
-                <a:solidFill>
-                  <a:srgbClr val="1B79D7"/>
-                </a:solidFill>
-              </a:rPr>
-              <a:t>g</a:t>
-            </a:r>
-            <a:r>
-              <a:rPr lang="en-US" sz="3200" b="1" dirty="0" smtClean="0">
-                <a:solidFill>
-                  <a:srgbClr val="009900"/>
-                </a:solidFill>
-              </a:rPr>
-              <a:t>l</a:t>
-            </a:r>
-            <a:r>
-              <a:rPr lang="en-US" sz="3200" b="1" dirty="0" smtClean="0">
-                <a:solidFill>
                   <a:srgbClr val="ED483D"/>
                 </a:solidFill>
               </a:rPr>
-              <a:t>e</a:t>
-            </a:r>
-            <a:r>
-              <a:rPr lang="en-US" sz="3200" b="1" dirty="0" smtClean="0">
-                <a:solidFill>
-                  <a:schemeClr val="accent1"/>
-                </a:solidFill>
-              </a:rPr>
-              <a:t> </a:t>
-            </a:r>
-            <a:r>
-              <a:rPr lang="en-AU" sz="2400" b="1" dirty="0" smtClean="0">
-                <a:solidFill>
-                  <a:srgbClr val="1B79D7"/>
-                </a:solidFill>
-              </a:rPr>
-              <a:t>Data-Points</a:t>
-            </a:r>
-            <a:endParaRPr lang="en-US" dirty="0"/>
-          </a:p>
-        </p:txBody>
-      </p:sp>
-      <p:sp>
-        <p:nvSpPr>
-          <p:cNvPr id="6" name="Content Placeholder 5"/>
+              <a:t>e </a:t>
+            </a:r>
+            <a:r>
+              <a:rPr lang="en-US" dirty="0" smtClean="0">
+                <a:solidFill>
+                  <a:schemeClr val="tx1">
+                    <a:lumMod val="65000"/>
+                    <a:lumOff val="35000"/>
+                  </a:schemeClr>
+                </a:solidFill>
+              </a:rPr>
+              <a:t>Current Head Quarters in California</a:t>
+            </a:r>
+            <a:endParaRPr lang="en-US" dirty="0">
+              <a:solidFill>
+                <a:schemeClr val="tx1">
+                  <a:lumMod val="65000"/>
+                  <a:lumOff val="35000"/>
+                </a:schemeClr>
+              </a:solidFill>
+            </a:endParaRPr>
+          </a:p>
+        </p:txBody>
+      </p:sp>
+      <p:sp>
+        <p:nvSpPr>
+          <p:cNvPr id="7" name="Content Placeholder 6"/>
           <p:cNvSpPr>
             <a:spLocks noGrp="1"/>
           </p:cNvSpPr>
@@ -7052,754 +8737,69 @@
         </p:nvSpPr>
         <p:spPr>
           <a:xfrm>
-            <a:off x="457200" y="1219200"/>
-            <a:ext cx="7467600" cy="5254752"/>
-          </a:xfrm>
-        </p:spPr>
-        <p:txBody>
-          <a:bodyPr>
-            <a:normAutofit fontScale="70000" lnSpcReduction="20000"/>
-          </a:bodyPr>
-          <a:lstStyle/>
-          <a:p>
-            <a:pPr marL="339725" indent="-339725">
-              <a:lnSpc>
-                <a:spcPct val="100000"/>
-              </a:lnSpc>
-              <a:spcBef>
-                <a:spcPct val="55000"/>
-              </a:spcBef>
-              <a:spcAft>
-                <a:spcPct val="0"/>
-              </a:spcAft>
-              <a:buClr>
-                <a:srgbClr val="1B79D7"/>
-              </a:buClr>
-              <a:buFont typeface="Wingdings" pitchFamily="2" charset="2"/>
-              <a:buChar char="«"/>
+            <a:off x="152400" y="990600"/>
+            <a:ext cx="8610600" cy="5483352"/>
+          </a:xfrm>
+        </p:spPr>
+        <p:txBody>
+          <a:bodyPr/>
+          <a:lstStyle/>
+          <a:p>
+            <a:pPr>
+              <a:buNone/>
             </a:pPr>
             <a:r>
-              <a:rPr lang="en-US" sz="2500" b="1" dirty="0" smtClean="0">
-                <a:solidFill>
-                  <a:schemeClr val="accent2">
-                    <a:lumMod val="75000"/>
+              <a:rPr lang="en-US" dirty="0" smtClean="0">
+                <a:solidFill>
+                  <a:schemeClr val="tx1">
+                    <a:lumMod val="65000"/>
+                    <a:lumOff val="35000"/>
                   </a:schemeClr>
                 </a:solidFill>
               </a:rPr>
-              <a:t>G</a:t>
-            </a:r>
-            <a:r>
-              <a:rPr lang="en-US" sz="2500" b="1" dirty="0" smtClean="0">
-                <a:solidFill>
-                  <a:srgbClr val="FF0000"/>
-                </a:solidFill>
-              </a:rPr>
-              <a:t>o</a:t>
-            </a:r>
-            <a:r>
-              <a:rPr lang="en-US" sz="2500" b="1" dirty="0" smtClean="0">
-                <a:solidFill>
-                  <a:schemeClr val="accent4"/>
-                </a:solidFill>
-              </a:rPr>
-              <a:t>o</a:t>
-            </a:r>
-            <a:r>
-              <a:rPr lang="en-US" sz="2500" b="1" dirty="0" smtClean="0">
-                <a:solidFill>
-                  <a:srgbClr val="1B79D7"/>
-                </a:solidFill>
-              </a:rPr>
-              <a:t>g</a:t>
-            </a:r>
-            <a:r>
-              <a:rPr lang="en-US" sz="2500" b="1" dirty="0" smtClean="0">
-                <a:solidFill>
-                  <a:srgbClr val="00B050"/>
-                </a:solidFill>
-              </a:rPr>
-              <a:t>l</a:t>
-            </a:r>
-            <a:r>
-              <a:rPr lang="en-US" sz="2500" b="1" dirty="0" smtClean="0">
-                <a:solidFill>
-                  <a:srgbClr val="ED483D"/>
-                </a:solidFill>
-              </a:rPr>
-              <a:t>e</a:t>
-            </a:r>
-            <a:r>
-              <a:rPr lang="en-US" sz="2500" dirty="0" smtClean="0"/>
-              <a:t> </a:t>
-            </a:r>
-            <a:r>
-              <a:rPr lang="en-US" sz="2500" dirty="0" smtClean="0"/>
-              <a:t>started in January, 1996 as a research project at Stanford University, by Ph.D. candidates Larry Page and Sergey </a:t>
-            </a:r>
-            <a:r>
-              <a:rPr lang="en-US" sz="2500" dirty="0" err="1" smtClean="0"/>
-              <a:t>Brin</a:t>
-            </a:r>
-            <a:r>
-              <a:rPr lang="en-US" sz="2500" dirty="0" smtClean="0"/>
-              <a:t> when they were 24 years old and 23 years old respectively</a:t>
-            </a:r>
-            <a:r>
-              <a:rPr lang="en-US" sz="2500" dirty="0" smtClean="0"/>
-              <a:t>.</a:t>
-            </a:r>
-            <a:endParaRPr lang="en-US" sz="2000" dirty="0" smtClean="0"/>
-          </a:p>
-          <a:p>
-            <a:pPr marL="339725" indent="-339725">
-              <a:lnSpc>
-                <a:spcPct val="100000"/>
-              </a:lnSpc>
-              <a:spcBef>
-                <a:spcPct val="55000"/>
-              </a:spcBef>
-              <a:spcAft>
-                <a:spcPct val="0"/>
-              </a:spcAft>
-              <a:buClr>
-                <a:srgbClr val="1B79D7"/>
-              </a:buClr>
-              <a:buFont typeface="Wingdings" pitchFamily="2" charset="2"/>
-              <a:buChar char="«"/>
-            </a:pPr>
-            <a:r>
-              <a:rPr lang="en-US" sz="2500" dirty="0" smtClean="0"/>
-              <a:t>The name </a:t>
-            </a:r>
-            <a:r>
-              <a:rPr lang="en-US" sz="2500" b="1" dirty="0" smtClean="0">
-                <a:solidFill>
-                  <a:schemeClr val="accent2">
-                    <a:lumMod val="75000"/>
-                  </a:schemeClr>
-                </a:solidFill>
-              </a:rPr>
-              <a:t>G</a:t>
-            </a:r>
-            <a:r>
-              <a:rPr lang="en-US" sz="2500" b="1" dirty="0" smtClean="0">
-                <a:solidFill>
-                  <a:srgbClr val="FF0000"/>
-                </a:solidFill>
-              </a:rPr>
-              <a:t>o</a:t>
-            </a:r>
-            <a:r>
-              <a:rPr lang="en-US" sz="2500" b="1" dirty="0" smtClean="0">
-                <a:solidFill>
-                  <a:schemeClr val="accent4"/>
-                </a:solidFill>
-              </a:rPr>
-              <a:t>o</a:t>
-            </a:r>
-            <a:r>
-              <a:rPr lang="en-US" sz="2500" b="1" dirty="0" smtClean="0">
-                <a:solidFill>
-                  <a:srgbClr val="1B79D7"/>
-                </a:solidFill>
-              </a:rPr>
-              <a:t>g</a:t>
-            </a:r>
-            <a:r>
-              <a:rPr lang="en-US" sz="2500" b="1" dirty="0" smtClean="0">
-                <a:solidFill>
-                  <a:srgbClr val="00B050"/>
-                </a:solidFill>
-              </a:rPr>
-              <a:t>l</a:t>
-            </a:r>
-            <a:r>
-              <a:rPr lang="en-US" sz="2500" b="1" dirty="0" smtClean="0">
-                <a:solidFill>
-                  <a:srgbClr val="ED483D"/>
-                </a:solidFill>
-              </a:rPr>
-              <a:t>e </a:t>
-            </a:r>
-            <a:r>
-              <a:rPr lang="en-US" sz="2500" dirty="0" smtClean="0"/>
-              <a:t>™ </a:t>
-            </a:r>
-            <a:r>
-              <a:rPr lang="en-US" sz="2500" dirty="0" smtClean="0"/>
-              <a:t>was an accident. A spelling mistake made by the original founders who thought they were going for ˜Googol™”</a:t>
-            </a:r>
-            <a:endParaRPr lang="en-US" sz="2500" dirty="0" smtClean="0"/>
-          </a:p>
-          <a:p>
-            <a:pPr marL="339725" indent="-339725">
-              <a:lnSpc>
-                <a:spcPct val="100000"/>
-              </a:lnSpc>
-              <a:spcBef>
-                <a:spcPct val="55000"/>
-              </a:spcBef>
-              <a:spcAft>
-                <a:spcPct val="0"/>
-              </a:spcAft>
-              <a:buClr>
-                <a:srgbClr val="1B79D7"/>
-              </a:buClr>
-              <a:buFont typeface="Wingdings" pitchFamily="2" charset="2"/>
-              <a:buChar char="«"/>
-            </a:pPr>
-            <a:r>
-              <a:rPr lang="en-US" sz="2300" b="1" dirty="0" smtClean="0">
-                <a:solidFill>
-                  <a:schemeClr val="tx2"/>
-                </a:solidFill>
-              </a:rPr>
-              <a:t>Searches per day</a:t>
-            </a:r>
-            <a:r>
-              <a:rPr lang="en-US" sz="2300" dirty="0" smtClean="0">
-                <a:solidFill>
-                  <a:schemeClr val="tx2"/>
-                </a:solidFill>
-              </a:rPr>
-              <a:t>: Average per second search of people search on </a:t>
-            </a:r>
-            <a:r>
-              <a:rPr lang="en-US" sz="2300" b="1" dirty="0" smtClean="0">
-                <a:solidFill>
-                  <a:schemeClr val="accent2">
-                    <a:lumMod val="75000"/>
-                  </a:schemeClr>
-                </a:solidFill>
-              </a:rPr>
-              <a:t>G</a:t>
-            </a:r>
-            <a:r>
-              <a:rPr lang="en-US" sz="2300" b="1" dirty="0" smtClean="0">
-                <a:solidFill>
-                  <a:srgbClr val="FF0000"/>
-                </a:solidFill>
-              </a:rPr>
-              <a:t>o</a:t>
-            </a:r>
-            <a:r>
-              <a:rPr lang="en-US" sz="2300" b="1" dirty="0" smtClean="0">
-                <a:solidFill>
-                  <a:schemeClr val="accent4"/>
-                </a:solidFill>
-              </a:rPr>
-              <a:t>o</a:t>
-            </a:r>
-            <a:r>
-              <a:rPr lang="en-US" sz="2300" b="1" dirty="0" smtClean="0">
-                <a:solidFill>
-                  <a:srgbClr val="1B79D7"/>
-                </a:solidFill>
-              </a:rPr>
-              <a:t>g</a:t>
-            </a:r>
-            <a:r>
-              <a:rPr lang="en-US" sz="2300" b="1" dirty="0" smtClean="0">
-                <a:solidFill>
-                  <a:srgbClr val="00B050"/>
-                </a:solidFill>
-              </a:rPr>
-              <a:t>l</a:t>
-            </a:r>
-            <a:r>
-              <a:rPr lang="en-US" sz="2300" b="1" dirty="0" smtClean="0">
-                <a:solidFill>
-                  <a:srgbClr val="ED483D"/>
-                </a:solidFill>
-              </a:rPr>
-              <a:t>e </a:t>
-            </a:r>
-            <a:r>
-              <a:rPr lang="en-US" sz="2300" dirty="0" smtClean="0">
-                <a:solidFill>
-                  <a:schemeClr val="tx2"/>
-                </a:solidFill>
-              </a:rPr>
-              <a:t>for </a:t>
-            </a:r>
-            <a:r>
-              <a:rPr lang="en-US" sz="2300" dirty="0" smtClean="0">
-                <a:solidFill>
-                  <a:schemeClr val="tx2"/>
-                </a:solidFill>
-              </a:rPr>
-              <a:t>is  </a:t>
-            </a:r>
-            <a:r>
-              <a:rPr lang="en-US" sz="2300" b="1" dirty="0" smtClean="0"/>
-              <a:t>40,000</a:t>
-            </a:r>
-            <a:br>
-              <a:rPr lang="en-US" sz="2300" b="1" dirty="0" smtClean="0"/>
-            </a:br>
-            <a:r>
-              <a:rPr lang="en-US" sz="2300" b="1" dirty="0" smtClean="0">
-                <a:hlinkClick r:id="rId2"/>
-              </a:rPr>
-              <a:t>http://www.internetlivestats.com/google-search-statistics/</a:t>
-            </a:r>
-            <a:endParaRPr lang="en-US" sz="2300" dirty="0" smtClean="0">
+              <a:t>    </a:t>
+            </a:r>
+            <a:endParaRPr lang="en-US" dirty="0" smtClean="0">
               <a:solidFill>
-                <a:schemeClr val="tx2"/>
+                <a:schemeClr val="tx1">
+                  <a:lumMod val="65000"/>
+                  <a:lumOff val="35000"/>
+                </a:schemeClr>
               </a:solidFill>
             </a:endParaRPr>
           </a:p>
           <a:p>
-            <a:pPr marL="339725" indent="-339725">
-              <a:lnSpc>
-                <a:spcPct val="100000"/>
-              </a:lnSpc>
-              <a:spcBef>
-                <a:spcPct val="55000"/>
-              </a:spcBef>
-              <a:spcAft>
-                <a:spcPct val="0"/>
-              </a:spcAft>
-              <a:buClr>
-                <a:srgbClr val="1B79D7"/>
-              </a:buClr>
-              <a:buFont typeface="Wingdings" pitchFamily="2" charset="2"/>
-              <a:buChar char="«"/>
+            <a:pPr>
+              <a:buNone/>
             </a:pPr>
-            <a:r>
-              <a:rPr lang="en-US" sz="2300" b="1" dirty="0" smtClean="0">
-                <a:solidFill>
-                  <a:schemeClr val="accent2">
-                    <a:lumMod val="75000"/>
-                  </a:schemeClr>
-                </a:solidFill>
-              </a:rPr>
-              <a:t>G</a:t>
-            </a:r>
-            <a:r>
-              <a:rPr lang="en-US" sz="2300" b="1" dirty="0" smtClean="0">
-                <a:solidFill>
-                  <a:srgbClr val="FF0000"/>
-                </a:solidFill>
-              </a:rPr>
-              <a:t>o</a:t>
-            </a:r>
-            <a:r>
-              <a:rPr lang="en-US" sz="2300" b="1" dirty="0" smtClean="0">
-                <a:solidFill>
-                  <a:schemeClr val="accent4"/>
-                </a:solidFill>
-              </a:rPr>
-              <a:t>o</a:t>
-            </a:r>
-            <a:r>
-              <a:rPr lang="en-US" sz="2300" b="1" dirty="0" smtClean="0">
-                <a:solidFill>
-                  <a:srgbClr val="1B79D7"/>
-                </a:solidFill>
-              </a:rPr>
-              <a:t>g</a:t>
-            </a:r>
-            <a:r>
-              <a:rPr lang="en-US" sz="2300" b="1" dirty="0" smtClean="0">
-                <a:solidFill>
-                  <a:srgbClr val="00B050"/>
-                </a:solidFill>
-              </a:rPr>
-              <a:t>l</a:t>
-            </a:r>
-            <a:r>
-              <a:rPr lang="en-US" sz="2300" b="1" dirty="0" smtClean="0">
-                <a:solidFill>
-                  <a:srgbClr val="ED483D"/>
-                </a:solidFill>
-              </a:rPr>
-              <a:t>e</a:t>
-            </a:r>
-            <a:r>
-              <a:rPr lang="en-US" sz="2300" b="1" dirty="0" smtClean="0">
-                <a:solidFill>
-                  <a:schemeClr val="tx2"/>
-                </a:solidFill>
-              </a:rPr>
-              <a:t> </a:t>
-            </a:r>
-            <a:r>
-              <a:rPr lang="en-US" sz="2300" b="1" dirty="0" err="1" smtClean="0">
-                <a:solidFill>
-                  <a:schemeClr val="tx2"/>
-                </a:solidFill>
-              </a:rPr>
-              <a:t>Adsense</a:t>
-            </a:r>
-            <a:r>
-              <a:rPr lang="en-US" sz="2300" b="1" dirty="0" smtClean="0">
-                <a:solidFill>
-                  <a:schemeClr val="tx2"/>
-                </a:solidFill>
-              </a:rPr>
-              <a:t> </a:t>
-            </a:r>
-            <a:r>
-              <a:rPr lang="en-US" sz="2300" b="1" dirty="0" smtClean="0">
-                <a:solidFill>
-                  <a:schemeClr val="tx2"/>
-                </a:solidFill>
-              </a:rPr>
-              <a:t>income:  </a:t>
-            </a:r>
-          </a:p>
-          <a:p>
-            <a:pPr marL="705485" lvl="1" indent="-339725">
-              <a:spcBef>
-                <a:spcPct val="55000"/>
-              </a:spcBef>
-              <a:spcAft>
-                <a:spcPct val="0"/>
-              </a:spcAft>
-              <a:buClr>
-                <a:srgbClr val="1B79D7"/>
-              </a:buClr>
-              <a:buFont typeface="Wingdings" pitchFamily="2" charset="2"/>
-              <a:buChar char="«"/>
-            </a:pPr>
-            <a:r>
-              <a:rPr lang="en-US" sz="2300" dirty="0" smtClean="0">
-                <a:solidFill>
-                  <a:schemeClr val="tx2"/>
-                </a:solidFill>
-              </a:rPr>
-              <a:t>Top three companies that earn from </a:t>
-            </a:r>
-            <a:r>
-              <a:rPr lang="en-US" sz="2300" b="1" dirty="0" smtClean="0">
-                <a:solidFill>
-                  <a:schemeClr val="accent2">
-                    <a:lumMod val="75000"/>
-                  </a:schemeClr>
-                </a:solidFill>
-              </a:rPr>
-              <a:t>G</a:t>
-            </a:r>
-            <a:r>
-              <a:rPr lang="en-US" sz="2300" b="1" dirty="0" smtClean="0">
-                <a:solidFill>
-                  <a:srgbClr val="FF0000"/>
-                </a:solidFill>
-              </a:rPr>
-              <a:t>o</a:t>
-            </a:r>
-            <a:r>
-              <a:rPr lang="en-US" sz="2300" b="1" dirty="0" smtClean="0">
-                <a:solidFill>
-                  <a:schemeClr val="accent4"/>
-                </a:solidFill>
-              </a:rPr>
-              <a:t>o</a:t>
-            </a:r>
-            <a:r>
-              <a:rPr lang="en-US" sz="2300" b="1" dirty="0" smtClean="0">
-                <a:solidFill>
-                  <a:srgbClr val="1B79D7"/>
-                </a:solidFill>
-              </a:rPr>
-              <a:t>g</a:t>
-            </a:r>
-            <a:r>
-              <a:rPr lang="en-US" sz="2300" b="1" dirty="0" smtClean="0">
-                <a:solidFill>
-                  <a:srgbClr val="00B050"/>
-                </a:solidFill>
-              </a:rPr>
-              <a:t>l</a:t>
-            </a:r>
-            <a:r>
-              <a:rPr lang="en-US" sz="2300" b="1" dirty="0" smtClean="0">
-                <a:solidFill>
-                  <a:srgbClr val="ED483D"/>
-                </a:solidFill>
-              </a:rPr>
-              <a:t>e</a:t>
-            </a:r>
-            <a:r>
-              <a:rPr lang="en-US" sz="2000" dirty="0" smtClean="0">
-                <a:solidFill>
-                  <a:schemeClr val="tx2"/>
-                </a:solidFill>
-              </a:rPr>
-              <a:t> </a:t>
-            </a:r>
-            <a:r>
-              <a:rPr lang="en-US" sz="2300" dirty="0" smtClean="0">
-                <a:solidFill>
-                  <a:schemeClr val="tx2"/>
-                </a:solidFill>
-              </a:rPr>
-              <a:t>ad-</a:t>
-            </a:r>
-            <a:r>
-              <a:rPr lang="en-US" sz="2300" dirty="0" err="1" smtClean="0">
-                <a:solidFill>
-                  <a:schemeClr val="tx2"/>
-                </a:solidFill>
-              </a:rPr>
-              <a:t>sence</a:t>
-            </a:r>
-            <a:endParaRPr lang="en-US" sz="2300" dirty="0" smtClean="0">
-              <a:solidFill>
-                <a:schemeClr val="tx2"/>
-              </a:solidFill>
-            </a:endParaRPr>
-          </a:p>
-          <a:p>
-            <a:pPr marL="979805" lvl="2" indent="-339725">
-              <a:spcBef>
-                <a:spcPct val="55000"/>
-              </a:spcBef>
-              <a:spcAft>
-                <a:spcPct val="0"/>
-              </a:spcAft>
-              <a:buClr>
-                <a:srgbClr val="1B79D7"/>
-              </a:buClr>
-              <a:buFont typeface="Wingdings" pitchFamily="2" charset="2"/>
-              <a:buChar char="«"/>
-            </a:pPr>
-            <a:r>
-              <a:rPr lang="en-US" sz="2300" dirty="0" smtClean="0">
-                <a:solidFill>
-                  <a:schemeClr val="tx2"/>
-                </a:solidFill>
-              </a:rPr>
-              <a:t>Ehow.com :- </a:t>
-            </a:r>
-            <a:r>
-              <a:rPr lang="en-US" sz="2300" b="1" dirty="0" smtClean="0"/>
-              <a:t>$300,000/month</a:t>
-            </a:r>
-          </a:p>
-          <a:p>
-            <a:pPr marL="979805" lvl="2" indent="-339725">
-              <a:spcBef>
-                <a:spcPct val="55000"/>
-              </a:spcBef>
-              <a:spcAft>
-                <a:spcPct val="0"/>
-              </a:spcAft>
-              <a:buClr>
-                <a:srgbClr val="1B79D7"/>
-              </a:buClr>
-              <a:buFont typeface="Wingdings" pitchFamily="2" charset="2"/>
-              <a:buChar char="«"/>
-            </a:pPr>
-            <a:r>
-              <a:rPr lang="en-US" sz="2300" b="1" dirty="0" smtClean="0">
-                <a:solidFill>
-                  <a:schemeClr val="tx2"/>
-                </a:solidFill>
-              </a:rPr>
-              <a:t>Mashable.com: </a:t>
-            </a:r>
-            <a:r>
-              <a:rPr lang="en-US" sz="2300" b="1" dirty="0" smtClean="0"/>
-              <a:t>$250,000/month</a:t>
-            </a:r>
-            <a:endParaRPr lang="en-US" sz="2300" b="1" dirty="0" smtClean="0">
-              <a:solidFill>
-                <a:schemeClr val="tx2"/>
-              </a:solidFill>
-            </a:endParaRPr>
-          </a:p>
-          <a:p>
-            <a:pPr marL="979805" lvl="2" indent="-339725">
-              <a:spcBef>
-                <a:spcPct val="55000"/>
-              </a:spcBef>
-              <a:spcAft>
-                <a:spcPct val="0"/>
-              </a:spcAft>
-              <a:buClr>
-                <a:srgbClr val="1B79D7"/>
-              </a:buClr>
-              <a:buFont typeface="Wingdings" pitchFamily="2" charset="2"/>
-              <a:buChar char="«"/>
-            </a:pPr>
-            <a:r>
-              <a:rPr lang="en-US" sz="2300" dirty="0" smtClean="0"/>
-              <a:t>forums.digitalpoint.com</a:t>
-            </a:r>
-            <a:r>
-              <a:rPr lang="en-US" sz="2300" b="1" dirty="0" smtClean="0">
-                <a:solidFill>
-                  <a:schemeClr val="tx2"/>
-                </a:solidFill>
-              </a:rPr>
-              <a:t>: </a:t>
-            </a:r>
-            <a:r>
-              <a:rPr lang="en-US" sz="2300" b="1" dirty="0" smtClean="0"/>
-              <a:t>$195,000/month</a:t>
-            </a:r>
-          </a:p>
-          <a:p>
-            <a:pPr marL="339725" indent="-339725">
-              <a:spcBef>
-                <a:spcPct val="55000"/>
-              </a:spcBef>
-              <a:spcAft>
-                <a:spcPct val="0"/>
-              </a:spcAft>
-              <a:buClr>
-                <a:srgbClr val="1B79D7"/>
-              </a:buClr>
-              <a:buFont typeface="Wingdings" pitchFamily="2" charset="2"/>
-              <a:buChar char="«"/>
-            </a:pPr>
-            <a:r>
-              <a:rPr lang="en-US" sz="2300" b="1" dirty="0" smtClean="0">
-                <a:solidFill>
-                  <a:schemeClr val="accent2">
-                    <a:lumMod val="75000"/>
-                  </a:schemeClr>
-                </a:solidFill>
-              </a:rPr>
-              <a:t>G</a:t>
-            </a:r>
-            <a:r>
-              <a:rPr lang="en-US" sz="2300" b="1" dirty="0" smtClean="0">
-                <a:solidFill>
-                  <a:srgbClr val="FF0000"/>
-                </a:solidFill>
-              </a:rPr>
-              <a:t>o</a:t>
-            </a:r>
-            <a:r>
-              <a:rPr lang="en-US" sz="2300" b="1" dirty="0" smtClean="0">
-                <a:solidFill>
-                  <a:schemeClr val="accent4"/>
-                </a:solidFill>
-              </a:rPr>
-              <a:t>o</a:t>
-            </a:r>
-            <a:r>
-              <a:rPr lang="en-US" sz="2300" b="1" dirty="0" smtClean="0">
-                <a:solidFill>
-                  <a:srgbClr val="1B79D7"/>
-                </a:solidFill>
-              </a:rPr>
-              <a:t>g</a:t>
-            </a:r>
-            <a:r>
-              <a:rPr lang="en-US" sz="2300" b="1" dirty="0" smtClean="0">
-                <a:solidFill>
-                  <a:srgbClr val="00B050"/>
-                </a:solidFill>
-              </a:rPr>
-              <a:t>l</a:t>
-            </a:r>
-            <a:r>
-              <a:rPr lang="en-US" sz="2300" b="1" dirty="0" smtClean="0">
-                <a:solidFill>
-                  <a:srgbClr val="ED483D"/>
-                </a:solidFill>
-              </a:rPr>
-              <a:t>e </a:t>
-            </a:r>
-            <a:r>
-              <a:rPr lang="en-US" sz="2300" b="1" dirty="0" smtClean="0">
-                <a:solidFill>
-                  <a:schemeClr val="tx2"/>
-                </a:solidFill>
-              </a:rPr>
-              <a:t>You</a:t>
-            </a:r>
-            <a:r>
-              <a:rPr lang="en-US" sz="2300" b="1" dirty="0" smtClean="0">
-                <a:solidFill>
-                  <a:srgbClr val="FF0000"/>
-                </a:solidFill>
-              </a:rPr>
-              <a:t>Tube</a:t>
-            </a:r>
-            <a:r>
-              <a:rPr lang="en-US" sz="2300" b="1" dirty="0" smtClean="0">
-                <a:solidFill>
-                  <a:schemeClr val="tx2"/>
-                </a:solidFill>
-              </a:rPr>
-              <a:t> </a:t>
-            </a:r>
-            <a:r>
-              <a:rPr lang="en-US" sz="2300" b="1" dirty="0" smtClean="0">
-                <a:solidFill>
-                  <a:schemeClr val="tx2"/>
-                </a:solidFill>
-              </a:rPr>
-              <a:t>: </a:t>
-            </a:r>
-            <a:endParaRPr lang="en-US" sz="2300" dirty="0" smtClean="0">
-              <a:solidFill>
-                <a:schemeClr val="tx2"/>
-              </a:solidFill>
-            </a:endParaRPr>
-          </a:p>
-          <a:p>
-            <a:pPr marL="705485" lvl="1" indent="-339725">
-              <a:spcBef>
-                <a:spcPct val="55000"/>
-              </a:spcBef>
-              <a:spcAft>
-                <a:spcPct val="0"/>
-              </a:spcAft>
-              <a:buClr>
-                <a:srgbClr val="1B79D7"/>
-              </a:buClr>
-              <a:buFont typeface="Wingdings" pitchFamily="2" charset="2"/>
-              <a:buChar char="«"/>
-            </a:pPr>
-            <a:r>
-              <a:rPr lang="en-US" sz="2300" dirty="0" smtClean="0">
-                <a:solidFill>
-                  <a:schemeClr val="tx2"/>
-                </a:solidFill>
-              </a:rPr>
-              <a:t>Per day video views: 4B</a:t>
-            </a:r>
-          </a:p>
-          <a:p>
-            <a:pPr marL="705485" lvl="1" indent="-339725">
-              <a:spcBef>
-                <a:spcPct val="55000"/>
-              </a:spcBef>
-              <a:spcAft>
-                <a:spcPct val="0"/>
-              </a:spcAft>
-              <a:buClr>
-                <a:srgbClr val="1B79D7"/>
-              </a:buClr>
-              <a:buFont typeface="Wingdings" pitchFamily="2" charset="2"/>
-              <a:buChar char="«"/>
-            </a:pPr>
-            <a:r>
-              <a:rPr lang="en-US" sz="2300" dirty="0" smtClean="0">
-                <a:solidFill>
-                  <a:schemeClr val="tx2"/>
-                </a:solidFill>
-              </a:rPr>
-              <a:t>Per minute video upload: 300 </a:t>
-            </a:r>
-            <a:r>
-              <a:rPr lang="en-US" sz="2300" dirty="0" smtClean="0">
-                <a:solidFill>
-                  <a:schemeClr val="tx2"/>
-                </a:solidFill>
-              </a:rPr>
-              <a:t>hours</a:t>
-            </a:r>
             <a:endParaRPr lang="en-US" dirty="0"/>
           </a:p>
         </p:txBody>
       </p:sp>
+      <p:pic>
+        <p:nvPicPr>
+          <p:cNvPr id="8" name="Picture 7" descr="google-garage-stanford.png"/>
+          <p:cNvPicPr>
+            <a:picLocks noChangeAspect="1"/>
+          </p:cNvPicPr>
+          <p:nvPr/>
+        </p:nvPicPr>
+        <p:blipFill>
+          <a:blip r:embed="rId2"/>
+          <a:stretch>
+            <a:fillRect/>
+          </a:stretch>
+        </p:blipFill>
+        <p:spPr>
+          <a:xfrm>
+            <a:off x="152400" y="990600"/>
+            <a:ext cx="8610600" cy="5585009"/>
+          </a:xfrm>
+          <a:prstGeom prst="rect">
+            <a:avLst/>
+          </a:prstGeom>
+        </p:spPr>
+      </p:pic>
     </p:spTree>
   </p:cSld>
   <p:clrMapOvr>
@@ -7834,83 +8834,256 @@
       </p:grpSpPr>
       <p:sp>
         <p:nvSpPr>
-          <p:cNvPr id="3" name="Content Placeholder 2"/>
+          <p:cNvPr id="11" name="Title 10"/>
           <p:cNvSpPr>
             <a:spLocks noGrp="1"/>
           </p:cNvSpPr>
+          <p:nvPr>
+            <p:ph type="title"/>
+          </p:nvPr>
+        </p:nvSpPr>
+        <p:spPr>
+          <a:xfrm>
+            <a:off x="457200" y="274638"/>
+            <a:ext cx="8274908" cy="715962"/>
+          </a:xfrm>
+        </p:spPr>
+        <p:txBody>
+          <a:bodyPr/>
+          <a:lstStyle/>
+          <a:p>
+            <a:r>
+              <a:rPr lang="en-US" sz="3200" b="1" dirty="0" smtClean="0">
+                <a:solidFill>
+                  <a:schemeClr val="accent2"/>
+                </a:solidFill>
+              </a:rPr>
+              <a:t>G</a:t>
+            </a:r>
+            <a:r>
+              <a:rPr lang="en-US" sz="3200" b="1" dirty="0" smtClean="0">
+                <a:solidFill>
+                  <a:srgbClr val="FF0000"/>
+                </a:solidFill>
+              </a:rPr>
+              <a:t>o</a:t>
+            </a:r>
+            <a:r>
+              <a:rPr lang="en-US" sz="3200" b="1" dirty="0" smtClean="0">
+                <a:solidFill>
+                  <a:srgbClr val="FFF529"/>
+                </a:solidFill>
+              </a:rPr>
+              <a:t>o</a:t>
+            </a:r>
+            <a:r>
+              <a:rPr lang="en-US" sz="3200" b="1" dirty="0" smtClean="0">
+                <a:solidFill>
+                  <a:srgbClr val="1B79D7"/>
+                </a:solidFill>
+              </a:rPr>
+              <a:t>g</a:t>
+            </a:r>
+            <a:r>
+              <a:rPr lang="en-US" sz="3200" b="1" dirty="0" smtClean="0">
+                <a:solidFill>
+                  <a:srgbClr val="009900"/>
+                </a:solidFill>
+              </a:rPr>
+              <a:t>l</a:t>
+            </a:r>
+            <a:r>
+              <a:rPr lang="en-US" sz="3200" b="1" dirty="0" smtClean="0">
+                <a:solidFill>
+                  <a:srgbClr val="ED483D"/>
+                </a:solidFill>
+              </a:rPr>
+              <a:t>e</a:t>
+            </a:r>
+            <a:r>
+              <a:rPr lang="en-US" sz="3200" b="1" dirty="0" smtClean="0">
+                <a:solidFill>
+                  <a:schemeClr val="accent1"/>
+                </a:solidFill>
+              </a:rPr>
+              <a:t> </a:t>
+            </a:r>
+            <a:r>
+              <a:rPr lang="en-US" sz="2400" b="1" dirty="0" smtClean="0">
+                <a:solidFill>
+                  <a:srgbClr val="1B79D7"/>
+                </a:solidFill>
+              </a:rPr>
+              <a:t>Evolution</a:t>
+            </a:r>
+            <a:endParaRPr lang="en-US" dirty="0"/>
+          </a:p>
+        </p:txBody>
+      </p:sp>
+      <p:pic>
+        <p:nvPicPr>
+          <p:cNvPr id="5" name="Content Placeholder 4" descr="part1.jpg"/>
+          <p:cNvPicPr>
+            <a:picLocks noGrp="1" noChangeAspect="1"/>
+          </p:cNvPicPr>
           <p:nvPr>
             <p:ph sz="quarter" idx="1"/>
           </p:nvPr>
-        </p:nvSpPr>
-        <p:spPr>
-          <a:xfrm>
-            <a:off x="457200" y="228600"/>
-            <a:ext cx="7467600" cy="6245352"/>
-          </a:xfrm>
-        </p:spPr>
-        <p:txBody>
-          <a:bodyPr/>
-          <a:lstStyle/>
-          <a:p>
-            <a:r>
-              <a:rPr lang="en-US" dirty="0" smtClean="0"/>
-              <a:t>Top companies by market capitalization (2015)</a:t>
-            </a:r>
-          </a:p>
-          <a:p>
-            <a:pPr>
-              <a:buNone/>
-            </a:pPr>
-            <a:endParaRPr lang="en-US" dirty="0"/>
-          </a:p>
-        </p:txBody>
-      </p:sp>
-      <p:pic>
-        <p:nvPicPr>
-          <p:cNvPr id="4" name="Picture 3" descr="• Top companies in the world by market value 2015   Statistic.png"/>
-          <p:cNvPicPr>
-            <a:picLocks noChangeAspect="1"/>
-          </p:cNvPicPr>
-          <p:nvPr/>
         </p:nvPicPr>
         <p:blipFill>
-          <a:blip r:embed="rId2"/>
+          <a:blip r:embed="rId2" cstate="print"/>
           <a:stretch>
             <a:fillRect/>
           </a:stretch>
         </p:blipFill>
         <p:spPr>
           <a:xfrm>
-            <a:off x="76200" y="838200"/>
-            <a:ext cx="8763000" cy="4093243"/>
-          </a:xfrm>
-          <a:prstGeom prst="rect">
-            <a:avLst/>
-          </a:prstGeom>
+            <a:off x="228600" y="990600"/>
+            <a:ext cx="8458200" cy="5867400"/>
+          </a:xfrm>
         </p:spPr>
       </p:pic>
+    </p:spTree>
+  </p:cSld>
+  <p:clrMapOvr>
+    <a:masterClrMapping/>
+  </p:clrMapOvr>
+  <p:timing>
+    <p:tnLst>
+      <p:par>
+        <p:cTn id="1" dur="indefinite" restart="never" nodeType="tmRoot"/>
+      </p:par>
+    </p:tnLst>
+  </p:timing>
+</p:sld>
+</file>
+
+<file path=ppt/slides/slide9.xml><?xml version="1.0" encoding="utf-8"?>
+<p:sld xmlns:a="http://schemas.openxmlformats.org/drawingml/2006/main" xmlns:r="http://schemas.openxmlformats.org/officeDocument/2006/relationships" xmlns:p="http://schemas.openxmlformats.org/presentationml/2006/main">
+  <p:cSld>
+    <p:spTree>
+      <p:nvGrpSpPr>
+        <p:cNvPr id="1" name=""/>
+        <p:cNvGrpSpPr/>
+        <p:nvPr/>
+      </p:nvGrpSpPr>
+      <p:grpSpPr>
+        <a:xfrm>
+          <a:off x="0" y="0"/>
+          <a:ext cx="0" cy="0"/>
+          <a:chOff x="0" y="0"/>
+          <a:chExt cx="0" cy="0"/>
+        </a:xfrm>
+      </p:grpSpPr>
+      <p:sp>
+        <p:nvSpPr>
+          <p:cNvPr id="11" name="Title 10"/>
+          <p:cNvSpPr>
+            <a:spLocks noGrp="1"/>
+          </p:cNvSpPr>
+          <p:nvPr>
+            <p:ph type="title"/>
+          </p:nvPr>
+        </p:nvSpPr>
+        <p:spPr>
+          <a:xfrm>
+            <a:off x="457200" y="274638"/>
+            <a:ext cx="8274908" cy="715962"/>
+          </a:xfrm>
+        </p:spPr>
+        <p:txBody>
+          <a:bodyPr/>
+          <a:lstStyle/>
+          <a:p>
+            <a:r>
+              <a:rPr lang="en-US" sz="3200" b="1" dirty="0" smtClean="0">
+                <a:solidFill>
+                  <a:schemeClr val="accent2"/>
+                </a:solidFill>
+              </a:rPr>
+              <a:t>G</a:t>
+            </a:r>
+            <a:r>
+              <a:rPr lang="en-US" sz="3200" b="1" dirty="0" smtClean="0">
+                <a:solidFill>
+                  <a:srgbClr val="FF0000"/>
+                </a:solidFill>
+              </a:rPr>
+              <a:t>o</a:t>
+            </a:r>
+            <a:r>
+              <a:rPr lang="en-US" sz="3200" b="1" dirty="0" smtClean="0">
+                <a:solidFill>
+                  <a:srgbClr val="FFF529"/>
+                </a:solidFill>
+              </a:rPr>
+              <a:t>o</a:t>
+            </a:r>
+            <a:r>
+              <a:rPr lang="en-US" sz="3200" b="1" dirty="0" smtClean="0">
+                <a:solidFill>
+                  <a:srgbClr val="1B79D7"/>
+                </a:solidFill>
+              </a:rPr>
+              <a:t>g</a:t>
+            </a:r>
+            <a:r>
+              <a:rPr lang="en-US" sz="3200" b="1" dirty="0" smtClean="0">
+                <a:solidFill>
+                  <a:srgbClr val="009900"/>
+                </a:solidFill>
+              </a:rPr>
+              <a:t>l</a:t>
+            </a:r>
+            <a:r>
+              <a:rPr lang="en-US" sz="3200" b="1" dirty="0" smtClean="0">
+                <a:solidFill>
+                  <a:srgbClr val="ED483D"/>
+                </a:solidFill>
+              </a:rPr>
+              <a:t>e</a:t>
+            </a:r>
+            <a:r>
+              <a:rPr lang="en-US" sz="3200" b="1" dirty="0" smtClean="0">
+                <a:solidFill>
+                  <a:schemeClr val="accent1"/>
+                </a:solidFill>
+              </a:rPr>
+              <a:t> </a:t>
+            </a:r>
+            <a:r>
+              <a:rPr lang="en-US" sz="2400" b="1" dirty="0" smtClean="0">
+                <a:solidFill>
+                  <a:srgbClr val="1B79D7"/>
+                </a:solidFill>
+              </a:rPr>
+              <a:t>Evolution</a:t>
+            </a:r>
+            <a:endParaRPr lang="en-US" dirty="0"/>
+          </a:p>
+        </p:txBody>
+      </p:sp>
       <p:pic>
         <p:nvPicPr>
-          <p:cNvPr id="6" name="Picture 5" descr="• Top companies in the world by market value 2015   Statistic_footer.png"/>
+          <p:cNvPr id="5" name="Content Placeholder 4" descr="part2.jpg"/>
           <p:cNvPicPr>
-            <a:picLocks noChangeAspect="1"/>
+            <a:picLocks noGrp="1" noChangeAspect="1"/>
           </p:cNvPicPr>
-          <p:nvPr/>
+          <p:nvPr>
+            <p:ph sz="quarter" idx="1"/>
+          </p:nvPr>
         </p:nvPicPr>
         <p:blipFill>
-          <a:blip r:embed="rId3"/>
+          <a:blip r:embed="rId2" cstate="print"/>
           <a:stretch>
             <a:fillRect/>
           </a:stretch>
         </p:blipFill>
         <p:spPr>
           <a:xfrm>
-            <a:off x="381000" y="5000625"/>
-            <a:ext cx="8324850" cy="485775"/>
-          </a:xfrm>
-          <a:prstGeom prst="rect">
-            <a:avLst/>
-          </a:prstGeom>
+            <a:off x="152400" y="914400"/>
+            <a:ext cx="8686800" cy="5943599"/>
+          </a:xfrm>
         </p:spPr>
       </p:pic>
     </p:spTree>

</xml_diff>

<commit_message>
added some more contents
</commit_message>
<xml_diff>
--- a/google/about_google_sanjay.pptx
+++ b/google/about_google_sanjay.pptx
@@ -18,16 +18,13 @@
     <p:sldId id="276" r:id="rId12"/>
     <p:sldId id="277" r:id="rId13"/>
     <p:sldId id="278" r:id="rId14"/>
-    <p:sldId id="265" r:id="rId15"/>
-    <p:sldId id="262" r:id="rId16"/>
-    <p:sldId id="263" r:id="rId17"/>
-    <p:sldId id="258" r:id="rId18"/>
-    <p:sldId id="260" r:id="rId19"/>
+    <p:sldId id="258" r:id="rId15"/>
+    <p:sldId id="260" r:id="rId16"/>
+    <p:sldId id="265" r:id="rId17"/>
+    <p:sldId id="262" r:id="rId18"/>
+    <p:sldId id="263" r:id="rId19"/>
     <p:sldId id="261" r:id="rId20"/>
     <p:sldId id="257" r:id="rId21"/>
-    <p:sldId id="270" r:id="rId22"/>
-    <p:sldId id="272" r:id="rId23"/>
-    <p:sldId id="273" r:id="rId24"/>
   </p:sldIdLst>
   <p:sldSz cx="9144000" cy="6858000" type="screen4x3"/>
   <p:notesSz cx="6858000" cy="9144000"/>
@@ -1231,6 +1228,13 @@
         </dgm:presLayoutVars>
       </dgm:prSet>
       <dgm:spPr/>
+      <dgm:t>
+        <a:bodyPr/>
+        <a:lstStyle/>
+        <a:p>
+          <a:endParaRPr lang="en-US"/>
+        </a:p>
+      </dgm:t>
     </dgm:pt>
     <dgm:pt modelId="{049ECBEB-0CAD-4541-8490-DE8A4A49A8BD}" type="pres">
       <dgm:prSet presAssocID="{06A81BA0-BABE-44DF-AE77-4DD601DEB203}" presName="root" presStyleCnt="0"/>
@@ -1254,6 +1258,13 @@
     <dgm:pt modelId="{B72A464C-2E90-4796-A1A6-327FB030473A}" type="pres">
       <dgm:prSet presAssocID="{06A81BA0-BABE-44DF-AE77-4DD601DEB203}" presName="rootConnector" presStyleLbl="node1" presStyleIdx="0" presStyleCnt="1"/>
       <dgm:spPr/>
+      <dgm:t>
+        <a:bodyPr/>
+        <a:lstStyle/>
+        <a:p>
+          <a:endParaRPr lang="en-US"/>
+        </a:p>
+      </dgm:t>
     </dgm:pt>
     <dgm:pt modelId="{DF442575-BAA8-4A76-A115-9DF0912F4B51}" type="pres">
       <dgm:prSet presAssocID="{06A81BA0-BABE-44DF-AE77-4DD601DEB203}" presName="childShape" presStyleCnt="0"/>
@@ -1262,6 +1273,13 @@
     <dgm:pt modelId="{1DD0955E-A6FB-4559-B39A-D9EC982381E2}" type="pres">
       <dgm:prSet presAssocID="{21069137-C5CD-4F0B-8771-91B3F924E9A6}" presName="Name13" presStyleLbl="parChTrans1D2" presStyleIdx="0" presStyleCnt="3"/>
       <dgm:spPr/>
+      <dgm:t>
+        <a:bodyPr/>
+        <a:lstStyle/>
+        <a:p>
+          <a:endParaRPr lang="en-US"/>
+        </a:p>
+      </dgm:t>
     </dgm:pt>
     <dgm:pt modelId="{D889F875-0D55-4056-96B2-F64547D53BE7}" type="pres">
       <dgm:prSet presAssocID="{75EB223E-B994-476E-A0D1-D496C0B45674}" presName="childText" presStyleLbl="bgAcc1" presStyleIdx="0" presStyleCnt="3" custScaleX="229429" custScaleY="72241" custLinFactNeighborX="1992" custLinFactNeighborY="395">
@@ -1270,10 +1288,24 @@
         </dgm:presLayoutVars>
       </dgm:prSet>
       <dgm:spPr/>
+      <dgm:t>
+        <a:bodyPr/>
+        <a:lstStyle/>
+        <a:p>
+          <a:endParaRPr lang="en-US"/>
+        </a:p>
+      </dgm:t>
     </dgm:pt>
     <dgm:pt modelId="{AF165F75-F34C-4652-AA87-30D509310FE4}" type="pres">
       <dgm:prSet presAssocID="{105D04E7-C173-4C8D-8BAC-F1E3A9DD53FE}" presName="Name13" presStyleLbl="parChTrans1D2" presStyleIdx="1" presStyleCnt="3"/>
       <dgm:spPr/>
+      <dgm:t>
+        <a:bodyPr/>
+        <a:lstStyle/>
+        <a:p>
+          <a:endParaRPr lang="en-US"/>
+        </a:p>
+      </dgm:t>
     </dgm:pt>
     <dgm:pt modelId="{2956732A-EC9F-48B6-B905-0B71C0D6725E}" type="pres">
       <dgm:prSet presAssocID="{141A0775-7785-4108-A40A-605602922E5A}" presName="childText" presStyleLbl="bgAcc1" presStyleIdx="1" presStyleCnt="3" custScaleX="233411" custScaleY="76428" custLinFactNeighborY="-6733">
@@ -1282,10 +1314,24 @@
         </dgm:presLayoutVars>
       </dgm:prSet>
       <dgm:spPr/>
+      <dgm:t>
+        <a:bodyPr/>
+        <a:lstStyle/>
+        <a:p>
+          <a:endParaRPr lang="en-US"/>
+        </a:p>
+      </dgm:t>
     </dgm:pt>
     <dgm:pt modelId="{62DB1C1A-3B53-46BF-93F4-ED7D4DC0D269}" type="pres">
       <dgm:prSet presAssocID="{672A1FD6-A25F-4503-9A4E-FD664AD266C0}" presName="Name13" presStyleLbl="parChTrans1D2" presStyleIdx="2" presStyleCnt="3"/>
       <dgm:spPr/>
+      <dgm:t>
+        <a:bodyPr/>
+        <a:lstStyle/>
+        <a:p>
+          <a:endParaRPr lang="en-US"/>
+        </a:p>
+      </dgm:t>
     </dgm:pt>
     <dgm:pt modelId="{C83CC842-E685-41A3-BA96-B32D97AE6CB2}" type="pres">
       <dgm:prSet presAssocID="{C0408A0C-D6D7-405D-A506-AE06F9D18E1A}" presName="childText" presStyleLbl="bgAcc1" presStyleIdx="2" presStyleCnt="3" custScaleX="232727" custScaleY="71376" custLinFactNeighborY="-11926">
@@ -1294,6 +1340,13 @@
         </dgm:presLayoutVars>
       </dgm:prSet>
       <dgm:spPr/>
+      <dgm:t>
+        <a:bodyPr/>
+        <a:lstStyle/>
+        <a:p>
+          <a:endParaRPr lang="en-US"/>
+        </a:p>
+      </dgm:t>
     </dgm:pt>
   </dgm:ptLst>
   <dgm:cxnLst>
@@ -2791,7 +2844,7 @@
             <a:fld id="{E6F9B8CD-342D-4579-98EC-A8FD6B7370E1}" type="datetimeFigureOut">
               <a:rPr lang="en-US" smtClean="0"/>
               <a:pPr/>
-              <a:t>23/8/2015</a:t>
+              <a:t>24/8/2015</a:t>
             </a:fld>
             <a:endParaRPr lang="en-US" dirty="0"/>
           </a:p>
@@ -3662,7 +3715,7 @@
             <a:fld id="{E6F9B8CD-342D-4579-98EC-A8FD6B7370E1}" type="datetimeFigureOut">
               <a:rPr lang="en-US" smtClean="0"/>
               <a:pPr/>
-              <a:t>23/8/2015</a:t>
+              <a:t>24/8/2015</a:t>
             </a:fld>
             <a:endParaRPr lang="en-US"/>
           </a:p>
@@ -3839,7 +3892,7 @@
             <a:fld id="{E6F9B8CD-342D-4579-98EC-A8FD6B7370E1}" type="datetimeFigureOut">
               <a:rPr lang="en-US" smtClean="0"/>
               <a:pPr/>
-              <a:t>23/8/2015</a:t>
+              <a:t>24/8/2015</a:t>
             </a:fld>
             <a:endParaRPr lang="en-US"/>
           </a:p>
@@ -4012,7 +4065,7 @@
             <a:fld id="{E6F9B8CD-342D-4579-98EC-A8FD6B7370E1}" type="datetimeFigureOut">
               <a:rPr lang="en-US" smtClean="0"/>
               <a:pPr algn="r" eaLnBrk="1" latinLnBrk="0" hangingPunct="1"/>
-              <a:t>23/8/2015</a:t>
+              <a:t>24/8/2015</a:t>
             </a:fld>
             <a:endParaRPr lang="en-US"/>
           </a:p>
@@ -4225,7 +4278,7 @@
             <a:fld id="{E6F9B8CD-342D-4579-98EC-A8FD6B7370E1}" type="datetimeFigureOut">
               <a:rPr lang="en-US" smtClean="0"/>
               <a:pPr/>
-              <a:t>23/8/2015</a:t>
+              <a:t>24/8/2015</a:t>
             </a:fld>
             <a:endParaRPr lang="en-US"/>
           </a:p>
@@ -5041,7 +5094,7 @@
             <a:fld id="{E6F9B8CD-342D-4579-98EC-A8FD6B7370E1}" type="datetimeFigureOut">
               <a:rPr lang="en-US" smtClean="0"/>
               <a:pPr/>
-              <a:t>23/8/2015</a:t>
+              <a:t>24/8/2015</a:t>
             </a:fld>
             <a:endParaRPr lang="en-US"/>
           </a:p>
@@ -5279,7 +5332,7 @@
             <a:fld id="{E6F9B8CD-342D-4579-98EC-A8FD6B7370E1}" type="datetimeFigureOut">
               <a:rPr lang="en-US" smtClean="0"/>
               <a:pPr/>
-              <a:t>23/8/2015</a:t>
+              <a:t>24/8/2015</a:t>
             </a:fld>
             <a:endParaRPr lang="en-US"/>
           </a:p>
@@ -5605,7 +5658,7 @@
             <a:fld id="{E6F9B8CD-342D-4579-98EC-A8FD6B7370E1}" type="datetimeFigureOut">
               <a:rPr lang="en-US" smtClean="0"/>
               <a:pPr algn="r" eaLnBrk="1" latinLnBrk="0" hangingPunct="1"/>
-              <a:t>23/8/2015</a:t>
+              <a:t>24/8/2015</a:t>
             </a:fld>
             <a:endParaRPr lang="en-US"/>
           </a:p>
@@ -5698,7 +5751,7 @@
             <a:fld id="{E6F9B8CD-342D-4579-98EC-A8FD6B7370E1}" type="datetimeFigureOut">
               <a:rPr lang="en-US" smtClean="0"/>
               <a:pPr/>
-              <a:t>23/8/2015</a:t>
+              <a:t>24/8/2015</a:t>
             </a:fld>
             <a:endParaRPr lang="en-US"/>
           </a:p>
@@ -6218,7 +6271,7 @@
             <a:fld id="{E6F9B8CD-342D-4579-98EC-A8FD6B7370E1}" type="datetimeFigureOut">
               <a:rPr lang="en-US" smtClean="0"/>
               <a:pPr algn="r" eaLnBrk="1" latinLnBrk="0" hangingPunct="1"/>
-              <a:t>23/8/2015</a:t>
+              <a:t>24/8/2015</a:t>
             </a:fld>
             <a:endParaRPr lang="en-US" dirty="0"/>
           </a:p>
@@ -6733,7 +6786,7 @@
             <a:fld id="{E6F9B8CD-342D-4579-98EC-A8FD6B7370E1}" type="datetimeFigureOut">
               <a:rPr lang="en-US" smtClean="0"/>
               <a:pPr algn="r" eaLnBrk="1" latinLnBrk="0" hangingPunct="1"/>
-              <a:t>23/8/2015</a:t>
+              <a:t>24/8/2015</a:t>
             </a:fld>
             <a:endParaRPr lang="en-US"/>
           </a:p>
@@ -6982,7 +7035,7 @@
             <a:fld id="{E6F9B8CD-342D-4579-98EC-A8FD6B7370E1}" type="datetimeFigureOut">
               <a:rPr lang="en-US" smtClean="0"/>
               <a:pPr algn="r" eaLnBrk="1" latinLnBrk="0" hangingPunct="1"/>
-              <a:t>23/8/2015</a:t>
+              <a:t>24/8/2015</a:t>
             </a:fld>
             <a:endParaRPr lang="en-US" dirty="0">
               <a:solidFill>
@@ -7952,11 +8005,7 @@
             </a:pPr>
             <a:r>
               <a:rPr lang="en-US" sz="1800" dirty="0" smtClean="0"/>
-              <a:t>Building great products depends on great </a:t>
-            </a:r>
-            <a:r>
-              <a:rPr lang="en-US" sz="1800" dirty="0" smtClean="0"/>
-              <a:t>people.</a:t>
+              <a:t>Building great products depends on great people.</a:t>
             </a:r>
           </a:p>
           <a:p>
@@ -7965,15 +8014,7 @@
             </a:pPr>
             <a:r>
               <a:rPr lang="en-US" sz="1800" dirty="0" smtClean="0"/>
-              <a:t>And there </a:t>
-            </a:r>
-            <a:r>
-              <a:rPr lang="en-US" sz="1800" dirty="0" smtClean="0"/>
-              <a:t>are more than 40,000 </a:t>
-            </a:r>
-            <a:r>
-              <a:rPr lang="en-US" sz="1800" dirty="0" smtClean="0"/>
-              <a:t>“</a:t>
+              <a:t>And there are more than 40,000 “</a:t>
             </a:r>
             <a:r>
               <a:rPr lang="en-US" sz="1800" dirty="0" err="1" smtClean="0"/>
@@ -7981,23 +8022,7 @@
             </a:r>
             <a:r>
               <a:rPr lang="en-US" sz="1800" dirty="0" smtClean="0"/>
-              <a:t>” behind </a:t>
-            </a:r>
-            <a:r>
-              <a:rPr lang="en-US" sz="1800" dirty="0" smtClean="0"/>
-              <a:t>the tools that </a:t>
-            </a:r>
-            <a:r>
-              <a:rPr lang="en-US" sz="1800" dirty="0" smtClean="0"/>
-              <a:t>we use </a:t>
-            </a:r>
-            <a:r>
-              <a:rPr lang="en-US" sz="1800" dirty="0" smtClean="0"/>
-              <a:t>every </a:t>
-            </a:r>
-            <a:r>
-              <a:rPr lang="en-US" sz="1800" dirty="0" smtClean="0"/>
-              <a:t>day…</a:t>
+              <a:t>” behind the tools that we use every day…</a:t>
             </a:r>
           </a:p>
           <a:p>
@@ -8046,8 +8071,10 @@
                   </a:schemeClr>
                 </a:solidFill>
               </a:rPr>
-              <a:t>Believes </a:t>
-            </a:r>
+              <a:t>Believes that treating people well is more important than making a lot of money.</a:t>
+            </a:r>
+          </a:p>
+          <a:p>
             <a:r>
               <a:rPr lang="en-US" sz="1800" dirty="0" smtClean="0">
                 <a:solidFill>
@@ -8057,8 +8084,10 @@
                   </a:schemeClr>
                 </a:solidFill>
               </a:rPr>
-              <a:t>that treating people well is more important than making a lot of money</a:t>
-            </a:r>
+              <a:t>Employees' ideas are very important.</a:t>
+            </a:r>
+          </a:p>
+          <a:p>
             <a:r>
               <a:rPr lang="en-US" sz="1800" dirty="0" smtClean="0">
                 <a:solidFill>
@@ -8068,7 +8097,7 @@
                   </a:schemeClr>
                 </a:solidFill>
               </a:rPr>
-              <a:t>.</a:t>
+              <a:t>Google offers a unique program called "The 20% project“</a:t>
             </a:r>
           </a:p>
           <a:p>
@@ -8081,10 +8110,10 @@
                   </a:schemeClr>
                 </a:solidFill>
               </a:rPr>
-              <a:t>Employees</a:t>
-            </a:r>
-            <a:r>
-              <a:rPr lang="en-US" sz="1800" dirty="0" smtClean="0">
+              <a:t>By Google “TGIC” </a:t>
+            </a:r>
+            <a:r>
+              <a:rPr lang="en-US" sz="1800" dirty="0" err="1" smtClean="0">
                 <a:solidFill>
                   <a:schemeClr val="tx1">
                     <a:lumMod val="85000"/>
@@ -8092,7 +8121,7 @@
                   </a:schemeClr>
                 </a:solidFill>
               </a:rPr>
-              <a:t>' ideas </a:t>
+              <a:t>QandA</a:t>
             </a:r>
             <a:r>
               <a:rPr lang="en-US" sz="1800" dirty="0" smtClean="0">
@@ -8103,10 +8132,10 @@
                   </a:schemeClr>
                 </a:solidFill>
               </a:rPr>
-              <a:t>are </a:t>
-            </a:r>
-            <a:r>
-              <a:rPr lang="en-US" sz="1800" dirty="0" smtClean="0">
+              <a:t> program </a:t>
+            </a:r>
+            <a:r>
+              <a:rPr lang="en-US" sz="1800" dirty="0" err="1" smtClean="0">
                 <a:solidFill>
                   <a:schemeClr val="tx1">
                     <a:lumMod val="85000"/>
@@ -8114,7 +8143,7 @@
                   </a:schemeClr>
                 </a:solidFill>
               </a:rPr>
-              <a:t>very </a:t>
+              <a:t>Googlers</a:t>
             </a:r>
             <a:r>
               <a:rPr lang="en-US" sz="1800" dirty="0" smtClean="0">
@@ -8125,99 +8154,7 @@
                   </a:schemeClr>
                 </a:solidFill>
               </a:rPr>
-              <a:t>important.</a:t>
-            </a:r>
-          </a:p>
-          <a:p>
-            <a:r>
-              <a:rPr lang="en-US" sz="1800" dirty="0" smtClean="0">
-                <a:solidFill>
-                  <a:schemeClr val="tx1">
-                    <a:lumMod val="85000"/>
-                    <a:lumOff val="15000"/>
-                  </a:schemeClr>
-                </a:solidFill>
-              </a:rPr>
-              <a:t>Google offers a unique program called "The 20% </a:t>
-            </a:r>
-            <a:r>
-              <a:rPr lang="en-US" sz="1800" dirty="0" smtClean="0">
-                <a:solidFill>
-                  <a:schemeClr val="tx1">
-                    <a:lumMod val="85000"/>
-                    <a:lumOff val="15000"/>
-                  </a:schemeClr>
-                </a:solidFill>
-              </a:rPr>
-              <a:t>project“</a:t>
-            </a:r>
-          </a:p>
-          <a:p>
-            <a:r>
-              <a:rPr lang="en-US" sz="1800" dirty="0" smtClean="0">
-                <a:solidFill>
-                  <a:schemeClr val="tx1">
-                    <a:lumMod val="85000"/>
-                    <a:lumOff val="15000"/>
-                  </a:schemeClr>
-                </a:solidFill>
-              </a:rPr>
-              <a:t>By Google “TGIC” </a:t>
-            </a:r>
-            <a:r>
-              <a:rPr lang="en-US" sz="1800" dirty="0" err="1" smtClean="0">
-                <a:solidFill>
-                  <a:schemeClr val="tx1">
-                    <a:lumMod val="85000"/>
-                    <a:lumOff val="15000"/>
-                  </a:schemeClr>
-                </a:solidFill>
-              </a:rPr>
-              <a:t>QandA</a:t>
-            </a:r>
-            <a:r>
-              <a:rPr lang="en-US" sz="1800" dirty="0" smtClean="0">
-                <a:solidFill>
-                  <a:schemeClr val="tx1">
-                    <a:lumMod val="85000"/>
-                    <a:lumOff val="15000"/>
-                  </a:schemeClr>
-                </a:solidFill>
-              </a:rPr>
-              <a:t> program </a:t>
-            </a:r>
-            <a:r>
-              <a:rPr lang="en-US" sz="1800" dirty="0" err="1" smtClean="0">
-                <a:solidFill>
-                  <a:schemeClr val="tx1">
-                    <a:lumMod val="85000"/>
-                    <a:lumOff val="15000"/>
-                  </a:schemeClr>
-                </a:solidFill>
-              </a:rPr>
-              <a:t>Googlers</a:t>
-            </a:r>
-            <a:r>
-              <a:rPr lang="en-US" sz="1800" dirty="0" smtClean="0">
-                <a:solidFill>
-                  <a:schemeClr val="tx1">
-                    <a:lumMod val="85000"/>
-                    <a:lumOff val="15000"/>
-                  </a:schemeClr>
-                </a:solidFill>
-              </a:rPr>
-              <a:t> ask questions directly to Larry, Sergey and other execs about any number of company </a:t>
-            </a:r>
-            <a:r>
-              <a:rPr lang="en-US" sz="1800" dirty="0" smtClean="0">
-                <a:solidFill>
-                  <a:schemeClr val="tx1">
-                    <a:lumMod val="85000"/>
-                    <a:lumOff val="15000"/>
-                  </a:schemeClr>
-                </a:solidFill>
-              </a:rPr>
-              <a:t>issues.</a:t>
+              <a:t> ask questions directly to Larry, Sergey and other execs about any number of company issues.</a:t>
             </a:r>
           </a:p>
           <a:p>
@@ -8588,15 +8525,7 @@
             </a:pPr>
             <a:r>
               <a:rPr lang="en-US" sz="1800" dirty="0" smtClean="0"/>
-              <a:t>Google wrote these </a:t>
-            </a:r>
-            <a:r>
-              <a:rPr lang="en-US" sz="1800" dirty="0" smtClean="0"/>
-              <a:t>“10 things” when Google was just a few years </a:t>
-            </a:r>
-            <a:r>
-              <a:rPr lang="en-US" sz="1800" dirty="0" smtClean="0"/>
-              <a:t>old. Google still following it.</a:t>
+              <a:t>Google wrote these “10 things” when Google was just a few years old. Google still following it.</a:t>
             </a:r>
             <a:endParaRPr lang="en-US" sz="1800" dirty="0" smtClean="0">
               <a:solidFill>
@@ -8735,12 +8664,7 @@
             <p:ph type="title"/>
           </p:nvPr>
         </p:nvSpPr>
-        <p:spPr>
-          <a:xfrm>
-            <a:off x="457200" y="274638"/>
-            <a:ext cx="8274908" cy="715962"/>
-          </a:xfrm>
-        </p:spPr>
+        <p:spPr/>
         <p:txBody>
           <a:bodyPr/>
           <a:lstStyle/>
@@ -8804,434 +8728,10 @@
             <a:r>
               <a:rPr lang="en-US" sz="2400" b="1" dirty="0" smtClean="0">
                 <a:solidFill>
-                  <a:srgbClr val="1B79D7"/>
-                </a:solidFill>
-              </a:rPr>
-              <a:t>Evolution</a:t>
-            </a:r>
-            <a:endParaRPr lang="en-US" dirty="0"/>
-          </a:p>
-        </p:txBody>
-      </p:sp>
-      <p:pic>
-        <p:nvPicPr>
-          <p:cNvPr id="5" name="Content Placeholder 4" descr="part1.jpg"/>
-          <p:cNvPicPr>
-            <a:picLocks noGrp="1" noChangeAspect="1"/>
-          </p:cNvPicPr>
-          <p:nvPr>
-            <p:ph sz="quarter" idx="1"/>
-          </p:nvPr>
-        </p:nvPicPr>
-        <p:blipFill>
-          <a:blip r:embed="rId2" cstate="print"/>
-          <a:stretch>
-            <a:fillRect/>
-          </a:stretch>
-        </p:blipFill>
-        <p:spPr>
-          <a:xfrm>
-            <a:off x="228600" y="990600"/>
-            <a:ext cx="8458200" cy="5867400"/>
-          </a:xfrm>
-        </p:spPr>
-      </p:pic>
-    </p:spTree>
-  </p:cSld>
-  <p:clrMapOvr>
-    <a:masterClrMapping/>
-  </p:clrMapOvr>
-  <p:timing>
-    <p:tnLst>
-      <p:par>
-        <p:cTn id="1" dur="indefinite" restart="never" nodeType="tmRoot"/>
-      </p:par>
-    </p:tnLst>
-  </p:timing>
-</p:sld>
-</file>
-
-<file path=ppt/slides/slide15.xml><?xml version="1.0" encoding="utf-8"?>
-<p:sld xmlns:a="http://schemas.openxmlformats.org/drawingml/2006/main" xmlns:r="http://schemas.openxmlformats.org/officeDocument/2006/relationships" xmlns:p="http://schemas.openxmlformats.org/presentationml/2006/main">
-  <p:cSld>
-    <p:spTree>
-      <p:nvGrpSpPr>
-        <p:cNvPr id="1" name=""/>
-        <p:cNvGrpSpPr/>
-        <p:nvPr/>
-      </p:nvGrpSpPr>
-      <p:grpSpPr>
-        <a:xfrm>
-          <a:off x="0" y="0"/>
-          <a:ext cx="0" cy="0"/>
-          <a:chOff x="0" y="0"/>
-          <a:chExt cx="0" cy="0"/>
-        </a:xfrm>
-      </p:grpSpPr>
-      <p:sp>
-        <p:nvSpPr>
-          <p:cNvPr id="11" name="Title 10"/>
-          <p:cNvSpPr>
-            <a:spLocks noGrp="1"/>
-          </p:cNvSpPr>
-          <p:nvPr>
-            <p:ph type="title"/>
-          </p:nvPr>
-        </p:nvSpPr>
-        <p:spPr>
-          <a:xfrm>
-            <a:off x="457200" y="274638"/>
-            <a:ext cx="8274908" cy="715962"/>
-          </a:xfrm>
-        </p:spPr>
-        <p:txBody>
-          <a:bodyPr/>
-          <a:lstStyle/>
-          <a:p>
-            <a:r>
-              <a:rPr lang="en-US" sz="3200" b="1" dirty="0" smtClean="0">
-                <a:solidFill>
-                  <a:schemeClr val="accent2"/>
-                </a:solidFill>
-              </a:rPr>
-              <a:t>G</a:t>
-            </a:r>
-            <a:r>
-              <a:rPr lang="en-US" sz="3200" b="1" dirty="0" smtClean="0">
-                <a:solidFill>
-                  <a:srgbClr val="FF0000"/>
-                </a:solidFill>
-              </a:rPr>
-              <a:t>o</a:t>
-            </a:r>
-            <a:r>
-              <a:rPr lang="en-US" sz="3200" b="1" dirty="0" smtClean="0">
-                <a:solidFill>
-                  <a:srgbClr val="FFF529"/>
-                </a:solidFill>
-              </a:rPr>
-              <a:t>o</a:t>
-            </a:r>
-            <a:r>
-              <a:rPr lang="en-US" sz="3200" b="1" dirty="0" smtClean="0">
-                <a:solidFill>
-                  <a:srgbClr val="1B79D7"/>
-                </a:solidFill>
-              </a:rPr>
-              <a:t>g</a:t>
-            </a:r>
-            <a:r>
-              <a:rPr lang="en-US" sz="3200" b="1" dirty="0" smtClean="0">
-                <a:solidFill>
-                  <a:srgbClr val="009900"/>
-                </a:solidFill>
-              </a:rPr>
-              <a:t>l</a:t>
-            </a:r>
-            <a:r>
-              <a:rPr lang="en-US" sz="3200" b="1" dirty="0" smtClean="0">
-                <a:solidFill>
-                  <a:srgbClr val="ED483D"/>
-                </a:solidFill>
-              </a:rPr>
-              <a:t>e</a:t>
-            </a:r>
-            <a:r>
-              <a:rPr lang="en-US" sz="3200" b="1" dirty="0" smtClean="0">
-                <a:solidFill>
-                  <a:schemeClr val="accent1"/>
-                </a:solidFill>
-              </a:rPr>
-              <a:t> </a:t>
-            </a:r>
-            <a:r>
-              <a:rPr lang="en-US" sz="2400" b="1" dirty="0" smtClean="0">
-                <a:solidFill>
-                  <a:srgbClr val="1B79D7"/>
-                </a:solidFill>
-              </a:rPr>
-              <a:t>Evolution</a:t>
-            </a:r>
-            <a:endParaRPr lang="en-US" dirty="0"/>
-          </a:p>
-        </p:txBody>
-      </p:sp>
-      <p:pic>
-        <p:nvPicPr>
-          <p:cNvPr id="5" name="Content Placeholder 4" descr="part2.jpg"/>
-          <p:cNvPicPr>
-            <a:picLocks noGrp="1" noChangeAspect="1"/>
-          </p:cNvPicPr>
-          <p:nvPr>
-            <p:ph sz="quarter" idx="1"/>
-          </p:nvPr>
-        </p:nvPicPr>
-        <p:blipFill>
-          <a:blip r:embed="rId2" cstate="print"/>
-          <a:stretch>
-            <a:fillRect/>
-          </a:stretch>
-        </p:blipFill>
-        <p:spPr>
-          <a:xfrm>
-            <a:off x="152400" y="914400"/>
-            <a:ext cx="8686800" cy="5943599"/>
-          </a:xfrm>
-        </p:spPr>
-      </p:pic>
-    </p:spTree>
-  </p:cSld>
-  <p:clrMapOvr>
-    <a:masterClrMapping/>
-  </p:clrMapOvr>
-  <p:timing>
-    <p:tnLst>
-      <p:par>
-        <p:cTn id="1" dur="indefinite" restart="never" nodeType="tmRoot"/>
-      </p:par>
-    </p:tnLst>
-  </p:timing>
-</p:sld>
-</file>
-
-<file path=ppt/slides/slide16.xml><?xml version="1.0" encoding="utf-8"?>
-<p:sld xmlns:a="http://schemas.openxmlformats.org/drawingml/2006/main" xmlns:r="http://schemas.openxmlformats.org/officeDocument/2006/relationships" xmlns:p="http://schemas.openxmlformats.org/presentationml/2006/main">
-  <p:cSld>
-    <p:spTree>
-      <p:nvGrpSpPr>
-        <p:cNvPr id="1" name=""/>
-        <p:cNvGrpSpPr/>
-        <p:nvPr/>
-      </p:nvGrpSpPr>
-      <p:grpSpPr>
-        <a:xfrm>
-          <a:off x="0" y="0"/>
-          <a:ext cx="0" cy="0"/>
-          <a:chOff x="0" y="0"/>
-          <a:chExt cx="0" cy="0"/>
-        </a:xfrm>
-      </p:grpSpPr>
-      <p:sp>
-        <p:nvSpPr>
-          <p:cNvPr id="11" name="Title 10"/>
-          <p:cNvSpPr>
-            <a:spLocks noGrp="1"/>
-          </p:cNvSpPr>
-          <p:nvPr>
-            <p:ph type="title"/>
-          </p:nvPr>
-        </p:nvSpPr>
-        <p:spPr>
-          <a:xfrm>
-            <a:off x="457200" y="274638"/>
-            <a:ext cx="8274908" cy="715962"/>
-          </a:xfrm>
-        </p:spPr>
-        <p:txBody>
-          <a:bodyPr/>
-          <a:lstStyle/>
-          <a:p>
-            <a:r>
-              <a:rPr lang="en-US" sz="3200" b="1" dirty="0" smtClean="0">
-                <a:solidFill>
-                  <a:schemeClr val="accent2"/>
-                </a:solidFill>
-              </a:rPr>
-              <a:t>G</a:t>
-            </a:r>
-            <a:r>
-              <a:rPr lang="en-US" sz="3200" b="1" dirty="0" smtClean="0">
-                <a:solidFill>
-                  <a:srgbClr val="FF0000"/>
-                </a:solidFill>
-              </a:rPr>
-              <a:t>o</a:t>
-            </a:r>
-            <a:r>
-              <a:rPr lang="en-US" sz="3200" b="1" dirty="0" smtClean="0">
-                <a:solidFill>
-                  <a:srgbClr val="FFF529"/>
-                </a:solidFill>
-              </a:rPr>
-              <a:t>o</a:t>
-            </a:r>
-            <a:r>
-              <a:rPr lang="en-US" sz="3200" b="1" dirty="0" smtClean="0">
-                <a:solidFill>
-                  <a:srgbClr val="1B79D7"/>
-                </a:solidFill>
-              </a:rPr>
-              <a:t>g</a:t>
-            </a:r>
-            <a:r>
-              <a:rPr lang="en-US" sz="3200" b="1" dirty="0" smtClean="0">
-                <a:solidFill>
-                  <a:srgbClr val="009900"/>
-                </a:solidFill>
-              </a:rPr>
-              <a:t>l</a:t>
-            </a:r>
-            <a:r>
-              <a:rPr lang="en-US" sz="3200" b="1" dirty="0" smtClean="0">
-                <a:solidFill>
-                  <a:srgbClr val="ED483D"/>
-                </a:solidFill>
-              </a:rPr>
-              <a:t>e</a:t>
-            </a:r>
-            <a:r>
-              <a:rPr lang="en-US" sz="3200" b="1" dirty="0" smtClean="0">
-                <a:solidFill>
-                  <a:schemeClr val="accent1"/>
-                </a:solidFill>
-              </a:rPr>
-              <a:t> </a:t>
-            </a:r>
-            <a:r>
-              <a:rPr lang="en-US" sz="2400" b="1" dirty="0" smtClean="0">
-                <a:solidFill>
-                  <a:srgbClr val="1B79D7"/>
-                </a:solidFill>
-              </a:rPr>
-              <a:t>Evolution</a:t>
-            </a:r>
-            <a:endParaRPr lang="en-US" dirty="0"/>
-          </a:p>
-        </p:txBody>
-      </p:sp>
-      <p:pic>
-        <p:nvPicPr>
-          <p:cNvPr id="5" name="Content Placeholder 4" descr="part3.jpg"/>
-          <p:cNvPicPr>
-            <a:picLocks noGrp="1" noChangeAspect="1"/>
-          </p:cNvPicPr>
-          <p:nvPr>
-            <p:ph sz="quarter" idx="1"/>
-          </p:nvPr>
-        </p:nvPicPr>
-        <p:blipFill>
-          <a:blip r:embed="rId2"/>
-          <a:stretch>
-            <a:fillRect/>
-          </a:stretch>
-        </p:blipFill>
-        <p:spPr>
-          <a:xfrm>
-            <a:off x="228600" y="914400"/>
-            <a:ext cx="8534400" cy="5943600"/>
-          </a:xfrm>
-        </p:spPr>
-      </p:pic>
-    </p:spTree>
-  </p:cSld>
-  <p:clrMapOvr>
-    <a:masterClrMapping/>
-  </p:clrMapOvr>
-  <p:timing>
-    <p:tnLst>
-      <p:par>
-        <p:cTn id="1" dur="indefinite" restart="never" nodeType="tmRoot"/>
-      </p:par>
-    </p:tnLst>
-  </p:timing>
-</p:sld>
-</file>
-
-<file path=ppt/slides/slide17.xml><?xml version="1.0" encoding="utf-8"?>
-<p:sld xmlns:a="http://schemas.openxmlformats.org/drawingml/2006/main" xmlns:r="http://schemas.openxmlformats.org/officeDocument/2006/relationships" xmlns:p="http://schemas.openxmlformats.org/presentationml/2006/main">
-  <p:cSld>
-    <p:spTree>
-      <p:nvGrpSpPr>
-        <p:cNvPr id="1" name=""/>
-        <p:cNvGrpSpPr/>
-        <p:nvPr/>
-      </p:nvGrpSpPr>
-      <p:grpSpPr>
-        <a:xfrm>
-          <a:off x="0" y="0"/>
-          <a:ext cx="0" cy="0"/>
-          <a:chOff x="0" y="0"/>
-          <a:chExt cx="0" cy="0"/>
-        </a:xfrm>
-      </p:grpSpPr>
-      <p:sp>
-        <p:nvSpPr>
-          <p:cNvPr id="11" name="Title 10"/>
-          <p:cNvSpPr>
-            <a:spLocks noGrp="1"/>
-          </p:cNvSpPr>
-          <p:nvPr>
-            <p:ph type="title"/>
-          </p:nvPr>
-        </p:nvSpPr>
-        <p:spPr/>
-        <p:txBody>
-          <a:bodyPr/>
-          <a:lstStyle/>
-          <a:p>
-            <a:r>
-              <a:rPr lang="en-US" sz="3200" b="1" dirty="0" smtClean="0">
-                <a:solidFill>
-                  <a:schemeClr val="accent2"/>
-                </a:solidFill>
-              </a:rPr>
-              <a:t>G</a:t>
-            </a:r>
-            <a:r>
-              <a:rPr lang="en-US" sz="3200" b="1" dirty="0" smtClean="0">
-                <a:solidFill>
-                  <a:srgbClr val="FF0000"/>
-                </a:solidFill>
-              </a:rPr>
-              <a:t>o</a:t>
-            </a:r>
-            <a:r>
-              <a:rPr lang="en-US" sz="3200" b="1" dirty="0" smtClean="0">
-                <a:solidFill>
-                  <a:srgbClr val="FFF529"/>
-                </a:solidFill>
-              </a:rPr>
-              <a:t>o</a:t>
-            </a:r>
-            <a:r>
-              <a:rPr lang="en-US" sz="3200" b="1" dirty="0" smtClean="0">
-                <a:solidFill>
-                  <a:srgbClr val="1B79D7"/>
-                </a:solidFill>
-              </a:rPr>
-              <a:t>g</a:t>
-            </a:r>
-            <a:r>
-              <a:rPr lang="en-US" sz="3200" b="1" dirty="0" smtClean="0">
-                <a:solidFill>
-                  <a:srgbClr val="009900"/>
-                </a:solidFill>
-              </a:rPr>
-              <a:t>l</a:t>
-            </a:r>
-            <a:r>
-              <a:rPr lang="en-US" sz="3200" b="1" dirty="0" smtClean="0">
-                <a:solidFill>
-                  <a:srgbClr val="ED483D"/>
-                </a:solidFill>
-              </a:rPr>
-              <a:t>e</a:t>
-            </a:r>
-            <a:r>
-              <a:rPr lang="en-US" sz="3200" b="1" dirty="0" smtClean="0">
-                <a:solidFill>
-                  <a:schemeClr val="accent1"/>
-                </a:solidFill>
-              </a:rPr>
-              <a:t> </a:t>
-            </a:r>
-            <a:r>
-              <a:rPr lang="en-US" sz="2400" b="1" dirty="0" smtClean="0">
-                <a:solidFill>
-                  <a:schemeClr val="accent2"/>
-                </a:solidFill>
-              </a:rPr>
-              <a:t>Mission</a:t>
+                  <a:srgbClr val="1F74DB"/>
+                </a:solidFill>
+              </a:rPr>
+              <a:t>What we do?</a:t>
             </a:r>
             <a:r>
               <a:rPr lang="en-US" sz="3200" b="1" dirty="0" smtClean="0">
@@ -9291,9 +8791,17 @@
             <a:pPr>
               <a:buNone/>
             </a:pPr>
-            <a:endParaRPr lang="en-US" sz="3600" b="1" dirty="0" smtClean="0">
+            <a:r>
+              <a:rPr lang="en-US" sz="2000" b="1" dirty="0" smtClean="0">
+                <a:solidFill>
+                  <a:srgbClr val="1F74DB"/>
+                </a:solidFill>
+              </a:rPr>
+              <a:t>Google Mission:</a:t>
+            </a:r>
+            <a:endParaRPr lang="en-US" sz="2000" b="1" dirty="0" smtClean="0">
               <a:solidFill>
-                <a:schemeClr val="accent2"/>
+                <a:srgbClr val="1F74DB"/>
               </a:solidFill>
             </a:endParaRPr>
           </a:p>
@@ -9667,7 +9175,7 @@
 </p:sld>
 </file>
 
-<file path=ppt/slides/slide18.xml><?xml version="1.0" encoding="utf-8"?>
+<file path=ppt/slides/slide15.xml><?xml version="1.0" encoding="utf-8"?>
 <p:sld xmlns:a="http://schemas.openxmlformats.org/drawingml/2006/main" xmlns:r="http://schemas.openxmlformats.org/officeDocument/2006/relationships" xmlns:p="http://schemas.openxmlformats.org/presentationml/2006/main">
   <p:cSld>
     <p:spTree>
@@ -10485,6 +9993,435 @@
 </p:sld>
 </file>
 
+<file path=ppt/slides/slide16.xml><?xml version="1.0" encoding="utf-8"?>
+<p:sld xmlns:a="http://schemas.openxmlformats.org/drawingml/2006/main" xmlns:r="http://schemas.openxmlformats.org/officeDocument/2006/relationships" xmlns:p="http://schemas.openxmlformats.org/presentationml/2006/main">
+  <p:cSld>
+    <p:spTree>
+      <p:nvGrpSpPr>
+        <p:cNvPr id="1" name=""/>
+        <p:cNvGrpSpPr/>
+        <p:nvPr/>
+      </p:nvGrpSpPr>
+      <p:grpSpPr>
+        <a:xfrm>
+          <a:off x="0" y="0"/>
+          <a:ext cx="0" cy="0"/>
+          <a:chOff x="0" y="0"/>
+          <a:chExt cx="0" cy="0"/>
+        </a:xfrm>
+      </p:grpSpPr>
+      <p:sp>
+        <p:nvSpPr>
+          <p:cNvPr id="11" name="Title 10"/>
+          <p:cNvSpPr>
+            <a:spLocks noGrp="1"/>
+          </p:cNvSpPr>
+          <p:nvPr>
+            <p:ph type="title"/>
+          </p:nvPr>
+        </p:nvSpPr>
+        <p:spPr>
+          <a:xfrm>
+            <a:off x="457200" y="274638"/>
+            <a:ext cx="8274908" cy="715962"/>
+          </a:xfrm>
+        </p:spPr>
+        <p:txBody>
+          <a:bodyPr/>
+          <a:lstStyle/>
+          <a:p>
+            <a:r>
+              <a:rPr lang="en-US" sz="3200" b="1" dirty="0" smtClean="0">
+                <a:solidFill>
+                  <a:schemeClr val="accent2"/>
+                </a:solidFill>
+              </a:rPr>
+              <a:t>G</a:t>
+            </a:r>
+            <a:r>
+              <a:rPr lang="en-US" sz="3200" b="1" dirty="0" smtClean="0">
+                <a:solidFill>
+                  <a:srgbClr val="FF0000"/>
+                </a:solidFill>
+              </a:rPr>
+              <a:t>o</a:t>
+            </a:r>
+            <a:r>
+              <a:rPr lang="en-US" sz="3200" b="1" dirty="0" smtClean="0">
+                <a:solidFill>
+                  <a:srgbClr val="FFF529"/>
+                </a:solidFill>
+              </a:rPr>
+              <a:t>o</a:t>
+            </a:r>
+            <a:r>
+              <a:rPr lang="en-US" sz="3200" b="1" dirty="0" smtClean="0">
+                <a:solidFill>
+                  <a:srgbClr val="1B79D7"/>
+                </a:solidFill>
+              </a:rPr>
+              <a:t>g</a:t>
+            </a:r>
+            <a:r>
+              <a:rPr lang="en-US" sz="3200" b="1" dirty="0" smtClean="0">
+                <a:solidFill>
+                  <a:srgbClr val="009900"/>
+                </a:solidFill>
+              </a:rPr>
+              <a:t>l</a:t>
+            </a:r>
+            <a:r>
+              <a:rPr lang="en-US" sz="3200" b="1" dirty="0" smtClean="0">
+                <a:solidFill>
+                  <a:srgbClr val="ED483D"/>
+                </a:solidFill>
+              </a:rPr>
+              <a:t>e</a:t>
+            </a:r>
+            <a:r>
+              <a:rPr lang="en-US" sz="3200" b="1" dirty="0" smtClean="0">
+                <a:solidFill>
+                  <a:schemeClr val="accent1"/>
+                </a:solidFill>
+              </a:rPr>
+              <a:t> </a:t>
+            </a:r>
+            <a:r>
+              <a:rPr lang="en-US" sz="2400" b="1" dirty="0" smtClean="0">
+                <a:solidFill>
+                  <a:srgbClr val="1B79D7"/>
+                </a:solidFill>
+              </a:rPr>
+              <a:t>Evolution</a:t>
+            </a:r>
+            <a:endParaRPr lang="en-US" dirty="0"/>
+          </a:p>
+        </p:txBody>
+      </p:sp>
+      <p:pic>
+        <p:nvPicPr>
+          <p:cNvPr id="5" name="Content Placeholder 4" descr="part1.jpg"/>
+          <p:cNvPicPr>
+            <a:picLocks noGrp="1" noChangeAspect="1"/>
+          </p:cNvPicPr>
+          <p:nvPr>
+            <p:ph sz="quarter" idx="1"/>
+          </p:nvPr>
+        </p:nvPicPr>
+        <p:blipFill>
+          <a:blip r:embed="rId2" cstate="print"/>
+          <a:stretch>
+            <a:fillRect/>
+          </a:stretch>
+        </p:blipFill>
+        <p:spPr>
+          <a:xfrm>
+            <a:off x="228600" y="990600"/>
+            <a:ext cx="8458200" cy="5867400"/>
+          </a:xfrm>
+        </p:spPr>
+      </p:pic>
+    </p:spTree>
+  </p:cSld>
+  <p:clrMapOvr>
+    <a:masterClrMapping/>
+  </p:clrMapOvr>
+  <p:timing>
+    <p:tnLst>
+      <p:par>
+        <p:cTn id="1" dur="indefinite" restart="never" nodeType="tmRoot"/>
+      </p:par>
+    </p:tnLst>
+  </p:timing>
+</p:sld>
+</file>
+
+<file path=ppt/slides/slide17.xml><?xml version="1.0" encoding="utf-8"?>
+<p:sld xmlns:a="http://schemas.openxmlformats.org/drawingml/2006/main" xmlns:r="http://schemas.openxmlformats.org/officeDocument/2006/relationships" xmlns:p="http://schemas.openxmlformats.org/presentationml/2006/main">
+  <p:cSld>
+    <p:spTree>
+      <p:nvGrpSpPr>
+        <p:cNvPr id="1" name=""/>
+        <p:cNvGrpSpPr/>
+        <p:nvPr/>
+      </p:nvGrpSpPr>
+      <p:grpSpPr>
+        <a:xfrm>
+          <a:off x="0" y="0"/>
+          <a:ext cx="0" cy="0"/>
+          <a:chOff x="0" y="0"/>
+          <a:chExt cx="0" cy="0"/>
+        </a:xfrm>
+      </p:grpSpPr>
+      <p:sp>
+        <p:nvSpPr>
+          <p:cNvPr id="11" name="Title 10"/>
+          <p:cNvSpPr>
+            <a:spLocks noGrp="1"/>
+          </p:cNvSpPr>
+          <p:nvPr>
+            <p:ph type="title"/>
+          </p:nvPr>
+        </p:nvSpPr>
+        <p:spPr>
+          <a:xfrm>
+            <a:off x="457200" y="274638"/>
+            <a:ext cx="8274908" cy="715962"/>
+          </a:xfrm>
+        </p:spPr>
+        <p:txBody>
+          <a:bodyPr/>
+          <a:lstStyle/>
+          <a:p>
+            <a:r>
+              <a:rPr lang="en-US" sz="3200" b="1" dirty="0" smtClean="0">
+                <a:solidFill>
+                  <a:schemeClr val="accent2"/>
+                </a:solidFill>
+              </a:rPr>
+              <a:t>G</a:t>
+            </a:r>
+            <a:r>
+              <a:rPr lang="en-US" sz="3200" b="1" dirty="0" smtClean="0">
+                <a:solidFill>
+                  <a:srgbClr val="FF0000"/>
+                </a:solidFill>
+              </a:rPr>
+              <a:t>o</a:t>
+            </a:r>
+            <a:r>
+              <a:rPr lang="en-US" sz="3200" b="1" dirty="0" smtClean="0">
+                <a:solidFill>
+                  <a:srgbClr val="FFF529"/>
+                </a:solidFill>
+              </a:rPr>
+              <a:t>o</a:t>
+            </a:r>
+            <a:r>
+              <a:rPr lang="en-US" sz="3200" b="1" dirty="0" smtClean="0">
+                <a:solidFill>
+                  <a:srgbClr val="1B79D7"/>
+                </a:solidFill>
+              </a:rPr>
+              <a:t>g</a:t>
+            </a:r>
+            <a:r>
+              <a:rPr lang="en-US" sz="3200" b="1" dirty="0" smtClean="0">
+                <a:solidFill>
+                  <a:srgbClr val="009900"/>
+                </a:solidFill>
+              </a:rPr>
+              <a:t>l</a:t>
+            </a:r>
+            <a:r>
+              <a:rPr lang="en-US" sz="3200" b="1" dirty="0" smtClean="0">
+                <a:solidFill>
+                  <a:srgbClr val="ED483D"/>
+                </a:solidFill>
+              </a:rPr>
+              <a:t>e</a:t>
+            </a:r>
+            <a:r>
+              <a:rPr lang="en-US" sz="3200" b="1" dirty="0" smtClean="0">
+                <a:solidFill>
+                  <a:schemeClr val="accent1"/>
+                </a:solidFill>
+              </a:rPr>
+              <a:t> </a:t>
+            </a:r>
+            <a:r>
+              <a:rPr lang="en-US" sz="2400" b="1" dirty="0" smtClean="0">
+                <a:solidFill>
+                  <a:srgbClr val="1B79D7"/>
+                </a:solidFill>
+              </a:rPr>
+              <a:t>Evolution</a:t>
+            </a:r>
+            <a:endParaRPr lang="en-US" dirty="0"/>
+          </a:p>
+        </p:txBody>
+      </p:sp>
+      <p:pic>
+        <p:nvPicPr>
+          <p:cNvPr id="5" name="Content Placeholder 4" descr="part2.jpg"/>
+          <p:cNvPicPr>
+            <a:picLocks noGrp="1" noChangeAspect="1"/>
+          </p:cNvPicPr>
+          <p:nvPr>
+            <p:ph sz="quarter" idx="1"/>
+          </p:nvPr>
+        </p:nvPicPr>
+        <p:blipFill>
+          <a:blip r:embed="rId2" cstate="print"/>
+          <a:stretch>
+            <a:fillRect/>
+          </a:stretch>
+        </p:blipFill>
+        <p:spPr>
+          <a:xfrm>
+            <a:off x="152400" y="914400"/>
+            <a:ext cx="8686800" cy="5943599"/>
+          </a:xfrm>
+        </p:spPr>
+      </p:pic>
+    </p:spTree>
+  </p:cSld>
+  <p:clrMapOvr>
+    <a:masterClrMapping/>
+  </p:clrMapOvr>
+  <p:timing>
+    <p:tnLst>
+      <p:par>
+        <p:cTn id="1" dur="indefinite" restart="never" nodeType="tmRoot"/>
+      </p:par>
+    </p:tnLst>
+  </p:timing>
+</p:sld>
+</file>
+
+<file path=ppt/slides/slide18.xml><?xml version="1.0" encoding="utf-8"?>
+<p:sld xmlns:a="http://schemas.openxmlformats.org/drawingml/2006/main" xmlns:r="http://schemas.openxmlformats.org/officeDocument/2006/relationships" xmlns:p="http://schemas.openxmlformats.org/presentationml/2006/main">
+  <p:cSld>
+    <p:spTree>
+      <p:nvGrpSpPr>
+        <p:cNvPr id="1" name=""/>
+        <p:cNvGrpSpPr/>
+        <p:nvPr/>
+      </p:nvGrpSpPr>
+      <p:grpSpPr>
+        <a:xfrm>
+          <a:off x="0" y="0"/>
+          <a:ext cx="0" cy="0"/>
+          <a:chOff x="0" y="0"/>
+          <a:chExt cx="0" cy="0"/>
+        </a:xfrm>
+      </p:grpSpPr>
+      <p:sp>
+        <p:nvSpPr>
+          <p:cNvPr id="11" name="Title 10"/>
+          <p:cNvSpPr>
+            <a:spLocks noGrp="1"/>
+          </p:cNvSpPr>
+          <p:nvPr>
+            <p:ph type="title"/>
+          </p:nvPr>
+        </p:nvSpPr>
+        <p:spPr>
+          <a:xfrm>
+            <a:off x="457200" y="274638"/>
+            <a:ext cx="8274908" cy="715962"/>
+          </a:xfrm>
+        </p:spPr>
+        <p:txBody>
+          <a:bodyPr/>
+          <a:lstStyle/>
+          <a:p>
+            <a:r>
+              <a:rPr lang="en-US" sz="3200" b="1" dirty="0" smtClean="0">
+                <a:solidFill>
+                  <a:schemeClr val="accent2"/>
+                </a:solidFill>
+              </a:rPr>
+              <a:t>G</a:t>
+            </a:r>
+            <a:r>
+              <a:rPr lang="en-US" sz="3200" b="1" dirty="0" smtClean="0">
+                <a:solidFill>
+                  <a:srgbClr val="FF0000"/>
+                </a:solidFill>
+              </a:rPr>
+              <a:t>o</a:t>
+            </a:r>
+            <a:r>
+              <a:rPr lang="en-US" sz="3200" b="1" dirty="0" smtClean="0">
+                <a:solidFill>
+                  <a:srgbClr val="FFF529"/>
+                </a:solidFill>
+              </a:rPr>
+              <a:t>o</a:t>
+            </a:r>
+            <a:r>
+              <a:rPr lang="en-US" sz="3200" b="1" dirty="0" smtClean="0">
+                <a:solidFill>
+                  <a:srgbClr val="1B79D7"/>
+                </a:solidFill>
+              </a:rPr>
+              <a:t>g</a:t>
+            </a:r>
+            <a:r>
+              <a:rPr lang="en-US" sz="3200" b="1" dirty="0" smtClean="0">
+                <a:solidFill>
+                  <a:srgbClr val="009900"/>
+                </a:solidFill>
+              </a:rPr>
+              <a:t>l</a:t>
+            </a:r>
+            <a:r>
+              <a:rPr lang="en-US" sz="3200" b="1" dirty="0" smtClean="0">
+                <a:solidFill>
+                  <a:srgbClr val="ED483D"/>
+                </a:solidFill>
+              </a:rPr>
+              <a:t>e</a:t>
+            </a:r>
+            <a:r>
+              <a:rPr lang="en-US" sz="3200" b="1" dirty="0" smtClean="0">
+                <a:solidFill>
+                  <a:schemeClr val="accent1"/>
+                </a:solidFill>
+              </a:rPr>
+              <a:t> </a:t>
+            </a:r>
+            <a:r>
+              <a:rPr lang="en-US" sz="2400" b="1" dirty="0" smtClean="0">
+                <a:solidFill>
+                  <a:srgbClr val="1B79D7"/>
+                </a:solidFill>
+              </a:rPr>
+              <a:t>Evolution</a:t>
+            </a:r>
+            <a:endParaRPr lang="en-US" dirty="0"/>
+          </a:p>
+        </p:txBody>
+      </p:sp>
+      <p:pic>
+        <p:nvPicPr>
+          <p:cNvPr id="5" name="Content Placeholder 4" descr="part3.jpg"/>
+          <p:cNvPicPr>
+            <a:picLocks noGrp="1" noChangeAspect="1"/>
+          </p:cNvPicPr>
+          <p:nvPr>
+            <p:ph sz="quarter" idx="1"/>
+          </p:nvPr>
+        </p:nvPicPr>
+        <p:blipFill>
+          <a:blip r:embed="rId2"/>
+          <a:stretch>
+            <a:fillRect/>
+          </a:stretch>
+        </p:blipFill>
+        <p:spPr>
+          <a:xfrm>
+            <a:off x="228600" y="914400"/>
+            <a:ext cx="8534400" cy="5943600"/>
+          </a:xfrm>
+        </p:spPr>
+      </p:pic>
+    </p:spTree>
+  </p:cSld>
+  <p:clrMapOvr>
+    <a:masterClrMapping/>
+  </p:clrMapOvr>
+  <p:timing>
+    <p:tnLst>
+      <p:par>
+        <p:cTn id="1" dur="indefinite" restart="never" nodeType="tmRoot"/>
+      </p:par>
+    </p:tnLst>
+  </p:timing>
+</p:sld>
+</file>
+
 <file path=ppt/slides/slide19.xml><?xml version="1.0" encoding="utf-8"?>
 <p:sld xmlns:a="http://schemas.openxmlformats.org/drawingml/2006/main" xmlns:r="http://schemas.openxmlformats.org/officeDocument/2006/relationships" xmlns:p="http://schemas.openxmlformats.org/presentationml/2006/main">
   <p:cSld>
@@ -11559,553 +11496,6 @@
 </p:sld>
 </file>
 
-<file path=ppt/slides/slide21.xml><?xml version="1.0" encoding="utf-8"?>
-<p:sld xmlns:a="http://schemas.openxmlformats.org/drawingml/2006/main" xmlns:r="http://schemas.openxmlformats.org/officeDocument/2006/relationships" xmlns:p="http://schemas.openxmlformats.org/presentationml/2006/main">
-  <p:cSld>
-    <p:spTree>
-      <p:nvGrpSpPr>
-        <p:cNvPr id="1" name=""/>
-        <p:cNvGrpSpPr/>
-        <p:nvPr/>
-      </p:nvGrpSpPr>
-      <p:grpSpPr>
-        <a:xfrm>
-          <a:off x="0" y="0"/>
-          <a:ext cx="0" cy="0"/>
-          <a:chOff x="0" y="0"/>
-          <a:chExt cx="0" cy="0"/>
-        </a:xfrm>
-      </p:grpSpPr>
-      <p:sp>
-        <p:nvSpPr>
-          <p:cNvPr id="2" name="Title 1"/>
-          <p:cNvSpPr>
-            <a:spLocks noGrp="1"/>
-          </p:cNvSpPr>
-          <p:nvPr>
-            <p:ph type="ctrTitle"/>
-          </p:nvPr>
-        </p:nvSpPr>
-        <p:spPr>
-          <a:xfrm>
-            <a:off x="2286000" y="1676400"/>
-            <a:ext cx="6172200" cy="1894362"/>
-          </a:xfrm>
-        </p:spPr>
-        <p:txBody>
-          <a:bodyPr/>
-          <a:lstStyle/>
-          <a:p>
-            <a:r>
-              <a:rPr lang="en-US" dirty="0" smtClean="0"/>
-              <a:t>                          Work Culture</a:t>
-            </a:r>
-            <a:r>
-              <a:rPr lang="en-US" dirty="0" smtClean="0"/>
-              <a:t>                        </a:t>
-            </a:r>
-            <a:endParaRPr lang="en-US" dirty="0"/>
-          </a:p>
-        </p:txBody>
-      </p:sp>
-      <p:sp>
-        <p:nvSpPr>
-          <p:cNvPr id="3" name="Subtitle 2"/>
-          <p:cNvSpPr>
-            <a:spLocks noGrp="1"/>
-          </p:cNvSpPr>
-          <p:nvPr>
-            <p:ph type="subTitle" idx="1"/>
-          </p:nvPr>
-        </p:nvSpPr>
-        <p:spPr>
-          <a:xfrm>
-            <a:off x="2286000" y="3555522"/>
-            <a:ext cx="6172200" cy="1371600"/>
-          </a:xfrm>
-        </p:spPr>
-        <p:txBody>
-          <a:bodyPr/>
-          <a:lstStyle/>
-          <a:p>
-            <a:endParaRPr lang="en-US" dirty="0"/>
-          </a:p>
-        </p:txBody>
-      </p:sp>
-      <p:pic>
-        <p:nvPicPr>
-          <p:cNvPr id="4" name="Picture 3" descr="logo11w.png"/>
-          <p:cNvPicPr>
-            <a:picLocks noChangeAspect="1"/>
-          </p:cNvPicPr>
-          <p:nvPr/>
-        </p:nvPicPr>
-        <p:blipFill>
-          <a:blip r:embed="rId2"/>
-          <a:stretch>
-            <a:fillRect/>
-          </a:stretch>
-        </p:blipFill>
-        <p:spPr>
-          <a:xfrm>
-            <a:off x="2286000" y="2819400"/>
-            <a:ext cx="2819400" cy="995699"/>
-          </a:xfrm>
-          <a:prstGeom prst="rect">
-            <a:avLst/>
-          </a:prstGeom>
-        </p:spPr>
-      </p:pic>
-    </p:spTree>
-  </p:cSld>
-  <p:clrMapOvr>
-    <a:masterClrMapping/>
-  </p:clrMapOvr>
-  <p:timing>
-    <p:tnLst>
-      <p:par>
-        <p:cTn id="1" dur="indefinite" restart="never" nodeType="tmRoot"/>
-      </p:par>
-    </p:tnLst>
-  </p:timing>
-</p:sld>
-</file>
-
-<file path=ppt/slides/slide22.xml><?xml version="1.0" encoding="utf-8"?>
-<p:sld xmlns:a="http://schemas.openxmlformats.org/drawingml/2006/main" xmlns:r="http://schemas.openxmlformats.org/officeDocument/2006/relationships" xmlns:p="http://schemas.openxmlformats.org/presentationml/2006/main">
-  <p:cSld>
-    <p:spTree>
-      <p:nvGrpSpPr>
-        <p:cNvPr id="1" name=""/>
-        <p:cNvGrpSpPr/>
-        <p:nvPr/>
-      </p:nvGrpSpPr>
-      <p:grpSpPr>
-        <a:xfrm>
-          <a:off x="0" y="0"/>
-          <a:ext cx="0" cy="0"/>
-          <a:chOff x="0" y="0"/>
-          <a:chExt cx="0" cy="0"/>
-        </a:xfrm>
-      </p:grpSpPr>
-      <p:sp>
-        <p:nvSpPr>
-          <p:cNvPr id="11" name="Title 10"/>
-          <p:cNvSpPr>
-            <a:spLocks noGrp="1"/>
-          </p:cNvSpPr>
-          <p:nvPr>
-            <p:ph type="title"/>
-          </p:nvPr>
-        </p:nvSpPr>
-        <p:spPr>
-          <a:xfrm>
-            <a:off x="457200" y="274638"/>
-            <a:ext cx="7467600" cy="715962"/>
-          </a:xfrm>
-        </p:spPr>
-        <p:txBody>
-          <a:bodyPr>
-            <a:normAutofit/>
-          </a:bodyPr>
-          <a:lstStyle/>
-          <a:p>
-            <a:r>
-              <a:rPr lang="en-US" sz="3200" b="1" dirty="0" smtClean="0">
-                <a:solidFill>
-                  <a:schemeClr val="accent2"/>
-                </a:solidFill>
-              </a:rPr>
-              <a:t>G</a:t>
-            </a:r>
-            <a:r>
-              <a:rPr lang="en-US" sz="3200" b="1" dirty="0" smtClean="0">
-                <a:solidFill>
-                  <a:srgbClr val="FF0000"/>
-                </a:solidFill>
-              </a:rPr>
-              <a:t>o</a:t>
-            </a:r>
-            <a:r>
-              <a:rPr lang="en-US" sz="3200" b="1" dirty="0" smtClean="0">
-                <a:solidFill>
-                  <a:srgbClr val="FFF529"/>
-                </a:solidFill>
-              </a:rPr>
-              <a:t>o</a:t>
-            </a:r>
-            <a:r>
-              <a:rPr lang="en-US" sz="3200" b="1" dirty="0" smtClean="0">
-                <a:solidFill>
-                  <a:srgbClr val="1B79D7"/>
-                </a:solidFill>
-              </a:rPr>
-              <a:t>g</a:t>
-            </a:r>
-            <a:r>
-              <a:rPr lang="en-US" sz="3200" b="1" dirty="0" smtClean="0">
-                <a:solidFill>
-                  <a:srgbClr val="009900"/>
-                </a:solidFill>
-              </a:rPr>
-              <a:t>l</a:t>
-            </a:r>
-            <a:r>
-              <a:rPr lang="en-US" sz="3200" b="1" dirty="0" smtClean="0">
-                <a:solidFill>
-                  <a:srgbClr val="ED483D"/>
-                </a:solidFill>
-              </a:rPr>
-              <a:t>e</a:t>
-            </a:r>
-            <a:r>
-              <a:rPr lang="en-US" sz="3200" b="1" dirty="0" smtClean="0">
-                <a:solidFill>
-                  <a:schemeClr val="accent1"/>
-                </a:solidFill>
-              </a:rPr>
-              <a:t> </a:t>
-            </a:r>
-            <a:r>
-              <a:rPr lang="en-AU" sz="2400" b="1" dirty="0" smtClean="0">
-                <a:solidFill>
-                  <a:srgbClr val="1B79D7"/>
-                </a:solidFill>
-              </a:rPr>
-              <a:t>work culture</a:t>
-            </a:r>
-            <a:endParaRPr lang="en-US" dirty="0"/>
-          </a:p>
-        </p:txBody>
-      </p:sp>
-      <p:sp>
-        <p:nvSpPr>
-          <p:cNvPr id="6" name="Content Placeholder 5"/>
-          <p:cNvSpPr>
-            <a:spLocks noGrp="1"/>
-          </p:cNvSpPr>
-          <p:nvPr>
-            <p:ph sz="quarter" idx="1"/>
-          </p:nvPr>
-        </p:nvSpPr>
-        <p:spPr>
-          <a:xfrm>
-            <a:off x="457200" y="1219200"/>
-            <a:ext cx="7467600" cy="5254752"/>
-          </a:xfrm>
-        </p:spPr>
-        <p:txBody>
-          <a:bodyPr>
-            <a:normAutofit/>
-            <a:scene3d>
-              <a:camera prst="orthographicFront"/>
-              <a:lightRig rig="sunset" dir="t"/>
-            </a:scene3d>
-            <a:sp3d prstMaterial="dkEdge"/>
-          </a:bodyPr>
-          <a:lstStyle/>
-          <a:p>
-            <a:pPr marL="339725" indent="-339725">
-              <a:lnSpc>
-                <a:spcPct val="100000"/>
-              </a:lnSpc>
-              <a:spcBef>
-                <a:spcPct val="55000"/>
-              </a:spcBef>
-              <a:spcAft>
-                <a:spcPct val="0"/>
-              </a:spcAft>
-              <a:buClr>
-                <a:srgbClr val="1B79D7"/>
-              </a:buClr>
-              <a:buNone/>
-            </a:pPr>
-            <a:r>
-              <a:rPr lang="en-US" sz="4000" dirty="0" smtClean="0">
-                <a:solidFill>
-                  <a:schemeClr val="accent2">
-                    <a:lumMod val="75000"/>
-                  </a:schemeClr>
-                </a:solidFill>
-              </a:rPr>
-              <a:t>Google </a:t>
-            </a:r>
-            <a:r>
-              <a:rPr lang="en-US" sz="4000" dirty="0" smtClean="0">
-                <a:solidFill>
-                  <a:schemeClr val="accent2">
-                    <a:lumMod val="75000"/>
-                  </a:schemeClr>
-                </a:solidFill>
-              </a:rPr>
-              <a:t>has been ranked No.1 in Fortune's latest annual list of '100 Best Companies to Work </a:t>
-            </a:r>
-            <a:r>
-              <a:rPr lang="en-US" sz="4000" dirty="0" smtClean="0">
-                <a:solidFill>
-                  <a:schemeClr val="accent2">
-                    <a:lumMod val="75000"/>
-                  </a:schemeClr>
-                </a:solidFill>
-              </a:rPr>
-              <a:t>For</a:t>
-            </a:r>
-          </a:p>
-          <a:p>
-            <a:pPr marL="339725" indent="-339725">
-              <a:lnSpc>
-                <a:spcPct val="100000"/>
-              </a:lnSpc>
-              <a:spcBef>
-                <a:spcPct val="55000"/>
-              </a:spcBef>
-              <a:spcAft>
-                <a:spcPct val="0"/>
-              </a:spcAft>
-              <a:buClr>
-                <a:srgbClr val="1B79D7"/>
-              </a:buClr>
-              <a:buNone/>
-            </a:pPr>
-            <a:endParaRPr lang="en-US" sz="4000" dirty="0" smtClean="0">
-              <a:solidFill>
-                <a:schemeClr val="accent2">
-                  <a:lumMod val="75000"/>
-                </a:schemeClr>
-              </a:solidFill>
-            </a:endParaRPr>
-          </a:p>
-          <a:p>
-            <a:pPr marL="339725" indent="-339725">
-              <a:lnSpc>
-                <a:spcPct val="100000"/>
-              </a:lnSpc>
-              <a:spcBef>
-                <a:spcPct val="55000"/>
-              </a:spcBef>
-              <a:spcAft>
-                <a:spcPct val="0"/>
-              </a:spcAft>
-              <a:buClr>
-                <a:srgbClr val="1B79D7"/>
-              </a:buClr>
-              <a:buNone/>
-            </a:pPr>
-            <a:r>
-              <a:rPr lang="en-US" sz="4000" dirty="0" smtClean="0">
-                <a:solidFill>
-                  <a:schemeClr val="accent2">
-                    <a:lumMod val="75000"/>
-                  </a:schemeClr>
-                </a:solidFill>
-              </a:rPr>
-              <a:t>                   </a:t>
-            </a:r>
-            <a:r>
-              <a:rPr lang="en-US" sz="7200" dirty="0" smtClean="0">
-                <a:solidFill>
-                  <a:srgbClr val="C00000"/>
-                </a:solidFill>
-              </a:rPr>
-              <a:t>Why?</a:t>
-            </a:r>
-            <a:endParaRPr lang="en-US" dirty="0">
-              <a:solidFill>
-                <a:srgbClr val="C00000"/>
-              </a:solidFill>
-            </a:endParaRPr>
-          </a:p>
-        </p:txBody>
-      </p:sp>
-    </p:spTree>
-  </p:cSld>
-  <p:clrMapOvr>
-    <a:masterClrMapping/>
-  </p:clrMapOvr>
-  <p:timing>
-    <p:tnLst>
-      <p:par>
-        <p:cTn id="1" dur="indefinite" restart="never" nodeType="tmRoot"/>
-      </p:par>
-    </p:tnLst>
-  </p:timing>
-</p:sld>
-</file>
-
-<file path=ppt/slides/slide23.xml><?xml version="1.0" encoding="utf-8"?>
-<p:sld xmlns:a="http://schemas.openxmlformats.org/drawingml/2006/main" xmlns:r="http://schemas.openxmlformats.org/officeDocument/2006/relationships" xmlns:p="http://schemas.openxmlformats.org/presentationml/2006/main">
-  <p:cSld>
-    <p:spTree>
-      <p:nvGrpSpPr>
-        <p:cNvPr id="1" name=""/>
-        <p:cNvGrpSpPr/>
-        <p:nvPr/>
-      </p:nvGrpSpPr>
-      <p:grpSpPr>
-        <a:xfrm>
-          <a:off x="0" y="0"/>
-          <a:ext cx="0" cy="0"/>
-          <a:chOff x="0" y="0"/>
-          <a:chExt cx="0" cy="0"/>
-        </a:xfrm>
-      </p:grpSpPr>
-      <p:sp>
-        <p:nvSpPr>
-          <p:cNvPr id="11" name="Title 10"/>
-          <p:cNvSpPr>
-            <a:spLocks noGrp="1"/>
-          </p:cNvSpPr>
-          <p:nvPr>
-            <p:ph type="title"/>
-          </p:nvPr>
-        </p:nvSpPr>
-        <p:spPr>
-          <a:xfrm>
-            <a:off x="457200" y="274638"/>
-            <a:ext cx="7467600" cy="715962"/>
-          </a:xfrm>
-        </p:spPr>
-        <p:txBody>
-          <a:bodyPr>
-            <a:normAutofit/>
-          </a:bodyPr>
-          <a:lstStyle/>
-          <a:p>
-            <a:r>
-              <a:rPr lang="en-US" sz="3200" b="1" dirty="0" smtClean="0">
-                <a:solidFill>
-                  <a:schemeClr val="accent2"/>
-                </a:solidFill>
-              </a:rPr>
-              <a:t>G</a:t>
-            </a:r>
-            <a:r>
-              <a:rPr lang="en-US" sz="3200" b="1" dirty="0" smtClean="0">
-                <a:solidFill>
-                  <a:srgbClr val="FF0000"/>
-                </a:solidFill>
-              </a:rPr>
-              <a:t>o</a:t>
-            </a:r>
-            <a:r>
-              <a:rPr lang="en-US" sz="3200" b="1" dirty="0" smtClean="0">
-                <a:solidFill>
-                  <a:srgbClr val="FFF529"/>
-                </a:solidFill>
-              </a:rPr>
-              <a:t>o</a:t>
-            </a:r>
-            <a:r>
-              <a:rPr lang="en-US" sz="3200" b="1" dirty="0" smtClean="0">
-                <a:solidFill>
-                  <a:srgbClr val="1B79D7"/>
-                </a:solidFill>
-              </a:rPr>
-              <a:t>g</a:t>
-            </a:r>
-            <a:r>
-              <a:rPr lang="en-US" sz="3200" b="1" dirty="0" smtClean="0">
-                <a:solidFill>
-                  <a:srgbClr val="009900"/>
-                </a:solidFill>
-              </a:rPr>
-              <a:t>l</a:t>
-            </a:r>
-            <a:r>
-              <a:rPr lang="en-US" sz="3200" b="1" dirty="0" smtClean="0">
-                <a:solidFill>
-                  <a:srgbClr val="ED483D"/>
-                </a:solidFill>
-              </a:rPr>
-              <a:t>e</a:t>
-            </a:r>
-            <a:r>
-              <a:rPr lang="en-US" sz="3200" b="1" dirty="0" smtClean="0">
-                <a:solidFill>
-                  <a:schemeClr val="accent1"/>
-                </a:solidFill>
-              </a:rPr>
-              <a:t> </a:t>
-            </a:r>
-            <a:r>
-              <a:rPr lang="en-AU" sz="2400" b="1" dirty="0" smtClean="0">
-                <a:solidFill>
-                  <a:srgbClr val="1B79D7"/>
-                </a:solidFill>
-              </a:rPr>
-              <a:t>work culture</a:t>
-            </a:r>
-            <a:endParaRPr lang="en-US" dirty="0"/>
-          </a:p>
-        </p:txBody>
-      </p:sp>
-      <p:sp>
-        <p:nvSpPr>
-          <p:cNvPr id="6" name="Content Placeholder 5"/>
-          <p:cNvSpPr>
-            <a:spLocks noGrp="1"/>
-          </p:cNvSpPr>
-          <p:nvPr>
-            <p:ph sz="quarter" idx="1"/>
-          </p:nvPr>
-        </p:nvSpPr>
-        <p:spPr>
-          <a:xfrm>
-            <a:off x="457200" y="1219200"/>
-            <a:ext cx="7467600" cy="5254752"/>
-          </a:xfrm>
-        </p:spPr>
-        <p:txBody>
-          <a:bodyPr>
-            <a:normAutofit/>
-            <a:scene3d>
-              <a:camera prst="orthographicFront"/>
-              <a:lightRig rig="sunset" dir="t"/>
-            </a:scene3d>
-            <a:sp3d prstMaterial="dkEdge"/>
-          </a:bodyPr>
-          <a:lstStyle/>
-          <a:p>
-            <a:pPr marL="339725" indent="-339725">
-              <a:lnSpc>
-                <a:spcPct val="100000"/>
-              </a:lnSpc>
-              <a:spcBef>
-                <a:spcPct val="55000"/>
-              </a:spcBef>
-              <a:spcAft>
-                <a:spcPct val="0"/>
-              </a:spcAft>
-              <a:buClr>
-                <a:srgbClr val="1B79D7"/>
-              </a:buClr>
-              <a:buNone/>
-            </a:pPr>
-            <a:endParaRPr lang="en-US" dirty="0" smtClean="0">
-              <a:solidFill>
-                <a:schemeClr val="accent2">
-                  <a:lumMod val="75000"/>
-                </a:schemeClr>
-              </a:solidFill>
-            </a:endParaRPr>
-          </a:p>
-        </p:txBody>
-      </p:sp>
-    </p:spTree>
-  </p:cSld>
-  <p:clrMapOvr>
-    <a:masterClrMapping/>
-  </p:clrMapOvr>
-  <p:timing>
-    <p:tnLst>
-      <p:par>
-        <p:cTn id="1" dur="indefinite" restart="never" nodeType="tmRoot"/>
-      </p:par>
-    </p:tnLst>
-  </p:timing>
-</p:sld>
-</file>
-
 <file path=ppt/slides/slide3.xml><?xml version="1.0" encoding="utf-8"?>
 <p:sld xmlns:a="http://schemas.openxmlformats.org/drawingml/2006/main" xmlns:r="http://schemas.openxmlformats.org/officeDocument/2006/relationships" xmlns:p="http://schemas.openxmlformats.org/presentationml/2006/main">
   <p:cSld>
@@ -12928,27 +12318,8 @@
                   </a:schemeClr>
                 </a:solidFill>
               </a:rPr>
-              <a:t>    Google </a:t>
-            </a:r>
-            <a:r>
-              <a:rPr lang="en-US" dirty="0" smtClean="0">
-                <a:solidFill>
-                  <a:schemeClr val="tx1">
-                    <a:lumMod val="65000"/>
-                    <a:lumOff val="35000"/>
-                  </a:schemeClr>
-                </a:solidFill>
-              </a:rPr>
-              <a:t>beta version</a:t>
-            </a:r>
-            <a:endParaRPr lang="en-US" dirty="0" smtClean="0">
-              <a:solidFill>
-                <a:schemeClr val="tx1">
-                  <a:lumMod val="65000"/>
-                  <a:lumOff val="35000"/>
-                </a:schemeClr>
-              </a:solidFill>
-            </a:endParaRPr>
+              <a:t>    Google beta version</a:t>
+            </a:r>
           </a:p>
           <a:p>
             <a:pPr>

</xml_diff>